<commit_message>
feat: add documento_identificador field to Certificados component, update data fetching logic, and enhance SelectMap to display parsed identificador data
</commit_message>
<xml_diff>
--- a/public/templates/frente-verso-3a.pptx
+++ b/public/templates/frente-verso-3a.pptx
@@ -128,1144 +128,10 @@
 <file path=ppt/revisionInfo.xml><?xml version="1.0" encoding="utf-8"?>
 <p1510:revInfo xmlns:a="http://schemas.openxmlformats.org/drawingml/2006/main" xmlns:r="http://schemas.openxmlformats.org/officeDocument/2006/relationships" xmlns:p1510="http://schemas.microsoft.com/office/powerpoint/2015/10/main">
   <p1510:revLst>
-    <p1510:client id="{B3091135-0012-4AAB-A9DB-A48B66E5C9AC}" v="6" dt="2024-10-03T13:34:46.601"/>
+    <p1510:client id="{204202F2-86F0-4CD8-B6CE-2D393A17307D}" v="373" dt="2025-01-03T23:52:56.188"/>
+    <p1510:client id="{F6AA6E80-E569-4CB3-8F82-00241AED0ADB}" v="24" dt="2025-01-05T20:21:03.661"/>
   </p1510:revLst>
 </p1510:revInfo>
-</file>
-
-<file path=ppt/changesInfos/changesInfo1.xml><?xml version="1.0" encoding="utf-8"?>
-<pc:chgInfo xmlns:a="http://schemas.openxmlformats.org/drawingml/2006/main" xmlns:r="http://schemas.openxmlformats.org/officeDocument/2006/relationships" xmlns:ac="http://schemas.microsoft.com/office/drawing/2013/main/command" xmlns:pc="http://schemas.microsoft.com/office/powerpoint/2013/main/command">
-  <pc:docChgLst>
-    <pc:chgData name="TI LF Soares" userId="e2d67a61776f6d56" providerId="LiveId" clId="{1558A0C1-EA79-4A76-8A6A-697ADF18E6E0}"/>
-    <pc:docChg chg="undo custSel modSld">
-      <pc:chgData name="TI LF Soares" userId="e2d67a61776f6d56" providerId="LiveId" clId="{1558A0C1-EA79-4A76-8A6A-697ADF18E6E0}" dt="2024-05-08T14:29:29.622" v="74" actId="1038"/>
-      <pc:docMkLst>
-        <pc:docMk/>
-      </pc:docMkLst>
-      <pc:sldChg chg="modSp mod">
-        <pc:chgData name="TI LF Soares" userId="e2d67a61776f6d56" providerId="LiveId" clId="{1558A0C1-EA79-4A76-8A6A-697ADF18E6E0}" dt="2024-05-08T14:29:29.622" v="74" actId="1038"/>
-        <pc:sldMkLst>
-          <pc:docMk/>
-          <pc:sldMk cId="3778653310" sldId="274"/>
-        </pc:sldMkLst>
-        <pc:spChg chg="mod">
-          <ac:chgData name="TI LF Soares" userId="e2d67a61776f6d56" providerId="LiveId" clId="{1558A0C1-EA79-4A76-8A6A-697ADF18E6E0}" dt="2024-05-08T14:29:29.622" v="74" actId="1038"/>
-          <ac:spMkLst>
-            <pc:docMk/>
-            <pc:sldMk cId="3778653310" sldId="274"/>
-            <ac:spMk id="4" creationId="{013A25A7-3799-5A9B-D548-4837552A167C}"/>
-          </ac:spMkLst>
-        </pc:spChg>
-      </pc:sldChg>
-    </pc:docChg>
-  </pc:docChgLst>
-  <pc:docChgLst>
-    <pc:chgData name="TI LF Soares" userId="e2d67a61776f6d56" providerId="LiveId" clId="{BED03304-3AFC-42A7-86CF-9C45374E46F9}"/>
-    <pc:docChg chg="undo custSel addSld delSld modSld">
-      <pc:chgData name="TI LF Soares" userId="e2d67a61776f6d56" providerId="LiveId" clId="{BED03304-3AFC-42A7-86CF-9C45374E46F9}" dt="2024-02-20T19:47:30.747" v="198" actId="20577"/>
-      <pc:docMkLst>
-        <pc:docMk/>
-      </pc:docMkLst>
-      <pc:sldChg chg="delSp modSp mod">
-        <pc:chgData name="TI LF Soares" userId="e2d67a61776f6d56" providerId="LiveId" clId="{BED03304-3AFC-42A7-86CF-9C45374E46F9}" dt="2024-02-20T19:46:44.985" v="168" actId="20577"/>
-        <pc:sldMkLst>
-          <pc:docMk/>
-          <pc:sldMk cId="3778653310" sldId="274"/>
-        </pc:sldMkLst>
-        <pc:spChg chg="mod">
-          <ac:chgData name="TI LF Soares" userId="e2d67a61776f6d56" providerId="LiveId" clId="{BED03304-3AFC-42A7-86CF-9C45374E46F9}" dt="2024-02-20T19:46:06.614" v="153" actId="1036"/>
-          <ac:spMkLst>
-            <pc:docMk/>
-            <pc:sldMk cId="3778653310" sldId="274"/>
-            <ac:spMk id="2" creationId="{FB828BBD-E731-2915-5A46-60F22269C77E}"/>
-          </ac:spMkLst>
-        </pc:spChg>
-        <pc:spChg chg="mod">
-          <ac:chgData name="TI LF Soares" userId="e2d67a61776f6d56" providerId="LiveId" clId="{BED03304-3AFC-42A7-86CF-9C45374E46F9}" dt="2024-02-20T19:46:24.112" v="161" actId="1076"/>
-          <ac:spMkLst>
-            <pc:docMk/>
-            <pc:sldMk cId="3778653310" sldId="274"/>
-            <ac:spMk id="3" creationId="{00000000-0000-0000-0000-000000000000}"/>
-          </ac:spMkLst>
-        </pc:spChg>
-        <pc:spChg chg="mod">
-          <ac:chgData name="TI LF Soares" userId="e2d67a61776f6d56" providerId="LiveId" clId="{BED03304-3AFC-42A7-86CF-9C45374E46F9}" dt="2024-02-20T19:43:23.598" v="14" actId="20577"/>
-          <ac:spMkLst>
-            <pc:docMk/>
-            <pc:sldMk cId="3778653310" sldId="274"/>
-            <ac:spMk id="5" creationId="{B7902C3D-2498-859B-69FE-600F8490C5DF}"/>
-          </ac:spMkLst>
-        </pc:spChg>
-        <pc:spChg chg="del">
-          <ac:chgData name="TI LF Soares" userId="e2d67a61776f6d56" providerId="LiveId" clId="{BED03304-3AFC-42A7-86CF-9C45374E46F9}" dt="2024-02-20T19:43:38.865" v="15" actId="478"/>
-          <ac:spMkLst>
-            <pc:docMk/>
-            <pc:sldMk cId="3778653310" sldId="274"/>
-            <ac:spMk id="6" creationId="{C149192B-2136-AACA-1EC1-E1E361B14E19}"/>
-          </ac:spMkLst>
-        </pc:spChg>
-        <pc:spChg chg="mod">
-          <ac:chgData name="TI LF Soares" userId="e2d67a61776f6d56" providerId="LiveId" clId="{BED03304-3AFC-42A7-86CF-9C45374E46F9}" dt="2024-02-20T19:46:10.833" v="159" actId="1036"/>
-          <ac:spMkLst>
-            <pc:docMk/>
-            <pc:sldMk cId="3778653310" sldId="274"/>
-            <ac:spMk id="7" creationId="{00000000-0000-0000-0000-000000000000}"/>
-          </ac:spMkLst>
-        </pc:spChg>
-        <pc:spChg chg="mod">
-          <ac:chgData name="TI LF Soares" userId="e2d67a61776f6d56" providerId="LiveId" clId="{BED03304-3AFC-42A7-86CF-9C45374E46F9}" dt="2024-02-20T19:46:33.971" v="162" actId="12"/>
-          <ac:spMkLst>
-            <pc:docMk/>
-            <pc:sldMk cId="3778653310" sldId="274"/>
-            <ac:spMk id="9" creationId="{00000000-0000-0000-0000-000000000000}"/>
-          </ac:spMkLst>
-        </pc:spChg>
-        <pc:spChg chg="mod">
-          <ac:chgData name="TI LF Soares" userId="e2d67a61776f6d56" providerId="LiveId" clId="{BED03304-3AFC-42A7-86CF-9C45374E46F9}" dt="2024-02-20T19:46:44.985" v="168" actId="20577"/>
-          <ac:spMkLst>
-            <pc:docMk/>
-            <pc:sldMk cId="3778653310" sldId="274"/>
-            <ac:spMk id="13" creationId="{00000000-0000-0000-0000-000000000000}"/>
-          </ac:spMkLst>
-        </pc:spChg>
-      </pc:sldChg>
-      <pc:sldChg chg="del">
-        <pc:chgData name="TI LF Soares" userId="e2d67a61776f6d56" providerId="LiveId" clId="{BED03304-3AFC-42A7-86CF-9C45374E46F9}" dt="2024-02-20T19:43:08.601" v="4" actId="47"/>
-        <pc:sldMkLst>
-          <pc:docMk/>
-          <pc:sldMk cId="918981318" sldId="275"/>
-        </pc:sldMkLst>
-      </pc:sldChg>
-      <pc:sldChg chg="modSp add mod">
-        <pc:chgData name="TI LF Soares" userId="e2d67a61776f6d56" providerId="LiveId" clId="{BED03304-3AFC-42A7-86CF-9C45374E46F9}" dt="2024-02-20T19:46:57.482" v="178" actId="20577"/>
-        <pc:sldMkLst>
-          <pc:docMk/>
-          <pc:sldMk cId="3822603900" sldId="275"/>
-        </pc:sldMkLst>
-        <pc:spChg chg="mod">
-          <ac:chgData name="TI LF Soares" userId="e2d67a61776f6d56" providerId="LiveId" clId="{BED03304-3AFC-42A7-86CF-9C45374E46F9}" dt="2024-02-20T19:46:57.482" v="178" actId="20577"/>
-          <ac:spMkLst>
-            <pc:docMk/>
-            <pc:sldMk cId="3822603900" sldId="275"/>
-            <ac:spMk id="13" creationId="{4B070B72-56BB-B4DC-D06D-45A6B97E98E3}"/>
-          </ac:spMkLst>
-        </pc:spChg>
-      </pc:sldChg>
-      <pc:sldChg chg="del">
-        <pc:chgData name="TI LF Soares" userId="e2d67a61776f6d56" providerId="LiveId" clId="{BED03304-3AFC-42A7-86CF-9C45374E46F9}" dt="2024-02-20T19:43:08.117" v="3" actId="47"/>
-        <pc:sldMkLst>
-          <pc:docMk/>
-          <pc:sldMk cId="2200340408" sldId="276"/>
-        </pc:sldMkLst>
-      </pc:sldChg>
-      <pc:sldChg chg="modSp add mod">
-        <pc:chgData name="TI LF Soares" userId="e2d67a61776f6d56" providerId="LiveId" clId="{BED03304-3AFC-42A7-86CF-9C45374E46F9}" dt="2024-02-20T19:47:02.247" v="182" actId="20577"/>
-        <pc:sldMkLst>
-          <pc:docMk/>
-          <pc:sldMk cId="3796765463" sldId="276"/>
-        </pc:sldMkLst>
-        <pc:spChg chg="mod">
-          <ac:chgData name="TI LF Soares" userId="e2d67a61776f6d56" providerId="LiveId" clId="{BED03304-3AFC-42A7-86CF-9C45374E46F9}" dt="2024-02-20T19:47:02.247" v="182" actId="20577"/>
-          <ac:spMkLst>
-            <pc:docMk/>
-            <pc:sldMk cId="3796765463" sldId="276"/>
-            <ac:spMk id="13" creationId="{5E4F9D06-EA4E-9310-32B0-7497EA41EB18}"/>
-          </ac:spMkLst>
-        </pc:spChg>
-      </pc:sldChg>
-      <pc:sldChg chg="del">
-        <pc:chgData name="TI LF Soares" userId="e2d67a61776f6d56" providerId="LiveId" clId="{BED03304-3AFC-42A7-86CF-9C45374E46F9}" dt="2024-02-20T19:43:07.679" v="2" actId="47"/>
-        <pc:sldMkLst>
-          <pc:docMk/>
-          <pc:sldMk cId="93904233" sldId="277"/>
-        </pc:sldMkLst>
-      </pc:sldChg>
-      <pc:sldChg chg="modSp add mod">
-        <pc:chgData name="TI LF Soares" userId="e2d67a61776f6d56" providerId="LiveId" clId="{BED03304-3AFC-42A7-86CF-9C45374E46F9}" dt="2024-02-20T19:47:07.137" v="186" actId="20577"/>
-        <pc:sldMkLst>
-          <pc:docMk/>
-          <pc:sldMk cId="3819366554" sldId="277"/>
-        </pc:sldMkLst>
-        <pc:spChg chg="mod">
-          <ac:chgData name="TI LF Soares" userId="e2d67a61776f6d56" providerId="LiveId" clId="{BED03304-3AFC-42A7-86CF-9C45374E46F9}" dt="2024-02-20T19:47:07.137" v="186" actId="20577"/>
-          <ac:spMkLst>
-            <pc:docMk/>
-            <pc:sldMk cId="3819366554" sldId="277"/>
-            <ac:spMk id="13" creationId="{8EF62EA7-45C6-FBF8-4FE9-BCEB23915B02}"/>
-          </ac:spMkLst>
-        </pc:spChg>
-      </pc:sldChg>
-      <pc:sldChg chg="del">
-        <pc:chgData name="TI LF Soares" userId="e2d67a61776f6d56" providerId="LiveId" clId="{BED03304-3AFC-42A7-86CF-9C45374E46F9}" dt="2024-02-20T19:43:07.476" v="1" actId="47"/>
-        <pc:sldMkLst>
-          <pc:docMk/>
-          <pc:sldMk cId="997846852" sldId="278"/>
-        </pc:sldMkLst>
-      </pc:sldChg>
-      <pc:sldChg chg="modSp add mod">
-        <pc:chgData name="TI LF Soares" userId="e2d67a61776f6d56" providerId="LiveId" clId="{BED03304-3AFC-42A7-86CF-9C45374E46F9}" dt="2024-02-20T19:47:12.417" v="190" actId="20577"/>
-        <pc:sldMkLst>
-          <pc:docMk/>
-          <pc:sldMk cId="3715566760" sldId="278"/>
-        </pc:sldMkLst>
-        <pc:spChg chg="mod">
-          <ac:chgData name="TI LF Soares" userId="e2d67a61776f6d56" providerId="LiveId" clId="{BED03304-3AFC-42A7-86CF-9C45374E46F9}" dt="2024-02-20T19:47:12.417" v="190" actId="20577"/>
-          <ac:spMkLst>
-            <pc:docMk/>
-            <pc:sldMk cId="3715566760" sldId="278"/>
-            <ac:spMk id="13" creationId="{C19F11AA-20D6-D090-E6B4-4511D5B0B654}"/>
-          </ac:spMkLst>
-        </pc:spChg>
-      </pc:sldChg>
-      <pc:sldChg chg="modSp add mod">
-        <pc:chgData name="TI LF Soares" userId="e2d67a61776f6d56" providerId="LiveId" clId="{BED03304-3AFC-42A7-86CF-9C45374E46F9}" dt="2024-02-20T19:47:19.292" v="194" actId="20577"/>
-        <pc:sldMkLst>
-          <pc:docMk/>
-          <pc:sldMk cId="1488515584" sldId="279"/>
-        </pc:sldMkLst>
-        <pc:spChg chg="mod">
-          <ac:chgData name="TI LF Soares" userId="e2d67a61776f6d56" providerId="LiveId" clId="{BED03304-3AFC-42A7-86CF-9C45374E46F9}" dt="2024-02-20T19:47:19.292" v="194" actId="20577"/>
-          <ac:spMkLst>
-            <pc:docMk/>
-            <pc:sldMk cId="1488515584" sldId="279"/>
-            <ac:spMk id="13" creationId="{22471D1B-6C91-46C5-B2EB-C5710643EE35}"/>
-          </ac:spMkLst>
-        </pc:spChg>
-      </pc:sldChg>
-      <pc:sldChg chg="del">
-        <pc:chgData name="TI LF Soares" userId="e2d67a61776f6d56" providerId="LiveId" clId="{BED03304-3AFC-42A7-86CF-9C45374E46F9}" dt="2024-02-20T19:43:07.304" v="0" actId="47"/>
-        <pc:sldMkLst>
-          <pc:docMk/>
-          <pc:sldMk cId="2461848014" sldId="279"/>
-        </pc:sldMkLst>
-      </pc:sldChg>
-      <pc:sldChg chg="add del">
-        <pc:chgData name="TI LF Soares" userId="e2d67a61776f6d56" providerId="LiveId" clId="{BED03304-3AFC-42A7-86CF-9C45374E46F9}" dt="2024-02-20T19:47:25.951" v="196" actId="47"/>
-        <pc:sldMkLst>
-          <pc:docMk/>
-          <pc:sldMk cId="500734544" sldId="280"/>
-        </pc:sldMkLst>
-      </pc:sldChg>
-      <pc:sldChg chg="modSp add mod">
-        <pc:chgData name="TI LF Soares" userId="e2d67a61776f6d56" providerId="LiveId" clId="{BED03304-3AFC-42A7-86CF-9C45374E46F9}" dt="2024-02-20T19:47:30.747" v="198" actId="20577"/>
-        <pc:sldMkLst>
-          <pc:docMk/>
-          <pc:sldMk cId="882313189" sldId="281"/>
-        </pc:sldMkLst>
-        <pc:spChg chg="mod">
-          <ac:chgData name="TI LF Soares" userId="e2d67a61776f6d56" providerId="LiveId" clId="{BED03304-3AFC-42A7-86CF-9C45374E46F9}" dt="2024-02-20T19:47:30.747" v="198" actId="20577"/>
-          <ac:spMkLst>
-            <pc:docMk/>
-            <pc:sldMk cId="882313189" sldId="281"/>
-            <ac:spMk id="13" creationId="{7264466E-D1E9-3002-85A7-B5F9BCE31ECD}"/>
-          </ac:spMkLst>
-        </pc:spChg>
-      </pc:sldChg>
-      <pc:sldChg chg="add del">
-        <pc:chgData name="TI LF Soares" userId="e2d67a61776f6d56" providerId="LiveId" clId="{BED03304-3AFC-42A7-86CF-9C45374E46F9}" dt="2024-02-20T19:46:51.343" v="176" actId="47"/>
-        <pc:sldMkLst>
-          <pc:docMk/>
-          <pc:sldMk cId="3415024911" sldId="281"/>
-        </pc:sldMkLst>
-      </pc:sldChg>
-    </pc:docChg>
-  </pc:docChgLst>
-  <pc:docChgLst>
-    <pc:chgData name="TI LF Soares" userId="e2d67a61776f6d56" providerId="LiveId" clId="{65F03B7F-3AB7-417A-869D-682E7AF1C8BE}"/>
-    <pc:docChg chg="undo custSel addSld delSld modSld">
-      <pc:chgData name="TI LF Soares" userId="e2d67a61776f6d56" providerId="LiveId" clId="{65F03B7F-3AB7-417A-869D-682E7AF1C8BE}" dt="2024-02-01T03:15:09.373" v="100" actId="20577"/>
-      <pc:docMkLst>
-        <pc:docMk/>
-      </pc:docMkLst>
-      <pc:sldChg chg="addSp delSp modSp mod">
-        <pc:chgData name="TI LF Soares" userId="e2d67a61776f6d56" providerId="LiveId" clId="{65F03B7F-3AB7-417A-869D-682E7AF1C8BE}" dt="2024-02-01T03:14:17.565" v="89" actId="20577"/>
-        <pc:sldMkLst>
-          <pc:docMk/>
-          <pc:sldMk cId="3778653310" sldId="274"/>
-        </pc:sldMkLst>
-        <pc:spChg chg="mod">
-          <ac:chgData name="TI LF Soares" userId="e2d67a61776f6d56" providerId="LiveId" clId="{65F03B7F-3AB7-417A-869D-682E7AF1C8BE}" dt="2024-02-01T02:07:17.949" v="28" actId="20577"/>
-          <ac:spMkLst>
-            <pc:docMk/>
-            <pc:sldMk cId="3778653310" sldId="274"/>
-            <ac:spMk id="2" creationId="{FB828BBD-E731-2915-5A46-60F22269C77E}"/>
-          </ac:spMkLst>
-        </pc:spChg>
-        <pc:spChg chg="add del mod">
-          <ac:chgData name="TI LF Soares" userId="e2d67a61776f6d56" providerId="LiveId" clId="{65F03B7F-3AB7-417A-869D-682E7AF1C8BE}" dt="2024-02-01T02:06:40.747" v="14"/>
-          <ac:spMkLst>
-            <pc:docMk/>
-            <pc:sldMk cId="3778653310" sldId="274"/>
-            <ac:spMk id="4" creationId="{81834FFE-0BE1-9F6E-15A6-D718E3A19879}"/>
-          </ac:spMkLst>
-        </pc:spChg>
-        <pc:spChg chg="mod">
-          <ac:chgData name="TI LF Soares" userId="e2d67a61776f6d56" providerId="LiveId" clId="{65F03B7F-3AB7-417A-869D-682E7AF1C8BE}" dt="2024-02-01T03:14:17.565" v="89" actId="20577"/>
-          <ac:spMkLst>
-            <pc:docMk/>
-            <pc:sldMk cId="3778653310" sldId="274"/>
-            <ac:spMk id="5" creationId="{B7902C3D-2498-859B-69FE-600F8490C5DF}"/>
-          </ac:spMkLst>
-        </pc:spChg>
-        <pc:spChg chg="add mod">
-          <ac:chgData name="TI LF Soares" userId="e2d67a61776f6d56" providerId="LiveId" clId="{65F03B7F-3AB7-417A-869D-682E7AF1C8BE}" dt="2024-02-01T02:07:52.897" v="44" actId="113"/>
-          <ac:spMkLst>
-            <pc:docMk/>
-            <pc:sldMk cId="3778653310" sldId="274"/>
-            <ac:spMk id="6" creationId="{C149192B-2136-AACA-1EC1-E1E361B14E19}"/>
-          </ac:spMkLst>
-        </pc:spChg>
-        <pc:spChg chg="mod">
-          <ac:chgData name="TI LF Soares" userId="e2d67a61776f6d56" providerId="LiveId" clId="{65F03B7F-3AB7-417A-869D-682E7AF1C8BE}" dt="2024-02-01T02:05:33.128" v="3" actId="1076"/>
-          <ac:spMkLst>
-            <pc:docMk/>
-            <pc:sldMk cId="3778653310" sldId="274"/>
-            <ac:spMk id="7" creationId="{00000000-0000-0000-0000-000000000000}"/>
-          </ac:spMkLst>
-        </pc:spChg>
-        <pc:spChg chg="mod">
-          <ac:chgData name="TI LF Soares" userId="e2d67a61776f6d56" providerId="LiveId" clId="{65F03B7F-3AB7-417A-869D-682E7AF1C8BE}" dt="2024-02-01T02:08:20.458" v="57" actId="20577"/>
-          <ac:spMkLst>
-            <pc:docMk/>
-            <pc:sldMk cId="3778653310" sldId="274"/>
-            <ac:spMk id="13" creationId="{00000000-0000-0000-0000-000000000000}"/>
-          </ac:spMkLst>
-        </pc:spChg>
-      </pc:sldChg>
-      <pc:sldChg chg="modSp add mod">
-        <pc:chgData name="TI LF Soares" userId="e2d67a61776f6d56" providerId="LiveId" clId="{65F03B7F-3AB7-417A-869D-682E7AF1C8BE}" dt="2024-02-01T03:14:39.377" v="93" actId="20577"/>
-        <pc:sldMkLst>
-          <pc:docMk/>
-          <pc:sldMk cId="918981318" sldId="275"/>
-        </pc:sldMkLst>
-        <pc:spChg chg="mod">
-          <ac:chgData name="TI LF Soares" userId="e2d67a61776f6d56" providerId="LiveId" clId="{65F03B7F-3AB7-417A-869D-682E7AF1C8BE}" dt="2024-02-01T03:14:39.377" v="93" actId="20577"/>
-          <ac:spMkLst>
-            <pc:docMk/>
-            <pc:sldMk cId="918981318" sldId="275"/>
-            <ac:spMk id="5" creationId="{B7902C3D-2498-859B-69FE-600F8490C5DF}"/>
-          </ac:spMkLst>
-        </pc:spChg>
-        <pc:spChg chg="mod">
-          <ac:chgData name="TI LF Soares" userId="e2d67a61776f6d56" providerId="LiveId" clId="{65F03B7F-3AB7-417A-869D-682E7AF1C8BE}" dt="2024-02-01T02:08:25.613" v="63" actId="20577"/>
-          <ac:spMkLst>
-            <pc:docMk/>
-            <pc:sldMk cId="918981318" sldId="275"/>
-            <ac:spMk id="13" creationId="{00000000-0000-0000-0000-000000000000}"/>
-          </ac:spMkLst>
-        </pc:spChg>
-      </pc:sldChg>
-      <pc:sldChg chg="modSp add mod">
-        <pc:chgData name="TI LF Soares" userId="e2d67a61776f6d56" providerId="LiveId" clId="{65F03B7F-3AB7-417A-869D-682E7AF1C8BE}" dt="2024-02-01T03:14:48.563" v="95" actId="20577"/>
-        <pc:sldMkLst>
-          <pc:docMk/>
-          <pc:sldMk cId="2200340408" sldId="276"/>
-        </pc:sldMkLst>
-        <pc:spChg chg="mod">
-          <ac:chgData name="TI LF Soares" userId="e2d67a61776f6d56" providerId="LiveId" clId="{65F03B7F-3AB7-417A-869D-682E7AF1C8BE}" dt="2024-02-01T03:14:48.563" v="95" actId="20577"/>
-          <ac:spMkLst>
-            <pc:docMk/>
-            <pc:sldMk cId="2200340408" sldId="276"/>
-            <ac:spMk id="5" creationId="{B7902C3D-2498-859B-69FE-600F8490C5DF}"/>
-          </ac:spMkLst>
-        </pc:spChg>
-        <pc:spChg chg="mod">
-          <ac:chgData name="TI LF Soares" userId="e2d67a61776f6d56" providerId="LiveId" clId="{65F03B7F-3AB7-417A-869D-682E7AF1C8BE}" dt="2024-02-01T02:08:32.299" v="69" actId="20577"/>
-          <ac:spMkLst>
-            <pc:docMk/>
-            <pc:sldMk cId="2200340408" sldId="276"/>
-            <ac:spMk id="13" creationId="{00000000-0000-0000-0000-000000000000}"/>
-          </ac:spMkLst>
-        </pc:spChg>
-      </pc:sldChg>
-      <pc:sldChg chg="modSp add mod">
-        <pc:chgData name="TI LF Soares" userId="e2d67a61776f6d56" providerId="LiveId" clId="{65F03B7F-3AB7-417A-869D-682E7AF1C8BE}" dt="2024-02-01T03:14:54.969" v="97" actId="20577"/>
-        <pc:sldMkLst>
-          <pc:docMk/>
-          <pc:sldMk cId="93904233" sldId="277"/>
-        </pc:sldMkLst>
-        <pc:spChg chg="mod">
-          <ac:chgData name="TI LF Soares" userId="e2d67a61776f6d56" providerId="LiveId" clId="{65F03B7F-3AB7-417A-869D-682E7AF1C8BE}" dt="2024-02-01T03:14:54.969" v="97" actId="20577"/>
-          <ac:spMkLst>
-            <pc:docMk/>
-            <pc:sldMk cId="93904233" sldId="277"/>
-            <ac:spMk id="5" creationId="{B7902C3D-2498-859B-69FE-600F8490C5DF}"/>
-          </ac:spMkLst>
-        </pc:spChg>
-        <pc:spChg chg="mod">
-          <ac:chgData name="TI LF Soares" userId="e2d67a61776f6d56" providerId="LiveId" clId="{65F03B7F-3AB7-417A-869D-682E7AF1C8BE}" dt="2024-02-01T02:08:39.346" v="75" actId="20577"/>
-          <ac:spMkLst>
-            <pc:docMk/>
-            <pc:sldMk cId="93904233" sldId="277"/>
-            <ac:spMk id="13" creationId="{00000000-0000-0000-0000-000000000000}"/>
-          </ac:spMkLst>
-        </pc:spChg>
-      </pc:sldChg>
-      <pc:sldChg chg="modSp add mod">
-        <pc:chgData name="TI LF Soares" userId="e2d67a61776f6d56" providerId="LiveId" clId="{65F03B7F-3AB7-417A-869D-682E7AF1C8BE}" dt="2024-02-01T03:15:00.609" v="98"/>
-        <pc:sldMkLst>
-          <pc:docMk/>
-          <pc:sldMk cId="997846852" sldId="278"/>
-        </pc:sldMkLst>
-        <pc:spChg chg="mod">
-          <ac:chgData name="TI LF Soares" userId="e2d67a61776f6d56" providerId="LiveId" clId="{65F03B7F-3AB7-417A-869D-682E7AF1C8BE}" dt="2024-02-01T03:15:00.609" v="98"/>
-          <ac:spMkLst>
-            <pc:docMk/>
-            <pc:sldMk cId="997846852" sldId="278"/>
-            <ac:spMk id="5" creationId="{B7902C3D-2498-859B-69FE-600F8490C5DF}"/>
-          </ac:spMkLst>
-        </pc:spChg>
-        <pc:spChg chg="mod">
-          <ac:chgData name="TI LF Soares" userId="e2d67a61776f6d56" providerId="LiveId" clId="{65F03B7F-3AB7-417A-869D-682E7AF1C8BE}" dt="2024-02-01T02:08:44.238" v="81" actId="20577"/>
-          <ac:spMkLst>
-            <pc:docMk/>
-            <pc:sldMk cId="997846852" sldId="278"/>
-            <ac:spMk id="13" creationId="{00000000-0000-0000-0000-000000000000}"/>
-          </ac:spMkLst>
-        </pc:spChg>
-      </pc:sldChg>
-      <pc:sldChg chg="modSp add mod">
-        <pc:chgData name="TI LF Soares" userId="e2d67a61776f6d56" providerId="LiveId" clId="{65F03B7F-3AB7-417A-869D-682E7AF1C8BE}" dt="2024-02-01T03:15:09.373" v="100" actId="20577"/>
-        <pc:sldMkLst>
-          <pc:docMk/>
-          <pc:sldMk cId="2461848014" sldId="279"/>
-        </pc:sldMkLst>
-        <pc:spChg chg="mod">
-          <ac:chgData name="TI LF Soares" userId="e2d67a61776f6d56" providerId="LiveId" clId="{65F03B7F-3AB7-417A-869D-682E7AF1C8BE}" dt="2024-02-01T03:15:09.373" v="100" actId="20577"/>
-          <ac:spMkLst>
-            <pc:docMk/>
-            <pc:sldMk cId="2461848014" sldId="279"/>
-            <ac:spMk id="5" creationId="{B7902C3D-2498-859B-69FE-600F8490C5DF}"/>
-          </ac:spMkLst>
-        </pc:spChg>
-        <pc:spChg chg="mod">
-          <ac:chgData name="TI LF Soares" userId="e2d67a61776f6d56" providerId="LiveId" clId="{65F03B7F-3AB7-417A-869D-682E7AF1C8BE}" dt="2024-02-01T02:08:49.112" v="87" actId="20577"/>
-          <ac:spMkLst>
-            <pc:docMk/>
-            <pc:sldMk cId="2461848014" sldId="279"/>
-            <ac:spMk id="13" creationId="{00000000-0000-0000-0000-000000000000}"/>
-          </ac:spMkLst>
-        </pc:spChg>
-      </pc:sldChg>
-      <pc:sldChg chg="add del">
-        <pc:chgData name="TI LF Soares" userId="e2d67a61776f6d56" providerId="LiveId" clId="{65F03B7F-3AB7-417A-869D-682E7AF1C8BE}" dt="2024-02-01T02:08:12.924" v="51" actId="47"/>
-        <pc:sldMkLst>
-          <pc:docMk/>
-          <pc:sldMk cId="2372452017" sldId="280"/>
-        </pc:sldMkLst>
-      </pc:sldChg>
-    </pc:docChg>
-  </pc:docChgLst>
-  <pc:docChgLst>
-    <pc:chgData name="Administrativo LF Soares" userId="5936b4d739895294" providerId="LiveId" clId="{B3091135-0012-4AAB-A9DB-A48B66E5C9AC}"/>
-    <pc:docChg chg="undo custSel modSld">
-      <pc:chgData name="Administrativo LF Soares" userId="5936b4d739895294" providerId="LiveId" clId="{B3091135-0012-4AAB-A9DB-A48B66E5C9AC}" dt="2024-10-03T13:35:47.343" v="104" actId="20577"/>
-      <pc:docMkLst>
-        <pc:docMk/>
-      </pc:docMkLst>
-      <pc:sldChg chg="modSp mod">
-        <pc:chgData name="Administrativo LF Soares" userId="5936b4d739895294" providerId="LiveId" clId="{B3091135-0012-4AAB-A9DB-A48B66E5C9AC}" dt="2024-10-03T13:35:47.343" v="104" actId="20577"/>
-        <pc:sldMkLst>
-          <pc:docMk/>
-          <pc:sldMk cId="3778653310" sldId="274"/>
-        </pc:sldMkLst>
-        <pc:spChg chg="mod">
-          <ac:chgData name="Administrativo LF Soares" userId="5936b4d739895294" providerId="LiveId" clId="{B3091135-0012-4AAB-A9DB-A48B66E5C9AC}" dt="2024-10-03T13:35:14.814" v="83" actId="1076"/>
-          <ac:spMkLst>
-            <pc:docMk/>
-            <pc:sldMk cId="3778653310" sldId="274"/>
-            <ac:spMk id="3" creationId="{00000000-0000-0000-0000-000000000000}"/>
-          </ac:spMkLst>
-        </pc:spChg>
-        <pc:spChg chg="mod">
-          <ac:chgData name="Administrativo LF Soares" userId="5936b4d739895294" providerId="LiveId" clId="{B3091135-0012-4AAB-A9DB-A48B66E5C9AC}" dt="2024-10-03T13:35:14.814" v="83" actId="1076"/>
-          <ac:spMkLst>
-            <pc:docMk/>
-            <pc:sldMk cId="3778653310" sldId="274"/>
-            <ac:spMk id="6" creationId="{A48F3DDB-609D-DE28-A4D3-088FFE387F11}"/>
-          </ac:spMkLst>
-        </pc:spChg>
-        <pc:spChg chg="mod">
-          <ac:chgData name="Administrativo LF Soares" userId="5936b4d739895294" providerId="LiveId" clId="{B3091135-0012-4AAB-A9DB-A48B66E5C9AC}" dt="2024-10-03T13:30:59.129" v="29" actId="20577"/>
-          <ac:spMkLst>
-            <pc:docMk/>
-            <pc:sldMk cId="3778653310" sldId="274"/>
-            <ac:spMk id="7" creationId="{00000000-0000-0000-0000-000000000000}"/>
-          </ac:spMkLst>
-        </pc:spChg>
-        <pc:spChg chg="mod">
-          <ac:chgData name="Administrativo LF Soares" userId="5936b4d739895294" providerId="LiveId" clId="{B3091135-0012-4AAB-A9DB-A48B66E5C9AC}" dt="2024-10-03T13:35:19.106" v="84" actId="1076"/>
-          <ac:spMkLst>
-            <pc:docMk/>
-            <pc:sldMk cId="3778653310" sldId="274"/>
-            <ac:spMk id="9" creationId="{00000000-0000-0000-0000-000000000000}"/>
-          </ac:spMkLst>
-        </pc:spChg>
-        <pc:spChg chg="mod">
-          <ac:chgData name="Administrativo LF Soares" userId="5936b4d739895294" providerId="LiveId" clId="{B3091135-0012-4AAB-A9DB-A48B66E5C9AC}" dt="2024-10-03T13:31:21.452" v="61" actId="1076"/>
-          <ac:spMkLst>
-            <pc:docMk/>
-            <pc:sldMk cId="3778653310" sldId="274"/>
-            <ac:spMk id="12" creationId="{7BE4ABEE-F911-EE6D-A643-25A2DAD4F1A6}"/>
-          </ac:spMkLst>
-        </pc:spChg>
-        <pc:spChg chg="mod">
-          <ac:chgData name="Administrativo LF Soares" userId="5936b4d739895294" providerId="LiveId" clId="{B3091135-0012-4AAB-A9DB-A48B66E5C9AC}" dt="2024-10-03T13:32:40.636" v="70" actId="20577"/>
-          <ac:spMkLst>
-            <pc:docMk/>
-            <pc:sldMk cId="3778653310" sldId="274"/>
-            <ac:spMk id="18" creationId="{21238E25-695B-6949-3B1F-C5DB23BC9A09}"/>
-          </ac:spMkLst>
-        </pc:spChg>
-        <pc:graphicFrameChg chg="mod modGraphic">
-          <ac:chgData name="Administrativo LF Soares" userId="5936b4d739895294" providerId="LiveId" clId="{B3091135-0012-4AAB-A9DB-A48B66E5C9AC}" dt="2024-10-03T13:35:47.343" v="104" actId="20577"/>
-          <ac:graphicFrameMkLst>
-            <pc:docMk/>
-            <pc:sldMk cId="3778653310" sldId="274"/>
-            <ac:graphicFrameMk id="16" creationId="{7CE370CC-9FA0-3517-1298-AA2AD72AF46B}"/>
-          </ac:graphicFrameMkLst>
-        </pc:graphicFrameChg>
-        <pc:graphicFrameChg chg="mod modGraphic">
-          <ac:chgData name="Administrativo LF Soares" userId="5936b4d739895294" providerId="LiveId" clId="{B3091135-0012-4AAB-A9DB-A48B66E5C9AC}" dt="2024-10-03T13:35:42.115" v="94" actId="20577"/>
-          <ac:graphicFrameMkLst>
-            <pc:docMk/>
-            <pc:sldMk cId="3778653310" sldId="274"/>
-            <ac:graphicFrameMk id="24" creationId="{8F267223-DB1D-5F9D-2CBA-158C064E4D34}"/>
-          </ac:graphicFrameMkLst>
-        </pc:graphicFrameChg>
-      </pc:sldChg>
-    </pc:docChg>
-  </pc:docChgLst>
-  <pc:docChgLst>
-    <pc:chgData name="TI LF Soares" userId="e2d67a61776f6d56" providerId="LiveId" clId="{E213CB28-B8D6-4D2B-AFD0-0F606C71A707}"/>
-    <pc:docChg chg="undo redo custSel delSld modSld">
-      <pc:chgData name="TI LF Soares" userId="e2d67a61776f6d56" providerId="LiveId" clId="{E213CB28-B8D6-4D2B-AFD0-0F606C71A707}" dt="2024-04-16T18:45:38.250" v="64" actId="1076"/>
-      <pc:docMkLst>
-        <pc:docMk/>
-      </pc:docMkLst>
-      <pc:sldChg chg="addSp delSp modSp mod">
-        <pc:chgData name="TI LF Soares" userId="e2d67a61776f6d56" providerId="LiveId" clId="{E213CB28-B8D6-4D2B-AFD0-0F606C71A707}" dt="2024-04-16T18:45:38.250" v="64" actId="1076"/>
-        <pc:sldMkLst>
-          <pc:docMk/>
-          <pc:sldMk cId="3778653310" sldId="274"/>
-        </pc:sldMkLst>
-        <pc:spChg chg="del">
-          <ac:chgData name="TI LF Soares" userId="e2d67a61776f6d56" providerId="LiveId" clId="{E213CB28-B8D6-4D2B-AFD0-0F606C71A707}" dt="2024-04-16T18:43:18.971" v="14" actId="478"/>
-          <ac:spMkLst>
-            <pc:docMk/>
-            <pc:sldMk cId="3778653310" sldId="274"/>
-            <ac:spMk id="2" creationId="{FB828BBD-E731-2915-5A46-60F22269C77E}"/>
-          </ac:spMkLst>
-        </pc:spChg>
-        <pc:spChg chg="mod">
-          <ac:chgData name="TI LF Soares" userId="e2d67a61776f6d56" providerId="LiveId" clId="{E213CB28-B8D6-4D2B-AFD0-0F606C71A707}" dt="2024-04-16T18:45:38.250" v="64" actId="1076"/>
-          <ac:spMkLst>
-            <pc:docMk/>
-            <pc:sldMk cId="3778653310" sldId="274"/>
-            <ac:spMk id="3" creationId="{00000000-0000-0000-0000-000000000000}"/>
-          </ac:spMkLst>
-        </pc:spChg>
-        <pc:spChg chg="mod">
-          <ac:chgData name="TI LF Soares" userId="e2d67a61776f6d56" providerId="LiveId" clId="{E213CB28-B8D6-4D2B-AFD0-0F606C71A707}" dt="2024-04-16T18:43:27.282" v="16" actId="1076"/>
-          <ac:spMkLst>
-            <pc:docMk/>
-            <pc:sldMk cId="3778653310" sldId="274"/>
-            <ac:spMk id="4" creationId="{013A25A7-3799-5A9B-D548-4837552A167C}"/>
-          </ac:spMkLst>
-        </pc:spChg>
-        <pc:spChg chg="mod">
-          <ac:chgData name="TI LF Soares" userId="e2d67a61776f6d56" providerId="LiveId" clId="{E213CB28-B8D6-4D2B-AFD0-0F606C71A707}" dt="2024-04-16T18:43:31.672" v="17" actId="1076"/>
-          <ac:spMkLst>
-            <pc:docMk/>
-            <pc:sldMk cId="3778653310" sldId="274"/>
-            <ac:spMk id="7" creationId="{00000000-0000-0000-0000-000000000000}"/>
-          </ac:spMkLst>
-        </pc:spChg>
-        <pc:spChg chg="add del">
-          <ac:chgData name="TI LF Soares" userId="e2d67a61776f6d56" providerId="LiveId" clId="{E213CB28-B8D6-4D2B-AFD0-0F606C71A707}" dt="2024-04-16T18:43:57.219" v="21" actId="22"/>
-          <ac:spMkLst>
-            <pc:docMk/>
-            <pc:sldMk cId="3778653310" sldId="274"/>
-            <ac:spMk id="8" creationId="{1FB7D073-ECE2-2025-1305-BE0DB36AFB2F}"/>
-          </ac:spMkLst>
-        </pc:spChg>
-        <pc:spChg chg="add mod">
-          <ac:chgData name="TI LF Soares" userId="e2d67a61776f6d56" providerId="LiveId" clId="{E213CB28-B8D6-4D2B-AFD0-0F606C71A707}" dt="2024-04-16T18:44:21.762" v="33" actId="113"/>
-          <ac:spMkLst>
-            <pc:docMk/>
-            <pc:sldMk cId="3778653310" sldId="274"/>
-            <ac:spMk id="11" creationId="{E50647F5-0669-BFCC-0545-D586AF02E93F}"/>
-          </ac:spMkLst>
-        </pc:spChg>
-        <pc:spChg chg="del">
-          <ac:chgData name="TI LF Soares" userId="e2d67a61776f6d56" providerId="LiveId" clId="{E213CB28-B8D6-4D2B-AFD0-0F606C71A707}" dt="2024-04-16T18:43:47.452" v="18" actId="478"/>
-          <ac:spMkLst>
-            <pc:docMk/>
-            <pc:sldMk cId="3778653310" sldId="274"/>
-            <ac:spMk id="13" creationId="{00000000-0000-0000-0000-000000000000}"/>
-          </ac:spMkLst>
-        </pc:spChg>
-      </pc:sldChg>
-      <pc:sldChg chg="del">
-        <pc:chgData name="TI LF Soares" userId="e2d67a61776f6d56" providerId="LiveId" clId="{E213CB28-B8D6-4D2B-AFD0-0F606C71A707}" dt="2024-04-16T18:43:01.430" v="13" actId="47"/>
-        <pc:sldMkLst>
-          <pc:docMk/>
-          <pc:sldMk cId="1112517648" sldId="275"/>
-        </pc:sldMkLst>
-      </pc:sldChg>
-      <pc:sldChg chg="del">
-        <pc:chgData name="TI LF Soares" userId="e2d67a61776f6d56" providerId="LiveId" clId="{E213CB28-B8D6-4D2B-AFD0-0F606C71A707}" dt="2024-04-16T18:43:00.868" v="12" actId="47"/>
-        <pc:sldMkLst>
-          <pc:docMk/>
-          <pc:sldMk cId="435341288" sldId="276"/>
-        </pc:sldMkLst>
-      </pc:sldChg>
-      <pc:sldChg chg="del">
-        <pc:chgData name="TI LF Soares" userId="e2d67a61776f6d56" providerId="LiveId" clId="{E213CB28-B8D6-4D2B-AFD0-0F606C71A707}" dt="2024-04-16T18:43:00.728" v="11" actId="47"/>
-        <pc:sldMkLst>
-          <pc:docMk/>
-          <pc:sldMk cId="2189579610" sldId="277"/>
-        </pc:sldMkLst>
-      </pc:sldChg>
-      <pc:sldChg chg="del">
-        <pc:chgData name="TI LF Soares" userId="e2d67a61776f6d56" providerId="LiveId" clId="{E213CB28-B8D6-4D2B-AFD0-0F606C71A707}" dt="2024-04-16T18:43:00.603" v="10" actId="47"/>
-        <pc:sldMkLst>
-          <pc:docMk/>
-          <pc:sldMk cId="2890059367" sldId="278"/>
-        </pc:sldMkLst>
-      </pc:sldChg>
-      <pc:sldChg chg="del">
-        <pc:chgData name="TI LF Soares" userId="e2d67a61776f6d56" providerId="LiveId" clId="{E213CB28-B8D6-4D2B-AFD0-0F606C71A707}" dt="2024-04-16T18:43:00.181" v="9" actId="47"/>
-        <pc:sldMkLst>
-          <pc:docMk/>
-          <pc:sldMk cId="1742123399" sldId="279"/>
-        </pc:sldMkLst>
-      </pc:sldChg>
-      <pc:sldChg chg="del">
-        <pc:chgData name="TI LF Soares" userId="e2d67a61776f6d56" providerId="LiveId" clId="{E213CB28-B8D6-4D2B-AFD0-0F606C71A707}" dt="2024-04-16T18:42:59.978" v="8" actId="47"/>
-        <pc:sldMkLst>
-          <pc:docMk/>
-          <pc:sldMk cId="1381395635" sldId="280"/>
-        </pc:sldMkLst>
-      </pc:sldChg>
-      <pc:sldChg chg="del">
-        <pc:chgData name="TI LF Soares" userId="e2d67a61776f6d56" providerId="LiveId" clId="{E213CB28-B8D6-4D2B-AFD0-0F606C71A707}" dt="2024-04-16T18:42:59.759" v="7" actId="47"/>
-        <pc:sldMkLst>
-          <pc:docMk/>
-          <pc:sldMk cId="3426843383" sldId="281"/>
-        </pc:sldMkLst>
-      </pc:sldChg>
-      <pc:sldChg chg="del">
-        <pc:chgData name="TI LF Soares" userId="e2d67a61776f6d56" providerId="LiveId" clId="{E213CB28-B8D6-4D2B-AFD0-0F606C71A707}" dt="2024-04-16T18:42:59.587" v="6" actId="47"/>
-        <pc:sldMkLst>
-          <pc:docMk/>
-          <pc:sldMk cId="22884751" sldId="282"/>
-        </pc:sldMkLst>
-      </pc:sldChg>
-      <pc:sldChg chg="del">
-        <pc:chgData name="TI LF Soares" userId="e2d67a61776f6d56" providerId="LiveId" clId="{E213CB28-B8D6-4D2B-AFD0-0F606C71A707}" dt="2024-04-16T18:42:59.431" v="5" actId="47"/>
-        <pc:sldMkLst>
-          <pc:docMk/>
-          <pc:sldMk cId="2130997476" sldId="283"/>
-        </pc:sldMkLst>
-      </pc:sldChg>
-      <pc:sldChg chg="del">
-        <pc:chgData name="TI LF Soares" userId="e2d67a61776f6d56" providerId="LiveId" clId="{E213CB28-B8D6-4D2B-AFD0-0F606C71A707}" dt="2024-04-16T18:42:59.259" v="4" actId="47"/>
-        <pc:sldMkLst>
-          <pc:docMk/>
-          <pc:sldMk cId="1857554227" sldId="284"/>
-        </pc:sldMkLst>
-      </pc:sldChg>
-      <pc:sldChg chg="del">
-        <pc:chgData name="TI LF Soares" userId="e2d67a61776f6d56" providerId="LiveId" clId="{E213CB28-B8D6-4D2B-AFD0-0F606C71A707}" dt="2024-04-16T18:42:59.119" v="3" actId="47"/>
-        <pc:sldMkLst>
-          <pc:docMk/>
-          <pc:sldMk cId="3785237022" sldId="285"/>
-        </pc:sldMkLst>
-      </pc:sldChg>
-      <pc:sldChg chg="del">
-        <pc:chgData name="TI LF Soares" userId="e2d67a61776f6d56" providerId="LiveId" clId="{E213CB28-B8D6-4D2B-AFD0-0F606C71A707}" dt="2024-04-16T18:42:58.962" v="2" actId="47"/>
-        <pc:sldMkLst>
-          <pc:docMk/>
-          <pc:sldMk cId="267469712" sldId="286"/>
-        </pc:sldMkLst>
-      </pc:sldChg>
-      <pc:sldChg chg="del">
-        <pc:chgData name="TI LF Soares" userId="e2d67a61776f6d56" providerId="LiveId" clId="{E213CB28-B8D6-4D2B-AFD0-0F606C71A707}" dt="2024-04-16T18:42:58.775" v="1" actId="47"/>
-        <pc:sldMkLst>
-          <pc:docMk/>
-          <pc:sldMk cId="988440475" sldId="287"/>
-        </pc:sldMkLst>
-      </pc:sldChg>
-      <pc:sldChg chg="del">
-        <pc:chgData name="TI LF Soares" userId="e2d67a61776f6d56" providerId="LiveId" clId="{E213CB28-B8D6-4D2B-AFD0-0F606C71A707}" dt="2024-04-16T18:42:58.681" v="0" actId="47"/>
-        <pc:sldMkLst>
-          <pc:docMk/>
-          <pc:sldMk cId="211274229" sldId="288"/>
-        </pc:sldMkLst>
-      </pc:sldChg>
-    </pc:docChg>
-  </pc:docChgLst>
-  <pc:docChgLst>
-    <pc:chgData name="TI LF Soares" userId="e2d67a61776f6d56" providerId="LiveId" clId="{D08DF5F5-78ED-4F2F-A99F-225EA9657270}"/>
-    <pc:docChg chg="undo custSel modSld">
-      <pc:chgData name="TI LF Soares" userId="e2d67a61776f6d56" providerId="LiveId" clId="{D08DF5F5-78ED-4F2F-A99F-225EA9657270}" dt="2024-05-08T21:16:50.373" v="196" actId="1076"/>
-      <pc:docMkLst>
-        <pc:docMk/>
-      </pc:docMkLst>
-      <pc:sldChg chg="addSp delSp modSp mod">
-        <pc:chgData name="TI LF Soares" userId="e2d67a61776f6d56" providerId="LiveId" clId="{D08DF5F5-78ED-4F2F-A99F-225EA9657270}" dt="2024-05-08T21:16:50.373" v="196" actId="1076"/>
-        <pc:sldMkLst>
-          <pc:docMk/>
-          <pc:sldMk cId="3778653310" sldId="274"/>
-        </pc:sldMkLst>
-        <pc:spChg chg="mod">
-          <ac:chgData name="TI LF Soares" userId="e2d67a61776f6d56" providerId="LiveId" clId="{D08DF5F5-78ED-4F2F-A99F-225EA9657270}" dt="2024-05-08T21:11:38.690" v="98" actId="1076"/>
-          <ac:spMkLst>
-            <pc:docMk/>
-            <pc:sldMk cId="3778653310" sldId="274"/>
-            <ac:spMk id="3" creationId="{00000000-0000-0000-0000-000000000000}"/>
-          </ac:spMkLst>
-        </pc:spChg>
-        <pc:spChg chg="mod">
-          <ac:chgData name="TI LF Soares" userId="e2d67a61776f6d56" providerId="LiveId" clId="{D08DF5F5-78ED-4F2F-A99F-225EA9657270}" dt="2024-05-08T21:16:48.215" v="195" actId="1076"/>
-          <ac:spMkLst>
-            <pc:docMk/>
-            <pc:sldMk cId="3778653310" sldId="274"/>
-            <ac:spMk id="4" creationId="{013A25A7-3799-5A9B-D548-4837552A167C}"/>
-          </ac:spMkLst>
-        </pc:spChg>
-        <pc:spChg chg="mod">
-          <ac:chgData name="TI LF Soares" userId="e2d67a61776f6d56" providerId="LiveId" clId="{D08DF5F5-78ED-4F2F-A99F-225EA9657270}" dt="2024-05-08T21:10:13.670" v="76" actId="20577"/>
-          <ac:spMkLst>
-            <pc:docMk/>
-            <pc:sldMk cId="3778653310" sldId="274"/>
-            <ac:spMk id="5" creationId="{B7902C3D-2498-859B-69FE-600F8490C5DF}"/>
-          </ac:spMkLst>
-        </pc:spChg>
-        <pc:spChg chg="add del">
-          <ac:chgData name="TI LF Soares" userId="e2d67a61776f6d56" providerId="LiveId" clId="{D08DF5F5-78ED-4F2F-A99F-225EA9657270}" dt="2024-05-08T21:08:00.379" v="47" actId="22"/>
-          <ac:spMkLst>
-            <pc:docMk/>
-            <pc:sldMk cId="3778653310" sldId="274"/>
-            <ac:spMk id="6" creationId="{33120935-CABB-4917-5D43-0044045E5313}"/>
-          </ac:spMkLst>
-        </pc:spChg>
-        <pc:spChg chg="mod">
-          <ac:chgData name="TI LF Soares" userId="e2d67a61776f6d56" providerId="LiveId" clId="{D08DF5F5-78ED-4F2F-A99F-225EA9657270}" dt="2024-05-08T21:16:50.373" v="196" actId="1076"/>
-          <ac:spMkLst>
-            <pc:docMk/>
-            <pc:sldMk cId="3778653310" sldId="274"/>
-            <ac:spMk id="7" creationId="{00000000-0000-0000-0000-000000000000}"/>
-          </ac:spMkLst>
-        </pc:spChg>
-        <pc:spChg chg="mod">
-          <ac:chgData name="TI LF Soares" userId="e2d67a61776f6d56" providerId="LiveId" clId="{D08DF5F5-78ED-4F2F-A99F-225EA9657270}" dt="2024-05-08T21:11:54.890" v="100" actId="14100"/>
-          <ac:spMkLst>
-            <pc:docMk/>
-            <pc:sldMk cId="3778653310" sldId="274"/>
-            <ac:spMk id="9" creationId="{00000000-0000-0000-0000-000000000000}"/>
-          </ac:spMkLst>
-        </pc:spChg>
-        <pc:spChg chg="add mod">
-          <ac:chgData name="TI LF Soares" userId="e2d67a61776f6d56" providerId="LiveId" clId="{D08DF5F5-78ED-4F2F-A99F-225EA9657270}" dt="2024-05-08T21:14:50.485" v="163" actId="14100"/>
-          <ac:spMkLst>
-            <pc:docMk/>
-            <pc:sldMk cId="3778653310" sldId="274"/>
-            <ac:spMk id="10" creationId="{260D0634-3BA8-0793-BC66-F00FFEEAA575}"/>
-          </ac:spMkLst>
-        </pc:spChg>
-        <pc:spChg chg="mod">
-          <ac:chgData name="TI LF Soares" userId="e2d67a61776f6d56" providerId="LiveId" clId="{D08DF5F5-78ED-4F2F-A99F-225EA9657270}" dt="2024-05-08T21:10:38.621" v="89" actId="1076"/>
-          <ac:spMkLst>
-            <pc:docMk/>
-            <pc:sldMk cId="3778653310" sldId="274"/>
-            <ac:spMk id="11" creationId="{E50647F5-0669-BFCC-0545-D586AF02E93F}"/>
-          </ac:spMkLst>
-        </pc:spChg>
-        <pc:spChg chg="add mod">
-          <ac:chgData name="TI LF Soares" userId="e2d67a61776f6d56" providerId="LiveId" clId="{D08DF5F5-78ED-4F2F-A99F-225EA9657270}" dt="2024-05-08T21:16:42.871" v="193" actId="1076"/>
-          <ac:spMkLst>
-            <pc:docMk/>
-            <pc:sldMk cId="3778653310" sldId="274"/>
-            <ac:spMk id="12" creationId="{7BE4ABEE-F911-EE6D-A643-25A2DAD4F1A6}"/>
-          </ac:spMkLst>
-        </pc:spChg>
-        <pc:spChg chg="add mod">
-          <ac:chgData name="TI LF Soares" userId="e2d67a61776f6d56" providerId="LiveId" clId="{D08DF5F5-78ED-4F2F-A99F-225EA9657270}" dt="2024-05-08T21:16:46.449" v="194" actId="1076"/>
-          <ac:spMkLst>
-            <pc:docMk/>
-            <pc:sldMk cId="3778653310" sldId="274"/>
-            <ac:spMk id="13" creationId="{164A8955-370A-CA4C-D0F4-082488A3A1F1}"/>
-          </ac:spMkLst>
-        </pc:spChg>
-      </pc:sldChg>
-    </pc:docChg>
-  </pc:docChgLst>
-  <pc:docChgLst>
-    <pc:chgData name="Kallil Souza" userId="2712f34d16a29d99" providerId="LiveId" clId="{D4747FB4-316B-4228-8EAA-AE7D688F9D42}"/>
-    <pc:docChg chg="addSld modSld">
-      <pc:chgData name="Kallil Souza" userId="2712f34d16a29d99" providerId="LiveId" clId="{D4747FB4-316B-4228-8EAA-AE7D688F9D42}" dt="2023-10-05T19:12:39.145" v="5" actId="20577"/>
-      <pc:docMkLst>
-        <pc:docMk/>
-      </pc:docMkLst>
-      <pc:sldChg chg="modSp add mod">
-        <pc:chgData name="Kallil Souza" userId="2712f34d16a29d99" providerId="LiveId" clId="{D4747FB4-316B-4228-8EAA-AE7D688F9D42}" dt="2023-10-05T19:12:32.364" v="3" actId="20577"/>
-        <pc:sldMkLst>
-          <pc:docMk/>
-          <pc:sldMk cId="2253974807" sldId="271"/>
-        </pc:sldMkLst>
-        <pc:spChg chg="mod">
-          <ac:chgData name="Kallil Souza" userId="2712f34d16a29d99" providerId="LiveId" clId="{D4747FB4-316B-4228-8EAA-AE7D688F9D42}" dt="2023-10-05T19:12:32.364" v="3" actId="20577"/>
-          <ac:spMkLst>
-            <pc:docMk/>
-            <pc:sldMk cId="2253974807" sldId="271"/>
-            <ac:spMk id="13" creationId="{00000000-0000-0000-0000-000000000000}"/>
-          </ac:spMkLst>
-        </pc:spChg>
-      </pc:sldChg>
-      <pc:sldChg chg="modSp add mod">
-        <pc:chgData name="Kallil Souza" userId="2712f34d16a29d99" providerId="LiveId" clId="{D4747FB4-316B-4228-8EAA-AE7D688F9D42}" dt="2023-10-05T19:12:39.145" v="5" actId="20577"/>
-        <pc:sldMkLst>
-          <pc:docMk/>
-          <pc:sldMk cId="3285453802" sldId="272"/>
-        </pc:sldMkLst>
-        <pc:spChg chg="mod">
-          <ac:chgData name="Kallil Souza" userId="2712f34d16a29d99" providerId="LiveId" clId="{D4747FB4-316B-4228-8EAA-AE7D688F9D42}" dt="2023-10-05T19:12:39.145" v="5" actId="20577"/>
-          <ac:spMkLst>
-            <pc:docMk/>
-            <pc:sldMk cId="3285453802" sldId="272"/>
-            <ac:spMk id="13" creationId="{00000000-0000-0000-0000-000000000000}"/>
-          </ac:spMkLst>
-        </pc:spChg>
-      </pc:sldChg>
-    </pc:docChg>
-  </pc:docChgLst>
-  <pc:docChgLst>
-    <pc:chgData name="TI LF Soares" userId="e2d67a61776f6d56" providerId="LiveId" clId="{76FBF481-456A-4A2E-96F5-ACCB0A030A16}"/>
-    <pc:docChg chg="undo custSel addSld delSld modSld">
-      <pc:chgData name="TI LF Soares" userId="e2d67a61776f6d56" providerId="LiveId" clId="{76FBF481-456A-4A2E-96F5-ACCB0A030A16}" dt="2024-03-13T20:02:25.734" v="320" actId="20577"/>
-      <pc:docMkLst>
-        <pc:docMk/>
-      </pc:docMkLst>
-      <pc:sldChg chg="addSp modSp mod">
-        <pc:chgData name="TI LF Soares" userId="e2d67a61776f6d56" providerId="LiveId" clId="{76FBF481-456A-4A2E-96F5-ACCB0A030A16}" dt="2024-03-13T20:01:07.401" v="260" actId="20577"/>
-        <pc:sldMkLst>
-          <pc:docMk/>
-          <pc:sldMk cId="3778653310" sldId="274"/>
-        </pc:sldMkLst>
-        <pc:spChg chg="mod">
-          <ac:chgData name="TI LF Soares" userId="e2d67a61776f6d56" providerId="LiveId" clId="{76FBF481-456A-4A2E-96F5-ACCB0A030A16}" dt="2024-03-13T19:59:51.158" v="157" actId="20577"/>
-          <ac:spMkLst>
-            <pc:docMk/>
-            <pc:sldMk cId="3778653310" sldId="274"/>
-            <ac:spMk id="2" creationId="{FB828BBD-E731-2915-5A46-60F22269C77E}"/>
-          </ac:spMkLst>
-        </pc:spChg>
-        <pc:spChg chg="add mod">
-          <ac:chgData name="TI LF Soares" userId="e2d67a61776f6d56" providerId="LiveId" clId="{76FBF481-456A-4A2E-96F5-ACCB0A030A16}" dt="2024-03-13T20:00:50.776" v="254" actId="20577"/>
-          <ac:spMkLst>
-            <pc:docMk/>
-            <pc:sldMk cId="3778653310" sldId="274"/>
-            <ac:spMk id="4" creationId="{013A25A7-3799-5A9B-D548-4837552A167C}"/>
-          </ac:spMkLst>
-        </pc:spChg>
-        <pc:spChg chg="mod">
-          <ac:chgData name="TI LF Soares" userId="e2d67a61776f6d56" providerId="LiveId" clId="{76FBF481-456A-4A2E-96F5-ACCB0A030A16}" dt="2024-03-13T19:58:33.581" v="54" actId="1076"/>
-          <ac:spMkLst>
-            <pc:docMk/>
-            <pc:sldMk cId="3778653310" sldId="274"/>
-            <ac:spMk id="7" creationId="{00000000-0000-0000-0000-000000000000}"/>
-          </ac:spMkLst>
-        </pc:spChg>
-        <pc:spChg chg="mod">
-          <ac:chgData name="TI LF Soares" userId="e2d67a61776f6d56" providerId="LiveId" clId="{76FBF481-456A-4A2E-96F5-ACCB0A030A16}" dt="2024-03-13T20:01:07.401" v="260" actId="20577"/>
-          <ac:spMkLst>
-            <pc:docMk/>
-            <pc:sldMk cId="3778653310" sldId="274"/>
-            <ac:spMk id="13" creationId="{00000000-0000-0000-0000-000000000000}"/>
-          </ac:spMkLst>
-        </pc:spChg>
-      </pc:sldChg>
-      <pc:sldChg chg="modSp add mod">
-        <pc:chgData name="TI LF Soares" userId="e2d67a61776f6d56" providerId="LiveId" clId="{76FBF481-456A-4A2E-96F5-ACCB0A030A16}" dt="2024-03-13T20:01:21.976" v="276" actId="20577"/>
-        <pc:sldMkLst>
-          <pc:docMk/>
-          <pc:sldMk cId="1112517648" sldId="275"/>
-        </pc:sldMkLst>
-        <pc:spChg chg="mod">
-          <ac:chgData name="TI LF Soares" userId="e2d67a61776f6d56" providerId="LiveId" clId="{76FBF481-456A-4A2E-96F5-ACCB0A030A16}" dt="2024-03-13T20:01:21.976" v="276" actId="20577"/>
-          <ac:spMkLst>
-            <pc:docMk/>
-            <pc:sldMk cId="1112517648" sldId="275"/>
-            <ac:spMk id="13" creationId="{00000000-0000-0000-0000-000000000000}"/>
-          </ac:spMkLst>
-        </pc:spChg>
-      </pc:sldChg>
-      <pc:sldChg chg="del">
-        <pc:chgData name="TI LF Soares" userId="e2d67a61776f6d56" providerId="LiveId" clId="{76FBF481-456A-4A2E-96F5-ACCB0A030A16}" dt="2024-03-13T19:57:05.646" v="5" actId="47"/>
-        <pc:sldMkLst>
-          <pc:docMk/>
-          <pc:sldMk cId="3822603900" sldId="275"/>
-        </pc:sldMkLst>
-      </pc:sldChg>
-      <pc:sldChg chg="modSp add mod">
-        <pc:chgData name="TI LF Soares" userId="e2d67a61776f6d56" providerId="LiveId" clId="{76FBF481-456A-4A2E-96F5-ACCB0A030A16}" dt="2024-03-13T20:01:25.897" v="278" actId="20577"/>
-        <pc:sldMkLst>
-          <pc:docMk/>
-          <pc:sldMk cId="435341288" sldId="276"/>
-        </pc:sldMkLst>
-        <pc:spChg chg="mod">
-          <ac:chgData name="TI LF Soares" userId="e2d67a61776f6d56" providerId="LiveId" clId="{76FBF481-456A-4A2E-96F5-ACCB0A030A16}" dt="2024-03-13T20:01:25.897" v="278" actId="20577"/>
-          <ac:spMkLst>
-            <pc:docMk/>
-            <pc:sldMk cId="435341288" sldId="276"/>
-            <ac:spMk id="13" creationId="{00000000-0000-0000-0000-000000000000}"/>
-          </ac:spMkLst>
-        </pc:spChg>
-      </pc:sldChg>
-      <pc:sldChg chg="del">
-        <pc:chgData name="TI LF Soares" userId="e2d67a61776f6d56" providerId="LiveId" clId="{76FBF481-456A-4A2E-96F5-ACCB0A030A16}" dt="2024-03-13T19:57:05.521" v="4" actId="47"/>
-        <pc:sldMkLst>
-          <pc:docMk/>
-          <pc:sldMk cId="3796765463" sldId="276"/>
-        </pc:sldMkLst>
-      </pc:sldChg>
-      <pc:sldChg chg="modSp add mod">
-        <pc:chgData name="TI LF Soares" userId="e2d67a61776f6d56" providerId="LiveId" clId="{76FBF481-456A-4A2E-96F5-ACCB0A030A16}" dt="2024-03-13T20:01:30.475" v="280" actId="20577"/>
-        <pc:sldMkLst>
-          <pc:docMk/>
-          <pc:sldMk cId="2189579610" sldId="277"/>
-        </pc:sldMkLst>
-        <pc:spChg chg="mod">
-          <ac:chgData name="TI LF Soares" userId="e2d67a61776f6d56" providerId="LiveId" clId="{76FBF481-456A-4A2E-96F5-ACCB0A030A16}" dt="2024-03-13T20:01:30.475" v="280" actId="20577"/>
-          <ac:spMkLst>
-            <pc:docMk/>
-            <pc:sldMk cId="2189579610" sldId="277"/>
-            <ac:spMk id="13" creationId="{00000000-0000-0000-0000-000000000000}"/>
-          </ac:spMkLst>
-        </pc:spChg>
-      </pc:sldChg>
-      <pc:sldChg chg="del">
-        <pc:chgData name="TI LF Soares" userId="e2d67a61776f6d56" providerId="LiveId" clId="{76FBF481-456A-4A2E-96F5-ACCB0A030A16}" dt="2024-03-13T19:57:05.380" v="3" actId="47"/>
-        <pc:sldMkLst>
-          <pc:docMk/>
-          <pc:sldMk cId="3819366554" sldId="277"/>
-        </pc:sldMkLst>
-      </pc:sldChg>
-      <pc:sldChg chg="modSp add mod">
-        <pc:chgData name="TI LF Soares" userId="e2d67a61776f6d56" providerId="LiveId" clId="{76FBF481-456A-4A2E-96F5-ACCB0A030A16}" dt="2024-03-13T20:01:34.371" v="282" actId="20577"/>
-        <pc:sldMkLst>
-          <pc:docMk/>
-          <pc:sldMk cId="2890059367" sldId="278"/>
-        </pc:sldMkLst>
-        <pc:spChg chg="mod">
-          <ac:chgData name="TI LF Soares" userId="e2d67a61776f6d56" providerId="LiveId" clId="{76FBF481-456A-4A2E-96F5-ACCB0A030A16}" dt="2024-03-13T20:01:34.371" v="282" actId="20577"/>
-          <ac:spMkLst>
-            <pc:docMk/>
-            <pc:sldMk cId="2890059367" sldId="278"/>
-            <ac:spMk id="13" creationId="{00000000-0000-0000-0000-000000000000}"/>
-          </ac:spMkLst>
-        </pc:spChg>
-      </pc:sldChg>
-      <pc:sldChg chg="del">
-        <pc:chgData name="TI LF Soares" userId="e2d67a61776f6d56" providerId="LiveId" clId="{76FBF481-456A-4A2E-96F5-ACCB0A030A16}" dt="2024-03-13T19:57:05.193" v="2" actId="47"/>
-        <pc:sldMkLst>
-          <pc:docMk/>
-          <pc:sldMk cId="3715566760" sldId="278"/>
-        </pc:sldMkLst>
-      </pc:sldChg>
-      <pc:sldChg chg="del">
-        <pc:chgData name="TI LF Soares" userId="e2d67a61776f6d56" providerId="LiveId" clId="{76FBF481-456A-4A2E-96F5-ACCB0A030A16}" dt="2024-03-13T19:57:04.974" v="1" actId="47"/>
-        <pc:sldMkLst>
-          <pc:docMk/>
-          <pc:sldMk cId="1488515584" sldId="279"/>
-        </pc:sldMkLst>
-      </pc:sldChg>
-      <pc:sldChg chg="modSp add mod">
-        <pc:chgData name="TI LF Soares" userId="e2d67a61776f6d56" providerId="LiveId" clId="{76FBF481-456A-4A2E-96F5-ACCB0A030A16}" dt="2024-03-13T20:01:38.910" v="284" actId="20577"/>
-        <pc:sldMkLst>
-          <pc:docMk/>
-          <pc:sldMk cId="1742123399" sldId="279"/>
-        </pc:sldMkLst>
-        <pc:spChg chg="mod">
-          <ac:chgData name="TI LF Soares" userId="e2d67a61776f6d56" providerId="LiveId" clId="{76FBF481-456A-4A2E-96F5-ACCB0A030A16}" dt="2024-03-13T20:01:38.910" v="284" actId="20577"/>
-          <ac:spMkLst>
-            <pc:docMk/>
-            <pc:sldMk cId="1742123399" sldId="279"/>
-            <ac:spMk id="13" creationId="{00000000-0000-0000-0000-000000000000}"/>
-          </ac:spMkLst>
-        </pc:spChg>
-      </pc:sldChg>
-      <pc:sldChg chg="modSp add mod">
-        <pc:chgData name="TI LF Soares" userId="e2d67a61776f6d56" providerId="LiveId" clId="{76FBF481-456A-4A2E-96F5-ACCB0A030A16}" dt="2024-03-13T20:01:46.002" v="288" actId="20577"/>
-        <pc:sldMkLst>
-          <pc:docMk/>
-          <pc:sldMk cId="1381395635" sldId="280"/>
-        </pc:sldMkLst>
-        <pc:spChg chg="mod">
-          <ac:chgData name="TI LF Soares" userId="e2d67a61776f6d56" providerId="LiveId" clId="{76FBF481-456A-4A2E-96F5-ACCB0A030A16}" dt="2024-03-13T20:01:46.002" v="288" actId="20577"/>
-          <ac:spMkLst>
-            <pc:docMk/>
-            <pc:sldMk cId="1381395635" sldId="280"/>
-            <ac:spMk id="13" creationId="{00000000-0000-0000-0000-000000000000}"/>
-          </ac:spMkLst>
-        </pc:spChg>
-      </pc:sldChg>
-      <pc:sldChg chg="del">
-        <pc:chgData name="TI LF Soares" userId="e2d67a61776f6d56" providerId="LiveId" clId="{76FBF481-456A-4A2E-96F5-ACCB0A030A16}" dt="2024-03-13T19:57:04.787" v="0" actId="47"/>
-        <pc:sldMkLst>
-          <pc:docMk/>
-          <pc:sldMk cId="882313189" sldId="281"/>
-        </pc:sldMkLst>
-      </pc:sldChg>
-      <pc:sldChg chg="modSp add mod">
-        <pc:chgData name="TI LF Soares" userId="e2d67a61776f6d56" providerId="LiveId" clId="{76FBF481-456A-4A2E-96F5-ACCB0A030A16}" dt="2024-03-13T20:01:51.314" v="292" actId="20577"/>
-        <pc:sldMkLst>
-          <pc:docMk/>
-          <pc:sldMk cId="3426843383" sldId="281"/>
-        </pc:sldMkLst>
-        <pc:spChg chg="mod">
-          <ac:chgData name="TI LF Soares" userId="e2d67a61776f6d56" providerId="LiveId" clId="{76FBF481-456A-4A2E-96F5-ACCB0A030A16}" dt="2024-03-13T20:01:51.314" v="292" actId="20577"/>
-          <ac:spMkLst>
-            <pc:docMk/>
-            <pc:sldMk cId="3426843383" sldId="281"/>
-            <ac:spMk id="13" creationId="{00000000-0000-0000-0000-000000000000}"/>
-          </ac:spMkLst>
-        </pc:spChg>
-      </pc:sldChg>
-      <pc:sldChg chg="modSp add mod">
-        <pc:chgData name="TI LF Soares" userId="e2d67a61776f6d56" providerId="LiveId" clId="{76FBF481-456A-4A2E-96F5-ACCB0A030A16}" dt="2024-03-13T20:01:57.126" v="296" actId="20577"/>
-        <pc:sldMkLst>
-          <pc:docMk/>
-          <pc:sldMk cId="22884751" sldId="282"/>
-        </pc:sldMkLst>
-        <pc:spChg chg="mod">
-          <ac:chgData name="TI LF Soares" userId="e2d67a61776f6d56" providerId="LiveId" clId="{76FBF481-456A-4A2E-96F5-ACCB0A030A16}" dt="2024-03-13T20:01:57.126" v="296" actId="20577"/>
-          <ac:spMkLst>
-            <pc:docMk/>
-            <pc:sldMk cId="22884751" sldId="282"/>
-            <ac:spMk id="13" creationId="{00000000-0000-0000-0000-000000000000}"/>
-          </ac:spMkLst>
-        </pc:spChg>
-      </pc:sldChg>
-      <pc:sldChg chg="modSp add mod">
-        <pc:chgData name="TI LF Soares" userId="e2d67a61776f6d56" providerId="LiveId" clId="{76FBF481-456A-4A2E-96F5-ACCB0A030A16}" dt="2024-03-13T20:02:02.172" v="300" actId="20577"/>
-        <pc:sldMkLst>
-          <pc:docMk/>
-          <pc:sldMk cId="2130997476" sldId="283"/>
-        </pc:sldMkLst>
-        <pc:spChg chg="mod">
-          <ac:chgData name="TI LF Soares" userId="e2d67a61776f6d56" providerId="LiveId" clId="{76FBF481-456A-4A2E-96F5-ACCB0A030A16}" dt="2024-03-13T20:02:02.172" v="300" actId="20577"/>
-          <ac:spMkLst>
-            <pc:docMk/>
-            <pc:sldMk cId="2130997476" sldId="283"/>
-            <ac:spMk id="13" creationId="{00000000-0000-0000-0000-000000000000}"/>
-          </ac:spMkLst>
-        </pc:spChg>
-      </pc:sldChg>
-      <pc:sldChg chg="modSp add mod">
-        <pc:chgData name="TI LF Soares" userId="e2d67a61776f6d56" providerId="LiveId" clId="{76FBF481-456A-4A2E-96F5-ACCB0A030A16}" dt="2024-03-13T20:02:06.330" v="304" actId="20577"/>
-        <pc:sldMkLst>
-          <pc:docMk/>
-          <pc:sldMk cId="1857554227" sldId="284"/>
-        </pc:sldMkLst>
-        <pc:spChg chg="mod">
-          <ac:chgData name="TI LF Soares" userId="e2d67a61776f6d56" providerId="LiveId" clId="{76FBF481-456A-4A2E-96F5-ACCB0A030A16}" dt="2024-03-13T20:02:06.330" v="304" actId="20577"/>
-          <ac:spMkLst>
-            <pc:docMk/>
-            <pc:sldMk cId="1857554227" sldId="284"/>
-            <ac:spMk id="13" creationId="{00000000-0000-0000-0000-000000000000}"/>
-          </ac:spMkLst>
-        </pc:spChg>
-      </pc:sldChg>
-      <pc:sldChg chg="modSp add mod">
-        <pc:chgData name="TI LF Soares" userId="e2d67a61776f6d56" providerId="LiveId" clId="{76FBF481-456A-4A2E-96F5-ACCB0A030A16}" dt="2024-03-13T20:02:12.720" v="308" actId="20577"/>
-        <pc:sldMkLst>
-          <pc:docMk/>
-          <pc:sldMk cId="3785237022" sldId="285"/>
-        </pc:sldMkLst>
-        <pc:spChg chg="mod">
-          <ac:chgData name="TI LF Soares" userId="e2d67a61776f6d56" providerId="LiveId" clId="{76FBF481-456A-4A2E-96F5-ACCB0A030A16}" dt="2024-03-13T20:02:12.720" v="308" actId="20577"/>
-          <ac:spMkLst>
-            <pc:docMk/>
-            <pc:sldMk cId="3785237022" sldId="285"/>
-            <ac:spMk id="13" creationId="{00000000-0000-0000-0000-000000000000}"/>
-          </ac:spMkLst>
-        </pc:spChg>
-      </pc:sldChg>
-      <pc:sldChg chg="modSp add mod">
-        <pc:chgData name="TI LF Soares" userId="e2d67a61776f6d56" providerId="LiveId" clId="{76FBF481-456A-4A2E-96F5-ACCB0A030A16}" dt="2024-03-13T20:02:16.735" v="312" actId="20577"/>
-        <pc:sldMkLst>
-          <pc:docMk/>
-          <pc:sldMk cId="267469712" sldId="286"/>
-        </pc:sldMkLst>
-        <pc:spChg chg="mod">
-          <ac:chgData name="TI LF Soares" userId="e2d67a61776f6d56" providerId="LiveId" clId="{76FBF481-456A-4A2E-96F5-ACCB0A030A16}" dt="2024-03-13T20:02:16.735" v="312" actId="20577"/>
-          <ac:spMkLst>
-            <pc:docMk/>
-            <pc:sldMk cId="267469712" sldId="286"/>
-            <ac:spMk id="13" creationId="{00000000-0000-0000-0000-000000000000}"/>
-          </ac:spMkLst>
-        </pc:spChg>
-      </pc:sldChg>
-      <pc:sldChg chg="modSp add mod">
-        <pc:chgData name="TI LF Soares" userId="e2d67a61776f6d56" providerId="LiveId" clId="{76FBF481-456A-4A2E-96F5-ACCB0A030A16}" dt="2024-03-13T20:02:21.297" v="316" actId="20577"/>
-        <pc:sldMkLst>
-          <pc:docMk/>
-          <pc:sldMk cId="988440475" sldId="287"/>
-        </pc:sldMkLst>
-        <pc:spChg chg="mod">
-          <ac:chgData name="TI LF Soares" userId="e2d67a61776f6d56" providerId="LiveId" clId="{76FBF481-456A-4A2E-96F5-ACCB0A030A16}" dt="2024-03-13T20:02:21.297" v="316" actId="20577"/>
-          <ac:spMkLst>
-            <pc:docMk/>
-            <pc:sldMk cId="988440475" sldId="287"/>
-            <ac:spMk id="13" creationId="{00000000-0000-0000-0000-000000000000}"/>
-          </ac:spMkLst>
-        </pc:spChg>
-      </pc:sldChg>
-      <pc:sldChg chg="modSp add mod">
-        <pc:chgData name="TI LF Soares" userId="e2d67a61776f6d56" providerId="LiveId" clId="{76FBF481-456A-4A2E-96F5-ACCB0A030A16}" dt="2024-03-13T20:02:25.734" v="320" actId="20577"/>
-        <pc:sldMkLst>
-          <pc:docMk/>
-          <pc:sldMk cId="211274229" sldId="288"/>
-        </pc:sldMkLst>
-        <pc:spChg chg="mod">
-          <ac:chgData name="TI LF Soares" userId="e2d67a61776f6d56" providerId="LiveId" clId="{76FBF481-456A-4A2E-96F5-ACCB0A030A16}" dt="2024-03-13T20:02:25.734" v="320" actId="20577"/>
-          <ac:spMkLst>
-            <pc:docMk/>
-            <pc:sldMk cId="211274229" sldId="288"/>
-            <ac:spMk id="13" creationId="{00000000-0000-0000-0000-000000000000}"/>
-          </ac:spMkLst>
-        </pc:spChg>
-      </pc:sldChg>
-    </pc:docChg>
-  </pc:docChgLst>
-  <pc:docChgLst>
-    <pc:chgData name="TI LF Soares" userId="e2d67a61776f6d56" providerId="LiveId" clId="{3478788F-D141-4A82-9AE5-B111501A98F3}"/>
-    <pc:docChg chg="modSld">
-      <pc:chgData name="TI LF Soares" userId="e2d67a61776f6d56" providerId="LiveId" clId="{3478788F-D141-4A82-9AE5-B111501A98F3}" dt="2024-05-08T18:38:39.723" v="9" actId="20577"/>
-      <pc:docMkLst>
-        <pc:docMk/>
-      </pc:docMkLst>
-      <pc:sldChg chg="modSp mod">
-        <pc:chgData name="TI LF Soares" userId="e2d67a61776f6d56" providerId="LiveId" clId="{3478788F-D141-4A82-9AE5-B111501A98F3}" dt="2024-05-08T18:38:39.723" v="9" actId="20577"/>
-        <pc:sldMkLst>
-          <pc:docMk/>
-          <pc:sldMk cId="3778653310" sldId="274"/>
-        </pc:sldMkLst>
-        <pc:spChg chg="mod">
-          <ac:chgData name="TI LF Soares" userId="e2d67a61776f6d56" providerId="LiveId" clId="{3478788F-D141-4A82-9AE5-B111501A98F3}" dt="2024-05-08T18:38:39.723" v="9" actId="20577"/>
-          <ac:spMkLst>
-            <pc:docMk/>
-            <pc:sldMk cId="3778653310" sldId="274"/>
-            <ac:spMk id="5" creationId="{B7902C3D-2498-859B-69FE-600F8490C5DF}"/>
-          </ac:spMkLst>
-        </pc:spChg>
-      </pc:sldChg>
-    </pc:docChg>
-  </pc:docChgLst>
-</pc:chgInfo>
 </file>
 
 <file path=ppt/slideLayouts/slideLayout1.xml><?xml version="1.0" encoding="utf-8"?>
@@ -1413,7 +279,7 @@
           <a:p>
             <a:fld id="{62DE8017-325E-4800-BDDD-E3855642CAE0}" type="datetimeFigureOut">
               <a:rPr lang="pt-BR" smtClean="0"/>
-              <a:t>17/12/2024</a:t>
+              <a:t>24/01/2025</a:t>
             </a:fld>
             <a:endParaRPr lang="pt-BR"/>
           </a:p>
@@ -1623,7 +489,7 @@
           <a:p>
             <a:fld id="{62DE8017-325E-4800-BDDD-E3855642CAE0}" type="datetimeFigureOut">
               <a:rPr lang="pt-BR" smtClean="0"/>
-              <a:t>17/12/2024</a:t>
+              <a:t>24/01/2025</a:t>
             </a:fld>
             <a:endParaRPr lang="pt-BR"/>
           </a:p>
@@ -1833,7 +699,7 @@
           <a:p>
             <a:fld id="{62DE8017-325E-4800-BDDD-E3855642CAE0}" type="datetimeFigureOut">
               <a:rPr lang="pt-BR" smtClean="0"/>
-              <a:t>17/12/2024</a:t>
+              <a:t>24/01/2025</a:t>
             </a:fld>
             <a:endParaRPr lang="pt-BR"/>
           </a:p>
@@ -3032,7 +1898,7 @@
           <a:p>
             <a:fld id="{62DE8017-325E-4800-BDDD-E3855642CAE0}" type="datetimeFigureOut">
               <a:rPr lang="pt-BR" smtClean="0"/>
-              <a:t>17/12/2024</a:t>
+              <a:t>24/01/2025</a:t>
             </a:fld>
             <a:endParaRPr lang="pt-BR"/>
           </a:p>
@@ -3306,7 +2172,7 @@
           <a:p>
             <a:fld id="{62DE8017-325E-4800-BDDD-E3855642CAE0}" type="datetimeFigureOut">
               <a:rPr lang="pt-BR" smtClean="0"/>
-              <a:t>17/12/2024</a:t>
+              <a:t>24/01/2025</a:t>
             </a:fld>
             <a:endParaRPr lang="pt-BR"/>
           </a:p>
@@ -3576,7 +2442,7 @@
           <a:p>
             <a:fld id="{62DE8017-325E-4800-BDDD-E3855642CAE0}" type="datetimeFigureOut">
               <a:rPr lang="pt-BR" smtClean="0"/>
-              <a:t>17/12/2024</a:t>
+              <a:t>24/01/2025</a:t>
             </a:fld>
             <a:endParaRPr lang="pt-BR"/>
           </a:p>
@@ -3982,7 +2848,7 @@
           <a:p>
             <a:fld id="{62DE8017-325E-4800-BDDD-E3855642CAE0}" type="datetimeFigureOut">
               <a:rPr lang="pt-BR" smtClean="0"/>
-              <a:t>17/12/2024</a:t>
+              <a:t>24/01/2025</a:t>
             </a:fld>
             <a:endParaRPr lang="pt-BR"/>
           </a:p>
@@ -4132,7 +2998,7 @@
           <a:p>
             <a:fld id="{62DE8017-325E-4800-BDDD-E3855642CAE0}" type="datetimeFigureOut">
               <a:rPr lang="pt-BR" smtClean="0"/>
-              <a:t>17/12/2024</a:t>
+              <a:t>24/01/2025</a:t>
             </a:fld>
             <a:endParaRPr lang="pt-BR"/>
           </a:p>
@@ -4251,7 +3117,7 @@
           <a:p>
             <a:fld id="{62DE8017-325E-4800-BDDD-E3855642CAE0}" type="datetimeFigureOut">
               <a:rPr lang="pt-BR" smtClean="0"/>
-              <a:t>17/12/2024</a:t>
+              <a:t>24/01/2025</a:t>
             </a:fld>
             <a:endParaRPr lang="pt-BR"/>
           </a:p>
@@ -4561,7 +3427,7 @@
           <a:p>
             <a:fld id="{62DE8017-325E-4800-BDDD-E3855642CAE0}" type="datetimeFigureOut">
               <a:rPr lang="pt-BR" smtClean="0"/>
-              <a:t>17/12/2024</a:t>
+              <a:t>24/01/2025</a:t>
             </a:fld>
             <a:endParaRPr lang="pt-BR"/>
           </a:p>
@@ -4851,7 +3717,7 @@
           <a:p>
             <a:fld id="{62DE8017-325E-4800-BDDD-E3855642CAE0}" type="datetimeFigureOut">
               <a:rPr lang="pt-BR" smtClean="0"/>
-              <a:t>17/12/2024</a:t>
+              <a:t>24/01/2025</a:t>
             </a:fld>
             <a:endParaRPr lang="pt-BR"/>
           </a:p>
@@ -6292,7 +5158,7 @@
         <p:spPr>
           <a:xfrm>
             <a:off x="3124080" y="3243600"/>
-            <a:ext cx="6316920" cy="1172520"/>
+            <a:ext cx="6316920" cy="1191180"/>
           </a:xfrm>
           <a:prstGeom prst="rect">
             <a:avLst/>
@@ -6320,25 +5186,11 @@
           </a:bodyPr>
           <a:lstStyle/>
           <a:p>
-            <a:pPr marL="0" marR="0" lvl="0" indent="0" algn="just" defTabSz="914400" rtl="0" eaLnBrk="1" fontAlgn="auto" latinLnBrk="0" hangingPunct="1">
-              <a:lnSpc>
-                <a:spcPct val="100000"/>
-              </a:lnSpc>
-              <a:spcBef>
-                <a:spcPts val="0"/>
-              </a:spcBef>
-              <a:spcAft>
-                <a:spcPts val="0"/>
-              </a:spcAft>
-              <a:buClrTx/>
-              <a:buSzTx/>
-              <a:buFontTx/>
-              <a:buNone/>
-              <a:tabLst/>
+            <a:pPr algn="just">
               <a:defRPr/>
             </a:pPr>
             <a:r>
-              <a:rPr kumimoji="0" lang="pt-BR" sz="1000" b="0" i="0" u="none" strike="noStrike" kern="1200" cap="none" spc="0" normalizeH="0" baseline="0" noProof="0">
+              <a:rPr kumimoji="0" lang="pt-BR" sz="1000" b="0" i="0" u="none" strike="noStrike" kern="1200" cap="none" spc="0" normalizeH="0" baseline="0" noProof="0" dirty="0">
                 <a:ln>
                   <a:noFill/>
                 </a:ln>
@@ -6352,15 +5204,15 @@
                 <a:ea typeface="+mn-ea"/>
                 <a:cs typeface="+mn-cs"/>
               </a:rPr>
-              <a:t>funcionário(a), portador(a) do CPF: [cpf], concluiu o treinamento de capacitação profissional, conforme a </a:t>
-            </a:r>
-            <a:r>
-              <a:rPr kumimoji="0" lang="pt-BR" sz="1000" b="1" i="0" u="none" strike="noStrike" kern="1200" cap="none" spc="0" normalizeH="0" baseline="0" noProof="0">
+              <a:t>funcionário(a), portador(a) do CPF: [</a:t>
+            </a:r>
+            <a:r>
+              <a:rPr kumimoji="0" lang="pt-BR" sz="1000" b="0" i="0" u="none" strike="noStrike" kern="1200" cap="none" spc="0" normalizeH="0" baseline="0" noProof="0" dirty="0" err="1">
                 <a:ln>
                   <a:noFill/>
                 </a:ln>
                 <a:solidFill>
-                  <a:srgbClr val="FF0000"/>
+                  <a:srgbClr val="000000"/>
                 </a:solidFill>
                 <a:effectLst/>
                 <a:uLnTx/>
@@ -6369,10 +5221,10 @@
                 <a:ea typeface="+mn-ea"/>
                 <a:cs typeface="+mn-cs"/>
               </a:rPr>
-              <a:t>[nome_treinamento]</a:t>
-            </a:r>
-            <a:r>
-              <a:rPr kumimoji="0" lang="pt-BR" sz="1000" b="0" i="0" u="none" strike="noStrike" kern="1200" cap="none" spc="0" normalizeH="0" baseline="0" noProof="0">
+              <a:t>cpf</a:t>
+            </a:r>
+            <a:r>
+              <a:rPr kumimoji="0" lang="pt-BR" sz="1000" b="0" i="0" u="none" strike="noStrike" kern="1200" cap="none" spc="0" normalizeH="0" baseline="0" noProof="0" dirty="0">
                 <a:ln>
                   <a:noFill/>
                 </a:ln>
@@ -6386,10 +5238,10 @@
                 <a:ea typeface="+mn-ea"/>
                 <a:cs typeface="+mn-cs"/>
               </a:rPr>
-              <a:t>, regulamentada pela </a:t>
-            </a:r>
-            <a:r>
-              <a:rPr kumimoji="0" lang="pt-BR" sz="1000" b="1" i="0" u="none" strike="noStrike" kern="1200" cap="none" spc="0" normalizeH="0" baseline="0" noProof="0">
+              <a:t>], concluiu o treinamento de capacitação profissional, conforme a </a:t>
+            </a:r>
+            <a:r>
+              <a:rPr kumimoji="0" lang="pt-BR" sz="1000" b="1" i="0" u="none" strike="noStrike" kern="1200" cap="none" spc="0" normalizeH="0" baseline="0" noProof="0" dirty="0">
                 <a:ln>
                   <a:noFill/>
                 </a:ln>
@@ -6403,15 +5255,15 @@
                 <a:ea typeface="+mn-ea"/>
                 <a:cs typeface="+mn-cs"/>
               </a:rPr>
-              <a:t>[portaria_treinamento]</a:t>
-            </a:r>
-            <a:r>
-              <a:rPr kumimoji="0" lang="pt-BR" sz="1000" b="0" i="0" u="none" strike="noStrike" kern="1200" cap="none" spc="0" normalizeH="0" baseline="0" noProof="0">
+              <a:t>[</a:t>
+            </a:r>
+            <a:r>
+              <a:rPr kumimoji="0" lang="pt-BR" sz="1000" b="1" i="0" u="none" strike="noStrike" kern="1200" cap="none" spc="0" normalizeH="0" baseline="0" noProof="0" dirty="0" err="1">
                 <a:ln>
                   <a:noFill/>
                 </a:ln>
                 <a:solidFill>
-                  <a:srgbClr val="000000"/>
+                  <a:srgbClr val="FF0000"/>
                 </a:solidFill>
                 <a:effectLst/>
                 <a:uLnTx/>
@@ -6420,10 +5272,10 @@
                 <a:ea typeface="+mn-ea"/>
                 <a:cs typeface="+mn-cs"/>
               </a:rPr>
-              <a:t>. Este treinamento foi patrocinado pela empresa </a:t>
-            </a:r>
-            <a:r>
-              <a:rPr kumimoji="0" lang="pt-BR" sz="1000" b="0" i="0" u="none" strike="noStrike" kern="1200" cap="none" spc="0" normalizeH="0" baseline="0" noProof="0">
+              <a:t>nome_treinamento</a:t>
+            </a:r>
+            <a:r>
+              <a:rPr kumimoji="0" lang="pt-BR" sz="1000" b="1" i="0" u="none" strike="noStrike" kern="1200" cap="none" spc="0" normalizeH="0" baseline="0" noProof="0" dirty="0">
                 <a:ln>
                   <a:noFill/>
                 </a:ln>
@@ -6437,10 +5289,10 @@
                 <a:ea typeface="+mn-ea"/>
                 <a:cs typeface="+mn-cs"/>
               </a:rPr>
-              <a:t>[empresa]</a:t>
-            </a:r>
-            <a:r>
-              <a:rPr kumimoji="0" lang="pt-BR" sz="1000" b="0" i="0" u="none" strike="noStrike" kern="1200" cap="none" spc="0" normalizeH="0" baseline="0" noProof="0">
+              <a:t>]</a:t>
+            </a:r>
+            <a:r>
+              <a:rPr kumimoji="0" lang="pt-BR" sz="1000" b="0" i="0" u="none" strike="noStrike" kern="1200" cap="none" spc="0" normalizeH="0" baseline="0" noProof="0" dirty="0">
                 <a:ln>
                   <a:noFill/>
                 </a:ln>
@@ -6454,10 +5306,10 @@
                 <a:ea typeface="+mn-ea"/>
                 <a:cs typeface="+mn-cs"/>
               </a:rPr>
-              <a:t>, inscrita no CNPJ: </a:t>
-            </a:r>
-            <a:r>
-              <a:rPr kumimoji="0" lang="pt-BR" sz="1000" b="0" i="0" u="none" strike="noStrike" kern="1200" cap="none" spc="0" normalizeH="0" baseline="0" noProof="0">
+              <a:t>, regulamentada pela </a:t>
+            </a:r>
+            <a:r>
+              <a:rPr kumimoji="0" lang="pt-BR" sz="1000" b="1" i="0" u="none" strike="noStrike" kern="1200" cap="none" spc="0" normalizeH="0" baseline="0" noProof="0" dirty="0">
                 <a:ln>
                   <a:noFill/>
                 </a:ln>
@@ -6471,15 +5323,15 @@
                 <a:ea typeface="+mn-ea"/>
                 <a:cs typeface="+mn-cs"/>
               </a:rPr>
-              <a:t>[cnpj]</a:t>
-            </a:r>
-            <a:r>
-              <a:rPr kumimoji="0" lang="pt-BR" sz="1000" b="0" i="0" u="none" strike="noStrike" kern="1200" cap="none" spc="0" normalizeH="0" baseline="0" noProof="0">
+              <a:t>[</a:t>
+            </a:r>
+            <a:r>
+              <a:rPr kumimoji="0" lang="pt-BR" sz="1000" b="1" i="0" u="none" strike="noStrike" kern="1200" cap="none" spc="0" normalizeH="0" baseline="0" noProof="0" dirty="0" err="1">
                 <a:ln>
                   <a:noFill/>
                 </a:ln>
                 <a:solidFill>
-                  <a:srgbClr val="000000"/>
+                  <a:srgbClr val="FF0000"/>
                 </a:solidFill>
                 <a:effectLst/>
                 <a:uLnTx/>
@@ -6488,10 +5340,10 @@
                 <a:ea typeface="+mn-ea"/>
                 <a:cs typeface="+mn-cs"/>
               </a:rPr>
-              <a:t>, e realizado no dia </a:t>
-            </a:r>
-            <a:r>
-              <a:rPr kumimoji="0" lang="pt-BR" sz="1000" b="0" i="0" u="none" strike="noStrike" kern="1200" cap="none" spc="0" normalizeH="0" baseline="0" noProof="0">
+              <a:t>portaria_treinamento</a:t>
+            </a:r>
+            <a:r>
+              <a:rPr kumimoji="0" lang="pt-BR" sz="1000" b="1" i="0" u="none" strike="noStrike" kern="1200" cap="none" spc="0" normalizeH="0" baseline="0" noProof="0" dirty="0">
                 <a:ln>
                   <a:noFill/>
                 </a:ln>
@@ -6505,10 +5357,10 @@
                 <a:ea typeface="+mn-ea"/>
                 <a:cs typeface="+mn-cs"/>
               </a:rPr>
-              <a:t>[r_dia]</a:t>
-            </a:r>
-            <a:r>
-              <a:rPr kumimoji="0" lang="pt-BR" sz="1000" b="0" i="0" u="none" strike="noStrike" kern="1200" cap="none" spc="0" normalizeH="0" baseline="0" noProof="0">
+              <a:t>]</a:t>
+            </a:r>
+            <a:r>
+              <a:rPr kumimoji="0" lang="pt-BR" sz="1000" b="0" i="0" u="none" strike="noStrike" kern="1200" cap="none" spc="0" normalizeH="0" baseline="0" noProof="0" dirty="0">
                 <a:ln>
                   <a:noFill/>
                 </a:ln>
@@ -6522,10 +5374,10 @@
                 <a:ea typeface="+mn-ea"/>
                 <a:cs typeface="+mn-cs"/>
               </a:rPr>
-              <a:t> de </a:t>
-            </a:r>
-            <a:r>
-              <a:rPr kumimoji="0" lang="pt-BR" sz="1000" b="0" i="0" u="none" strike="noStrike" kern="1200" cap="none" spc="0" normalizeH="0" baseline="0" noProof="0">
+              <a:t>. Este treinamento foi patrocinado pela empresa </a:t>
+            </a:r>
+            <a:r>
+              <a:rPr kumimoji="0" lang="pt-BR" sz="1000" b="0" i="0" u="none" strike="noStrike" kern="1200" cap="none" spc="0" normalizeH="0" baseline="0" noProof="0" dirty="0">
                 <a:ln>
                   <a:noFill/>
                 </a:ln>
@@ -6539,10 +5391,10 @@
                 <a:ea typeface="+mn-ea"/>
                 <a:cs typeface="+mn-cs"/>
               </a:rPr>
-              <a:t>[r_mes]</a:t>
-            </a:r>
-            <a:r>
-              <a:rPr kumimoji="0" lang="pt-BR" sz="1000" b="0" i="0" u="none" strike="noStrike" kern="1200" cap="none" spc="0" normalizeH="0" baseline="0" noProof="0">
+              <a:t>[empresa]</a:t>
+            </a:r>
+            <a:r>
+              <a:rPr kumimoji="0" lang="pt-BR" sz="1000" b="0" i="0" u="none" strike="noStrike" kern="1200" cap="none" spc="0" normalizeH="0" baseline="0" noProof="0" dirty="0">
                 <a:ln>
                   <a:noFill/>
                 </a:ln>
@@ -6556,10 +5408,10 @@
                 <a:ea typeface="+mn-ea"/>
                 <a:cs typeface="+mn-cs"/>
               </a:rPr>
-              <a:t> de 2024, das </a:t>
-            </a:r>
-            <a:r>
-              <a:rPr kumimoji="0" lang="pt-BR" sz="1000" b="0" i="0" u="none" strike="noStrike" kern="1200" cap="none" spc="0" normalizeH="0" baseline="0" noProof="0">
+              <a:t>, inscrita no CNPJ: </a:t>
+            </a:r>
+            <a:r>
+              <a:rPr kumimoji="0" lang="pt-BR" sz="1000" b="0" i="0" u="none" strike="noStrike" kern="1200" cap="none" spc="0" normalizeH="0" baseline="0" noProof="0" dirty="0">
                 <a:ln>
                   <a:noFill/>
                 </a:ln>
@@ -6573,15 +5425,15 @@
                 <a:ea typeface="+mn-ea"/>
                 <a:cs typeface="+mn-cs"/>
               </a:rPr>
-              <a:t>[r_hora]</a:t>
-            </a:r>
-            <a:r>
-              <a:rPr kumimoji="0" lang="pt-BR" sz="1000" b="0" i="0" u="none" strike="noStrike" kern="1200" cap="none" spc="0" normalizeH="0" baseline="0" noProof="0">
+              <a:t>[</a:t>
+            </a:r>
+            <a:r>
+              <a:rPr kumimoji="0" lang="pt-BR" sz="1000" b="0" i="0" u="none" strike="noStrike" kern="1200" cap="none" spc="0" normalizeH="0" baseline="0" noProof="0" dirty="0" err="1">
                 <a:ln>
                   <a:noFill/>
                 </a:ln>
                 <a:solidFill>
-                  <a:srgbClr val="000000"/>
+                  <a:srgbClr val="FF0000"/>
                 </a:solidFill>
                 <a:effectLst/>
                 <a:uLnTx/>
@@ -6590,10 +5442,10 @@
                 <a:ea typeface="+mn-ea"/>
                 <a:cs typeface="+mn-cs"/>
               </a:rPr>
-              <a:t> às [r_minutos]</a:t>
-            </a:r>
-            <a:r>
-              <a:rPr kumimoji="0" lang="pt-BR" sz="1000" b="0" i="0" u="none" strike="noStrike" kern="1200" cap="none" spc="0" normalizeH="0" baseline="0" noProof="0">
+              <a:t>cnpj</a:t>
+            </a:r>
+            <a:r>
+              <a:rPr kumimoji="0" lang="pt-BR" sz="1000" b="0" i="0" u="none" strike="noStrike" kern="1200" cap="none" spc="0" normalizeH="0" baseline="0" noProof="0" dirty="0">
                 <a:ln>
                   <a:noFill/>
                 </a:ln>
@@ -6607,10 +5459,10 @@
                 <a:ea typeface="+mn-ea"/>
                 <a:cs typeface="+mn-cs"/>
               </a:rPr>
-              <a:t>,</a:t>
-            </a:r>
-            <a:r>
-              <a:rPr kumimoji="0" lang="pt-BR" sz="1000" b="0" i="0" u="none" strike="noStrike" kern="1200" cap="none" spc="0" normalizeH="0" baseline="0" noProof="0">
+              <a:t>]</a:t>
+            </a:r>
+            <a:r>
+              <a:rPr kumimoji="0" lang="pt-BR" sz="1000" b="0" i="0" u="none" strike="noStrike" kern="1200" cap="none" spc="0" normalizeH="0" baseline="0" noProof="0" dirty="0">
                 <a:ln>
                   <a:noFill/>
                 </a:ln>
@@ -6624,15 +5476,42 @@
                 <a:ea typeface="+mn-ea"/>
                 <a:cs typeface="+mn-cs"/>
               </a:rPr>
-              <a:t> totalizando uma carga horária de </a:t>
-            </a:r>
-            <a:r>
-              <a:rPr kumimoji="0" lang="pt-BR" sz="1000" b="0" i="0" u="none" strike="noStrike" kern="1200" cap="none" spc="0" normalizeH="0" baseline="0" noProof="0">
+              <a:t>, e realizado no dia</a:t>
+            </a:r>
+            <a:r>
+              <a:rPr lang="pt-BR" sz="1000" dirty="0">
+                <a:solidFill>
+                  <a:srgbClr val="000000"/>
+                </a:solidFill>
+                <a:latin typeface="Arial"/>
+              </a:rPr>
+              <a:t> [</a:t>
+            </a:r>
+            <a:r>
+              <a:rPr lang="pt-BR" sz="1000" dirty="0" err="1">
+                <a:solidFill>
+                  <a:srgbClr val="000000"/>
+                </a:solidFill>
+                <a:latin typeface="Arial"/>
+              </a:rPr>
+              <a:t>data_realizada</a:t>
+            </a:r>
+            <a:r>
+              <a:rPr lang="pt-BR" sz="1000" dirty="0">
+                <a:solidFill>
+                  <a:srgbClr val="000000"/>
+                </a:solidFill>
+                <a:latin typeface="Arial"/>
+              </a:rPr>
+              <a:t>], </a:t>
+            </a:r>
+            <a:r>
+              <a:rPr kumimoji="0" lang="pt-BR" sz="1000" b="0" i="0" u="none" strike="noStrike" kern="1200" cap="none" spc="0" normalizeH="0" baseline="0" noProof="0" dirty="0">
                 <a:ln>
                   <a:noFill/>
                 </a:ln>
                 <a:solidFill>
-                  <a:srgbClr val="FF0000"/>
+                  <a:srgbClr val="000000"/>
                 </a:solidFill>
                 <a:effectLst/>
                 <a:uLnTx/>
@@ -6641,15 +5520,15 @@
                 <a:ea typeface="+mn-ea"/>
                 <a:cs typeface="+mn-cs"/>
               </a:rPr>
-              <a:t>[carga_hora]</a:t>
-            </a:r>
-            <a:r>
-              <a:rPr kumimoji="0" lang="pt-BR" sz="1000" b="0" i="0" u="none" strike="noStrike" kern="1200" cap="none" spc="0" normalizeH="0" baseline="0" noProof="0">
+              <a:t>das </a:t>
+            </a:r>
+            <a:r>
+              <a:rPr kumimoji="0" lang="pt-BR" sz="1000" b="0" i="0" u="none" strike="noStrike" kern="1200" cap="none" spc="0" normalizeH="0" baseline="0" noProof="0" dirty="0">
                 <a:ln>
                   <a:noFill/>
                 </a:ln>
                 <a:solidFill>
-                  <a:srgbClr val="000000"/>
+                  <a:srgbClr val="FF0000"/>
                 </a:solidFill>
                 <a:effectLst/>
                 <a:uLnTx/>
@@ -6658,9 +5537,138 @@
                 <a:ea typeface="+mn-ea"/>
                 <a:cs typeface="+mn-cs"/>
               </a:rPr>
+              <a:t>[r_</a:t>
+            </a:r>
+            <a:r>
+              <a:rPr lang="pt-BR" sz="1000" dirty="0">
+                <a:solidFill>
+                  <a:srgbClr val="FF0000"/>
+                </a:solidFill>
+                <a:latin typeface="Arial"/>
+              </a:rPr>
+              <a:t>hora_1]</a:t>
+            </a:r>
+            <a:r>
+              <a:rPr kumimoji="0" lang="pt-BR" sz="1000" b="0" i="0" u="none" strike="noStrike" kern="1200" cap="none" spc="0" normalizeH="0" baseline="0" noProof="0" dirty="0">
+                <a:ln>
+                  <a:noFill/>
+                </a:ln>
+                <a:solidFill>
+                  <a:srgbClr val="000000"/>
+                </a:solidFill>
+                <a:effectLst/>
+                <a:uLnTx/>
+                <a:uFillTx/>
+                <a:latin typeface="Arial"/>
+                <a:ea typeface="+mn-ea"/>
+                <a:cs typeface="+mn-cs"/>
+              </a:rPr>
+              <a:t> às [r_</a:t>
+            </a:r>
+            <a:r>
+              <a:rPr lang="pt-BR" sz="1000" dirty="0">
+                <a:solidFill>
+                  <a:srgbClr val="000000"/>
+                </a:solidFill>
+                <a:latin typeface="Arial"/>
+              </a:rPr>
+              <a:t>hora_2]</a:t>
+            </a:r>
+            <a:r>
+              <a:rPr lang="pt-BR" sz="1000" dirty="0">
+                <a:solidFill>
+                  <a:srgbClr val="FF0000"/>
+                </a:solidFill>
+                <a:latin typeface="Arial"/>
+              </a:rPr>
+              <a:t>,</a:t>
+            </a:r>
+            <a:r>
+              <a:rPr kumimoji="0" lang="pt-BR" sz="1000" b="0" i="0" u="none" strike="noStrike" kern="1200" cap="none" spc="0" normalizeH="0" baseline="0" noProof="0" dirty="0">
+                <a:ln>
+                  <a:noFill/>
+                </a:ln>
+                <a:solidFill>
+                  <a:srgbClr val="000000"/>
+                </a:solidFill>
+                <a:effectLst/>
+                <a:uLnTx/>
+                <a:uFillTx/>
+                <a:latin typeface="Arial"/>
+                <a:ea typeface="+mn-ea"/>
+                <a:cs typeface="+mn-cs"/>
+              </a:rPr>
+              <a:t> totalizando uma carga horária de </a:t>
+            </a:r>
+            <a:r>
+              <a:rPr kumimoji="0" lang="pt-BR" sz="1000" b="0" i="0" u="none" strike="noStrike" kern="1200" cap="none" spc="0" normalizeH="0" baseline="0" noProof="0" dirty="0">
+                <a:ln>
+                  <a:noFill/>
+                </a:ln>
+                <a:solidFill>
+                  <a:srgbClr val="FF0000"/>
+                </a:solidFill>
+                <a:effectLst/>
+                <a:uLnTx/>
+                <a:uFillTx/>
+                <a:latin typeface="Arial"/>
+                <a:ea typeface="+mn-ea"/>
+                <a:cs typeface="+mn-cs"/>
+              </a:rPr>
+              <a:t>[</a:t>
+            </a:r>
+            <a:r>
+              <a:rPr kumimoji="0" lang="pt-BR" sz="1000" b="0" i="0" u="none" strike="noStrike" kern="1200" cap="none" spc="0" normalizeH="0" baseline="0" noProof="0" dirty="0" err="1">
+                <a:ln>
+                  <a:noFill/>
+                </a:ln>
+                <a:solidFill>
+                  <a:srgbClr val="FF0000"/>
+                </a:solidFill>
+                <a:effectLst/>
+                <a:uLnTx/>
+                <a:uFillTx/>
+                <a:latin typeface="Arial"/>
+                <a:ea typeface="+mn-ea"/>
+                <a:cs typeface="+mn-cs"/>
+              </a:rPr>
+              <a:t>carga_hora</a:t>
+            </a:r>
+            <a:r>
+              <a:rPr kumimoji="0" lang="pt-BR" sz="1000" b="0" i="0" u="none" strike="noStrike" kern="1200" cap="none" spc="0" normalizeH="0" baseline="0" noProof="0" dirty="0">
+                <a:ln>
+                  <a:noFill/>
+                </a:ln>
+                <a:solidFill>
+                  <a:srgbClr val="FF0000"/>
+                </a:solidFill>
+                <a:effectLst/>
+                <a:uLnTx/>
+                <a:uFillTx/>
+                <a:latin typeface="Arial"/>
+                <a:ea typeface="+mn-ea"/>
+                <a:cs typeface="+mn-cs"/>
+              </a:rPr>
+              <a:t>]</a:t>
+            </a:r>
+            <a:r>
+              <a:rPr kumimoji="0" lang="pt-BR" sz="1000" b="0" i="0" u="none" strike="noStrike" kern="1200" cap="none" spc="0" normalizeH="0" baseline="0" noProof="0" dirty="0">
+                <a:ln>
+                  <a:noFill/>
+                </a:ln>
+                <a:solidFill>
+                  <a:srgbClr val="000000"/>
+                </a:solidFill>
+                <a:effectLst/>
+                <a:uLnTx/>
+                <a:uFillTx/>
+                <a:latin typeface="Arial"/>
+                <a:ea typeface="+mn-ea"/>
+                <a:cs typeface="+mn-cs"/>
+              </a:rPr>
               <a:t> horas/aula. O(a) participante foi avaliado(a) e considerado(a) apto(a) pelo instrutor e responsável técnica da capacitação.</a:t>
             </a:r>
-            <a:endParaRPr kumimoji="0" lang="en-US" sz="1000" b="0" i="0" u="none" strike="noStrike" kern="1200" cap="none" spc="0" normalizeH="0" baseline="0" noProof="0">
+            <a:endParaRPr kumimoji="0" lang="en-US" sz="1000" b="0" i="0" u="none" strike="noStrike" kern="1200" cap="none" spc="0" normalizeH="0" baseline="0" noProof="0" dirty="0">
               <a:ln>
                 <a:noFill/>
               </a:ln>
@@ -6727,7 +5735,7 @@
               <a:defRPr/>
             </a:pPr>
             <a:r>
-              <a:rPr kumimoji="0" lang="pt-BR" sz="1050" b="1" i="0" u="none" strike="noStrike" kern="1200" cap="none" spc="0" normalizeH="0" baseline="0" noProof="0">
+              <a:rPr kumimoji="0" lang="pt-BR" sz="1050" b="1" i="0" u="none" strike="noStrike" kern="1200" cap="none" spc="0" normalizeH="0" baseline="0" noProof="0" dirty="0">
                 <a:ln>
                   <a:noFill/>
                 </a:ln>
@@ -6744,7 +5752,7 @@
               <a:t>EMISSÃO DO CERTIFICADO DIA </a:t>
             </a:r>
             <a:r>
-              <a:rPr kumimoji="0" lang="pt-BR" sz="1050" b="1" i="0" u="none" strike="noStrike" kern="1200" cap="none" spc="0" normalizeH="0" baseline="0" noProof="0">
+              <a:rPr kumimoji="0" lang="pt-BR" sz="1050" b="1" i="0" u="none" strike="noStrike" kern="1200" cap="none" spc="0" normalizeH="0" baseline="0" noProof="0" dirty="0">
                 <a:ln>
                   <a:noFill/>
                 </a:ln>
@@ -6758,15 +5766,15 @@
                 <a:ea typeface="+mn-ea"/>
                 <a:cs typeface="+mn-cs"/>
               </a:rPr>
-              <a:t>[e_dia]</a:t>
-            </a:r>
-            <a:r>
-              <a:rPr kumimoji="0" lang="pt-BR" sz="1050" b="1" i="0" u="none" strike="noStrike" kern="1200" cap="none" spc="0" normalizeH="0" baseline="0" noProof="0">
+              <a:t>[</a:t>
+            </a:r>
+            <a:r>
+              <a:rPr kumimoji="0" lang="pt-BR" sz="1050" b="1" i="0" u="none" strike="noStrike" kern="1200" cap="none" spc="0" normalizeH="0" baseline="0" noProof="0" dirty="0" err="1">
                 <a:ln>
                   <a:noFill/>
                 </a:ln>
                 <a:solidFill>
-                  <a:srgbClr val="000000"/>
+                  <a:srgbClr val="FF0000"/>
                 </a:solidFill>
                 <a:effectLst/>
                 <a:uLnTx/>
@@ -6775,10 +5783,10 @@
                 <a:ea typeface="+mn-ea"/>
                 <a:cs typeface="+mn-cs"/>
               </a:rPr>
-              <a:t> DE </a:t>
-            </a:r>
-            <a:r>
-              <a:rPr kumimoji="0" lang="pt-BR" sz="1050" b="1" i="0" u="none" strike="noStrike" kern="1200" cap="none" spc="0" normalizeH="0" baseline="0" noProof="0">
+              <a:t>e_dia</a:t>
+            </a:r>
+            <a:r>
+              <a:rPr kumimoji="0" lang="pt-BR" sz="1050" b="1" i="0" u="none" strike="noStrike" kern="1200" cap="none" spc="0" normalizeH="0" baseline="0" noProof="0" dirty="0">
                 <a:ln>
                   <a:noFill/>
                 </a:ln>
@@ -6792,10 +5800,10 @@
                 <a:ea typeface="+mn-ea"/>
                 <a:cs typeface="+mn-cs"/>
               </a:rPr>
-              <a:t>[e_mes]</a:t>
-            </a:r>
-            <a:r>
-              <a:rPr kumimoji="0" lang="pt-BR" sz="1050" b="1" i="0" u="none" strike="noStrike" kern="1200" cap="none" spc="0" normalizeH="0" baseline="0" noProof="0">
+              <a:t>]</a:t>
+            </a:r>
+            <a:r>
+              <a:rPr kumimoji="0" lang="pt-BR" sz="1050" b="1" i="0" u="none" strike="noStrike" kern="1200" cap="none" spc="0" normalizeH="0" baseline="0" noProof="0" dirty="0">
                 <a:ln>
                   <a:noFill/>
                 </a:ln>
@@ -6809,9 +5817,104 @@
                 <a:ea typeface="+mn-ea"/>
                 <a:cs typeface="+mn-cs"/>
               </a:rPr>
-              <a:t> DE 2024 – TRÊS LAGOAS/ MS.</a:t>
-            </a:r>
-            <a:endParaRPr kumimoji="0" lang="en-US" sz="1050" b="0" i="0" u="none" strike="noStrike" kern="1200" cap="none" spc="0" normalizeH="0" baseline="0" noProof="0">
+              <a:t> DE </a:t>
+            </a:r>
+            <a:r>
+              <a:rPr kumimoji="0" lang="pt-BR" sz="1050" b="1" i="0" u="none" strike="noStrike" kern="1200" cap="none" spc="0" normalizeH="0" baseline="0" noProof="0" dirty="0">
+                <a:ln>
+                  <a:noFill/>
+                </a:ln>
+                <a:solidFill>
+                  <a:srgbClr val="FF0000"/>
+                </a:solidFill>
+                <a:effectLst/>
+                <a:uLnTx/>
+                <a:uFillTx/>
+                <a:latin typeface="Arial"/>
+                <a:ea typeface="+mn-ea"/>
+                <a:cs typeface="+mn-cs"/>
+              </a:rPr>
+              <a:t>[</a:t>
+            </a:r>
+            <a:r>
+              <a:rPr kumimoji="0" lang="pt-BR" sz="1050" b="1" i="0" u="none" strike="noStrike" kern="1200" cap="none" spc="0" normalizeH="0" baseline="0" noProof="0" dirty="0" err="1">
+                <a:ln>
+                  <a:noFill/>
+                </a:ln>
+                <a:solidFill>
+                  <a:srgbClr val="FF0000"/>
+                </a:solidFill>
+                <a:effectLst/>
+                <a:uLnTx/>
+                <a:uFillTx/>
+                <a:latin typeface="Arial"/>
+                <a:ea typeface="+mn-ea"/>
+                <a:cs typeface="+mn-cs"/>
+              </a:rPr>
+              <a:t>e_mes</a:t>
+            </a:r>
+            <a:r>
+              <a:rPr kumimoji="0" lang="pt-BR" sz="1050" b="1" i="0" u="none" strike="noStrike" kern="1200" cap="none" spc="0" normalizeH="0" baseline="0" noProof="0" dirty="0">
+                <a:ln>
+                  <a:noFill/>
+                </a:ln>
+                <a:solidFill>
+                  <a:srgbClr val="FF0000"/>
+                </a:solidFill>
+                <a:effectLst/>
+                <a:uLnTx/>
+                <a:uFillTx/>
+                <a:latin typeface="Arial"/>
+                <a:ea typeface="+mn-ea"/>
+                <a:cs typeface="+mn-cs"/>
+              </a:rPr>
+              <a:t>]</a:t>
+            </a:r>
+            <a:r>
+              <a:rPr kumimoji="0" lang="pt-BR" sz="1050" b="1" i="0" u="none" strike="noStrike" kern="1200" cap="none" spc="0" normalizeH="0" baseline="0" noProof="0" dirty="0">
+                <a:ln>
+                  <a:noFill/>
+                </a:ln>
+                <a:solidFill>
+                  <a:srgbClr val="000000"/>
+                </a:solidFill>
+                <a:effectLst/>
+                <a:uLnTx/>
+                <a:uFillTx/>
+                <a:latin typeface="Arial"/>
+                <a:ea typeface="+mn-ea"/>
+                <a:cs typeface="+mn-cs"/>
+              </a:rPr>
+              <a:t> DE 2024 – </a:t>
+            </a:r>
+            <a:r>
+              <a:rPr lang="pt-BR" sz="1100" b="1" dirty="0">
+                <a:solidFill>
+                  <a:srgbClr val="000000"/>
+                </a:solidFill>
+                <a:latin typeface="Arial"/>
+              </a:rPr>
+              <a:t>[</a:t>
+            </a:r>
+            <a:r>
+              <a:rPr lang="pt-BR" sz="1100" b="1" dirty="0" err="1">
+                <a:solidFill>
+                  <a:srgbClr val="000000"/>
+                </a:solidFill>
+                <a:latin typeface="Arial"/>
+              </a:rPr>
+              <a:t>local_emissao</a:t>
+            </a:r>
+            <a:r>
+              <a:rPr lang="pt-BR" sz="1100" b="1" dirty="0">
+                <a:solidFill>
+                  <a:srgbClr val="000000"/>
+                </a:solidFill>
+                <a:latin typeface="Arial"/>
+              </a:rPr>
+              <a:t>].</a:t>
+            </a:r>
+            <a:endParaRPr kumimoji="0" lang="en-US" sz="1050" b="0" i="0" u="none" strike="noStrike" kern="1200" cap="none" spc="0" normalizeH="0" baseline="0" noProof="0" dirty="0">
               <a:ln>
                 <a:noFill/>
               </a:ln>
@@ -6971,7 +6074,7 @@
               <a:defRPr/>
             </a:pPr>
             <a:r>
-              <a:rPr kumimoji="0" lang="pt-BR" sz="900" b="0" i="0" u="none" strike="noStrike" kern="1200" cap="none" spc="0" normalizeH="0" baseline="0" noProof="0">
+              <a:rPr kumimoji="0" lang="pt-BR" sz="900" b="0" i="0" u="none" strike="noStrike" kern="1200" cap="none" spc="0" normalizeH="0" baseline="0" noProof="0" dirty="0">
                 <a:ln>
                   <a:noFill/>
                 </a:ln>
@@ -6988,7 +6091,7 @@
               <a:t>Código do Certificado: </a:t>
             </a:r>
             <a:r>
-              <a:rPr kumimoji="0" lang="pt-BR" sz="900" b="1" i="0" u="none" strike="noStrike" kern="1200" cap="none" spc="0" normalizeH="0" baseline="0" noProof="0">
+              <a:rPr kumimoji="0" lang="pt-BR" sz="900" b="1" i="0" u="none" strike="noStrike" kern="1200" cap="none" spc="0" normalizeH="0" baseline="0" noProof="0" dirty="0">
                 <a:ln>
                   <a:noFill/>
                 </a:ln>
@@ -7005,12 +6108,48 @@
               <a:t>LFSTS  </a:t>
             </a:r>
             <a:r>
-              <a:rPr kumimoji="0" lang="pt-BR" sz="900" b="1" i="0" u="none" strike="noStrike" kern="1200" cap="none" spc="0" normalizeH="0" baseline="0" noProof="0">
+              <a:rPr lang="pt-BR" sz="900" b="1" dirty="0">
+                <a:solidFill>
+                  <a:srgbClr val="FF0000"/>
+                </a:solidFill>
+                <a:latin typeface="Arial"/>
+              </a:rPr>
+              <a:t>[</a:t>
+            </a:r>
+            <a:r>
+              <a:rPr lang="pt-BR" sz="900" b="1" dirty="0" err="1">
+                <a:solidFill>
+                  <a:srgbClr val="FF0000"/>
+                </a:solidFill>
+                <a:latin typeface="Arial"/>
+              </a:rPr>
+              <a:t>codigo</a:t>
+            </a:r>
+            <a:r>
+              <a:rPr lang="pt-BR" sz="900" b="1" dirty="0">
+                <a:solidFill>
+                  <a:srgbClr val="FF0000"/>
+                </a:solidFill>
+                <a:latin typeface="Arial"/>
+              </a:rPr>
+              <a:t>]</a:t>
+            </a:r>
+            <a:r>
+              <a:rPr lang="pt-BR" sz="900" b="1" dirty="0">
+                <a:solidFill>
+                  <a:srgbClr val="000000"/>
+                </a:solidFill>
+                <a:latin typeface="Arial"/>
+              </a:rPr>
+              <a:t>/</a:t>
+            </a:r>
+            <a:r>
+              <a:rPr kumimoji="0" lang="pt-BR" sz="900" b="1" i="0" u="none" strike="noStrike" kern="1200" cap="none" spc="0" normalizeH="0" baseline="0" noProof="0" dirty="0">
                 <a:ln>
                   <a:noFill/>
                 </a:ln>
                 <a:solidFill>
-                  <a:srgbClr val="FF0000"/>
+                  <a:srgbClr val="000000"/>
                 </a:solidFill>
                 <a:effectLst/>
                 <a:uLnTx/>
@@ -7019,26 +6158,9 @@
                 <a:ea typeface="+mn-ea"/>
                 <a:cs typeface="+mn-cs"/>
               </a:rPr>
-              <a:t>xxxx</a:t>
-            </a:r>
-            <a:r>
-              <a:rPr kumimoji="0" lang="pt-BR" sz="900" b="1" i="0" u="none" strike="noStrike" kern="1200" cap="none" spc="0" normalizeH="0" baseline="0" noProof="0">
-                <a:ln>
-                  <a:noFill/>
-                </a:ln>
-                <a:solidFill>
-                  <a:srgbClr val="000000"/>
-                </a:solidFill>
-                <a:effectLst/>
-                <a:uLnTx/>
-                <a:uFillTx/>
-                <a:latin typeface="Arial"/>
-                <a:ea typeface="+mn-ea"/>
-                <a:cs typeface="+mn-cs"/>
-              </a:rPr>
-              <a:t>/2024</a:t>
-            </a:r>
-            <a:endParaRPr kumimoji="0" lang="en-US" sz="900" b="0" i="0" u="none" strike="noStrike" kern="1200" cap="none" spc="0" normalizeH="0" baseline="0" noProof="0">
+              <a:t>2024</a:t>
+            </a:r>
+            <a:endParaRPr kumimoji="0" lang="en-US" sz="900" b="0" i="0" u="none" strike="noStrike" kern="1200" cap="none" spc="0" normalizeH="0" baseline="0" noProof="0" dirty="0">
               <a:ln>
                 <a:noFill/>
               </a:ln>
@@ -7310,61 +6432,6 @@
       </p:grpSpPr>
       <p:sp>
         <p:nvSpPr>
-          <p:cNvPr id="9" name="Caixa de Texto 2"/>
-          <p:cNvSpPr txBox="1">
-            <a:spLocks noChangeArrowheads="1"/>
-          </p:cNvSpPr>
-          <p:nvPr/>
-        </p:nvSpPr>
-        <p:spPr bwMode="auto">
-          <a:xfrm>
-            <a:off x="6478903" y="4933862"/>
-            <a:ext cx="1771651" cy="307777"/>
-          </a:xfrm>
-          <a:prstGeom prst="rect">
-            <a:avLst/>
-          </a:prstGeom>
-          <a:noFill/>
-          <a:ln w="9525">
-            <a:noFill/>
-            <a:miter lim="800000"/>
-            <a:headEnd/>
-            <a:tailEnd/>
-          </a:ln>
-        </p:spPr>
-        <p:txBody>
-          <a:bodyPr rot="0" vert="horz" wrap="square" lIns="91440" tIns="45720" rIns="91440" bIns="45720" anchor="t" anchorCtr="0">
-            <a:spAutoFit/>
-          </a:bodyPr>
-          <a:lstStyle/>
-          <a:p>
-            <a:r>
-              <a:rPr lang="pt-BR" sz="700" b="1" dirty="0">
-                <a:solidFill>
-                  <a:srgbClr val="FF0000"/>
-                </a:solidFill>
-                <a:latin typeface="Arial" panose="020B0604020202020204" pitchFamily="34" charset="0"/>
-                <a:cs typeface="Arial" panose="020B0604020202020204" pitchFamily="34" charset="0"/>
-              </a:rPr>
-              <a:t>METODOLOGIA: PRESENCIAL </a:t>
-            </a:r>
-          </a:p>
-          <a:p>
-            <a:r>
-              <a:rPr lang="pt-BR" sz="700" b="1" dirty="0">
-                <a:solidFill>
-                  <a:srgbClr val="FF0000"/>
-                </a:solidFill>
-                <a:latin typeface="Arial" panose="020B0604020202020204" pitchFamily="34" charset="0"/>
-                <a:cs typeface="Arial" panose="020B0604020202020204" pitchFamily="34" charset="0"/>
-              </a:rPr>
-              <a:t>C.H 08 HORAS AULAS</a:t>
-            </a:r>
-          </a:p>
-        </p:txBody>
-      </p:sp>
-      <p:sp>
-        <p:nvSpPr>
           <p:cNvPr id="3" name="Retângulo 2"/>
           <p:cNvSpPr/>
           <p:nvPr/>
@@ -7379,7 +6446,7 @@
           </a:prstGeom>
         </p:spPr>
         <p:txBody>
-          <a:bodyPr wrap="square">
+          <a:bodyPr wrap="square" lIns="91440" tIns="45720" rIns="91440" bIns="45720" anchor="t">
             <a:spAutoFit/>
           </a:bodyPr>
           <a:lstStyle/>
@@ -7387,8 +6454,8 @@
             <a:pPr algn="ctr"/>
             <a:r>
               <a:rPr lang="pt-BR" sz="600" b="1" dirty="0">
-                <a:latin typeface="Arial" panose="020B0604020202020204" pitchFamily="34" charset="0"/>
-                <a:cs typeface="Arial" panose="020B0604020202020204" pitchFamily="34" charset="0"/>
+                <a:latin typeface="Arial"/>
+                <a:cs typeface="Arial"/>
               </a:rPr>
               <a:t>LOCAL DO TREINAMENTO: </a:t>
             </a:r>
@@ -7397,11 +6464,38 @@
                 <a:solidFill>
                   <a:srgbClr val="FF0000"/>
                 </a:solidFill>
-                <a:latin typeface="Arial" panose="020B0604020202020204" pitchFamily="34" charset="0"/>
-                <a:cs typeface="Arial" panose="020B0604020202020204" pitchFamily="34" charset="0"/>
-              </a:rPr>
-              <a:t>RODOVIA BR 262, KM 25 ZONA RURAL, TRÊS LAGOAS - MS, 79601-970</a:t>
-            </a:r>
+                <a:latin typeface="Arial"/>
+                <a:cs typeface="Arial"/>
+              </a:rPr>
+              <a:t>[</a:t>
+            </a:r>
+            <a:r>
+              <a:rPr lang="pt-BR" sz="600" dirty="0" err="1">
+                <a:solidFill>
+                  <a:srgbClr val="FF0000"/>
+                </a:solidFill>
+                <a:latin typeface="Arial"/>
+                <a:cs typeface="Arial"/>
+              </a:rPr>
+              <a:t>local_treinamento</a:t>
+            </a:r>
+            <a:r>
+              <a:rPr lang="pt-BR" sz="600" dirty="0">
+                <a:solidFill>
+                  <a:srgbClr val="FF0000"/>
+                </a:solidFill>
+                <a:latin typeface="Arial"/>
+                <a:cs typeface="Arial"/>
+              </a:rPr>
+              <a:t>]</a:t>
+            </a:r>
+            <a:endParaRPr lang="pt-BR" sz="600" dirty="0">
+              <a:solidFill>
+                <a:srgbClr val="FF0000"/>
+              </a:solidFill>
+              <a:latin typeface="Arial" panose="020B0604020202020204" pitchFamily="34" charset="0"/>
+              <a:cs typeface="Arial" panose="020B0604020202020204" pitchFamily="34" charset="0"/>
+            </a:endParaRPr>
           </a:p>
         </p:txBody>
       </p:sp>
@@ -7414,7 +6508,7 @@
         <p:spPr>
           <a:xfrm>
             <a:off x="6298284" y="1349677"/>
-            <a:ext cx="2961874" cy="1015663"/>
+            <a:ext cx="2961874" cy="1046440"/>
           </a:xfrm>
           <a:prstGeom prst="rect">
             <a:avLst/>
@@ -7426,19 +6520,23 @@
           </a:ln>
         </p:spPr>
         <p:txBody>
-          <a:bodyPr wrap="square">
+          <a:bodyPr wrap="square" lIns="91440" tIns="45720" rIns="91440" bIns="45720" anchor="t">
             <a:spAutoFit/>
           </a:bodyPr>
           <a:lstStyle/>
           <a:p>
             <a:pPr algn="ctr"/>
             <a:r>
-              <a:rPr lang="pt-BR" sz="600" b="1" dirty="0">
-                <a:latin typeface="Arial" panose="020B0604020202020204" pitchFamily="34" charset="0"/>
-                <a:cs typeface="Arial" panose="020B0604020202020204" pitchFamily="34" charset="0"/>
-              </a:rPr>
-              <a:t>RESPONSÁVEL TÉCNICA DA CAPACITAÇÃO</a:t>
-            </a:r>
+              <a:rPr lang="pt-BR" sz="700" b="1" dirty="0">
+                <a:latin typeface="Arial"/>
+                <a:cs typeface="Arial"/>
+              </a:rPr>
+              <a:t>[assinatura_3]</a:t>
+            </a:r>
+            <a:endParaRPr lang="pt-BR" sz="700">
+              <a:ea typeface="Calibri"/>
+              <a:cs typeface="Calibri"/>
+            </a:endParaRPr>
           </a:p>
           <a:p>
             <a:pPr algn="ctr"/>
@@ -7485,12 +6583,12 @@
                 <a:solidFill>
                   <a:srgbClr val="FF0000"/>
                 </a:solidFill>
-                <a:latin typeface="Arial" panose="020B0604020202020204" pitchFamily="34" charset="0"/>
-                <a:ea typeface="Times New Roman" panose="02020603050405020304" pitchFamily="18" charset="0"/>
-                <a:cs typeface="Arial" panose="020B0604020202020204" pitchFamily="34" charset="0"/>
-              </a:rPr>
-              <a:t>CLEDIONE JUNQUEIRA DE ABREU </a:t>
-            </a:r>
+                <a:latin typeface="Arial"/>
+                <a:cs typeface="Arial"/>
+              </a:rPr>
+              <a:t>[nome3]</a:t>
+            </a:r>
+            <a:endParaRPr lang="pt-BR" dirty="0"/>
           </a:p>
           <a:p>
             <a:pPr algn="ctr"/>
@@ -7551,43 +6649,32 @@
         <p:spPr>
           <a:xfrm>
             <a:off x="2269720" y="439042"/>
-            <a:ext cx="6990438" cy="861774"/>
-          </a:xfrm>
-          <a:prstGeom prst="rect">
-            <a:avLst/>
-          </a:prstGeom>
-        </p:spPr>
-        <p:txBody>
-          <a:bodyPr wrap="square">
+            <a:ext cx="6990438" cy="615553"/>
+          </a:xfrm>
+          <a:prstGeom prst="rect">
+            <a:avLst/>
+          </a:prstGeom>
+        </p:spPr>
+        <p:txBody>
+          <a:bodyPr wrap="square" lIns="91440" tIns="45720" rIns="91440" bIns="45720" anchor="t">
             <a:spAutoFit/>
           </a:bodyPr>
           <a:lstStyle/>
           <a:p>
             <a:pPr algn="ctr"/>
             <a:r>
-              <a:rPr lang="pt-BR" b="1" dirty="0">
-                <a:ea typeface="Times New Roman"/>
-              </a:rPr>
-              <a:t>TREINAMENTO DE </a:t>
-            </a:r>
-            <a:r>
-              <a:rPr lang="pt-BR" sz="1800" b="1" dirty="0">
-                <a:ea typeface="Times New Roman"/>
-              </a:rPr>
-              <a:t>SEGURANÇA NO TRABALHO </a:t>
-            </a:r>
-            <a:endParaRPr lang="pt-BR" b="1" dirty="0">
-              <a:ea typeface="Times New Roman"/>
-            </a:endParaRPr>
-          </a:p>
-          <a:p>
-            <a:pPr algn="ctr"/>
-            <a:r>
-              <a:rPr lang="pt-BR" sz="1600" b="1" dirty="0">
-                <a:ea typeface="Times New Roman"/>
-              </a:rPr>
-              <a:t>HABILITAÇÃO PARA OPERADOR DE PONTE ROLANTE CARGA SECA</a:t>
-            </a:r>
+              <a:rPr lang="pt-BR" b="1"/>
+              <a:t>[</a:t>
+            </a:r>
+            <a:r>
+              <a:rPr lang="pt-BR" b="1" err="1"/>
+              <a:t>titulo_treinamento</a:t>
+            </a:r>
+            <a:r>
+              <a:rPr lang="pt-BR" b="1"/>
+              <a:t>]</a:t>
+            </a:r>
+            <a:endParaRPr lang="pt-BR"/>
           </a:p>
           <a:p>
             <a:pPr algn="ctr"/>
@@ -7595,7 +6682,19 @@
               <a:rPr lang="pt-BR" sz="1600" dirty="0">
                 <a:ea typeface="Times New Roman"/>
               </a:rPr>
-              <a:t>DANIELI CENTRO CRANES | PR N° 102 E PR N° 105</a:t>
+              <a:t>[</a:t>
+            </a:r>
+            <a:r>
+              <a:rPr lang="pt-BR" sz="1600" dirty="0" err="1">
+                <a:ea typeface="Times New Roman"/>
+              </a:rPr>
+              <a:t>portaria_treinamento</a:t>
+            </a:r>
+            <a:r>
+              <a:rPr lang="pt-BR" sz="1600" dirty="0">
+                <a:ea typeface="Times New Roman"/>
+              </a:rPr>
+              <a:t>]</a:t>
             </a:r>
             <a:endParaRPr lang="pt-BR" sz="800" dirty="0">
               <a:ea typeface="Times New Roman"/>
@@ -7618,7 +6717,7 @@
         <p:spPr>
           <a:xfrm>
             <a:off x="6298284" y="3618742"/>
-            <a:ext cx="2961874" cy="1015663"/>
+            <a:ext cx="2961874" cy="1031051"/>
           </a:xfrm>
           <a:prstGeom prst="rect">
             <a:avLst/>
@@ -7630,19 +6729,23 @@
           </a:ln>
         </p:spPr>
         <p:txBody>
-          <a:bodyPr wrap="square">
+          <a:bodyPr wrap="square" lIns="91440" tIns="45720" rIns="91440" bIns="45720" anchor="t">
             <a:spAutoFit/>
           </a:bodyPr>
           <a:lstStyle/>
           <a:p>
             <a:pPr algn="ctr"/>
             <a:r>
-              <a:rPr lang="pt-BR" sz="600" b="1" dirty="0">
-                <a:latin typeface="Arial" panose="020B0604020202020204" pitchFamily="34" charset="0"/>
-                <a:cs typeface="Arial" panose="020B0604020202020204" pitchFamily="34" charset="0"/>
-              </a:rPr>
-              <a:t>INSTRUTOR </a:t>
-            </a:r>
+              <a:rPr lang="pt-BR" sz="700" b="1" dirty="0">
+                <a:latin typeface="Arial"/>
+                <a:cs typeface="Arial"/>
+              </a:rPr>
+              <a:t>[assinatura_2]</a:t>
+            </a:r>
+            <a:endParaRPr lang="pt-BR" sz="700" b="1" dirty="0">
+              <a:latin typeface="Arial" panose="020B0604020202020204" pitchFamily="34" charset="0"/>
+              <a:cs typeface="Arial" panose="020B0604020202020204" pitchFamily="34" charset="0"/>
+            </a:endParaRPr>
           </a:p>
           <a:p>
             <a:pPr algn="ctr"/>
@@ -7696,44 +6799,52 @@
                 <a:solidFill>
                   <a:srgbClr val="FF0000"/>
                 </a:solidFill>
-                <a:latin typeface="Arial" panose="020B0604020202020204" pitchFamily="34" charset="0"/>
-                <a:cs typeface="Arial" panose="020B0604020202020204" pitchFamily="34" charset="0"/>
-              </a:rPr>
-              <a:t>RICARDO SILVA DE ALMEIDA</a:t>
-            </a:r>
-          </a:p>
-          <a:p>
-            <a:pPr algn="ctr"/>
-            <a:r>
-              <a:rPr lang="pt-BR" sz="600" b="1" dirty="0">
-                <a:solidFill>
-                  <a:srgbClr val="FF0000"/>
-                </a:solidFill>
-                <a:latin typeface="Arial" panose="020B0604020202020204" pitchFamily="34" charset="0"/>
-                <a:cs typeface="Arial" panose="020B0604020202020204" pitchFamily="34" charset="0"/>
-              </a:rPr>
-              <a:t>ENGENHEIRO ELETRICISTA - CREA N° 70237/ MS</a:t>
-            </a:r>
-          </a:p>
-          <a:p>
-            <a:pPr algn="ctr"/>
-            <a:r>
-              <a:rPr lang="pt-BR" sz="600" b="1" dirty="0">
-                <a:solidFill>
-                  <a:srgbClr val="FF0000"/>
-                </a:solidFill>
-                <a:latin typeface="Arial" panose="020B0604020202020204" pitchFamily="34" charset="0"/>
-                <a:cs typeface="Arial" panose="020B0604020202020204" pitchFamily="34" charset="0"/>
-              </a:rPr>
-              <a:t>OPERADOR DE PONTE ROLANTE</a:t>
-            </a:r>
-            <a:endParaRPr lang="pt-BR" sz="600" dirty="0">
+                <a:latin typeface="Arial"/>
+                <a:cs typeface="Arial"/>
+              </a:rPr>
+              <a:t>[nome2]</a:t>
+            </a:r>
+            <a:endParaRPr lang="pt-BR" sz="600" b="1" dirty="0">
               <a:solidFill>
                 <a:srgbClr val="FF0000"/>
               </a:solidFill>
               <a:latin typeface="Arial" panose="020B0604020202020204" pitchFamily="34" charset="0"/>
               <a:cs typeface="Arial" panose="020B0604020202020204" pitchFamily="34" charset="0"/>
             </a:endParaRPr>
+          </a:p>
+          <a:p>
+            <a:pPr algn="ctr"/>
+            <a:r>
+              <a:rPr lang="pt-BR" sz="600">
+                <a:solidFill>
+                  <a:srgbClr val="000000"/>
+                </a:solidFill>
+                <a:latin typeface="Arial"/>
+                <a:cs typeface="Arial"/>
+              </a:rPr>
+              <a:t>[qualificação_profissional1]</a:t>
+            </a:r>
+            <a:endParaRPr lang="en-US" sz="600">
+              <a:solidFill>
+                <a:srgbClr val="000000"/>
+              </a:solidFill>
+              <a:latin typeface="Arial"/>
+              <a:cs typeface="Arial"/>
+            </a:endParaRPr>
+          </a:p>
+          <a:p>
+            <a:pPr algn="ctr"/>
+            <a:r>
+              <a:rPr lang="pt-BR" sz="600" dirty="0">
+                <a:solidFill>
+                  <a:srgbClr val="000000"/>
+                </a:solidFill>
+                <a:latin typeface="Arial"/>
+                <a:cs typeface="Arial"/>
+              </a:rPr>
+              <a:t>[registro_profissional1]</a:t>
+            </a:r>
+            <a:endParaRPr lang="pt-BR" dirty="0"/>
           </a:p>
         </p:txBody>
       </p:sp>
@@ -7760,7 +6871,7 @@
           <a:noFill/>
         </p:spPr>
         <p:txBody>
-          <a:bodyPr wrap="square">
+          <a:bodyPr wrap="square" lIns="91440" tIns="45720" rIns="91440" bIns="45720" anchor="t">
             <a:spAutoFit/>
           </a:bodyPr>
           <a:lstStyle/>
@@ -7781,10 +6892,166 @@
                 <a:solidFill>
                   <a:srgbClr val="FF0000"/>
                 </a:solidFill>
+                <a:latin typeface="Arial"/>
+                <a:cs typeface="Arial"/>
+              </a:rPr>
+              <a:t>[</a:t>
+            </a:r>
+            <a:r>
+              <a:rPr lang="es-ES" sz="600" b="1" dirty="0" err="1">
+                <a:solidFill>
+                  <a:srgbClr val="FF0000"/>
+                </a:solidFill>
+                <a:latin typeface="Arial"/>
+                <a:cs typeface="Arial"/>
+              </a:rPr>
+              <a:t>contrante</a:t>
+            </a:r>
+            <a:r>
+              <a:rPr lang="es-ES" sz="600" b="1" dirty="0">
+                <a:solidFill>
+                  <a:srgbClr val="FF0000"/>
+                </a:solidFill>
+                <a:latin typeface="Arial"/>
+                <a:cs typeface="Arial"/>
+              </a:rPr>
+              <a:t>] - CNPJ: [</a:t>
+            </a:r>
+            <a:r>
+              <a:rPr lang="es-ES" sz="600" b="1" dirty="0" err="1">
+                <a:solidFill>
+                  <a:srgbClr val="FF0000"/>
+                </a:solidFill>
+                <a:latin typeface="Arial"/>
+                <a:cs typeface="Arial"/>
+              </a:rPr>
+              <a:t>contratante_cnpj</a:t>
+            </a:r>
+            <a:r>
+              <a:rPr lang="es-ES" sz="600" b="1" dirty="0">
+                <a:solidFill>
+                  <a:srgbClr val="FF0000"/>
+                </a:solidFill>
+                <a:latin typeface="Arial"/>
+                <a:cs typeface="Arial"/>
+              </a:rPr>
+              <a:t>]</a:t>
+            </a:r>
+            <a:endParaRPr lang="pt-BR" sz="600" b="1" dirty="0">
+              <a:solidFill>
+                <a:srgbClr val="FF0000"/>
+              </a:solidFill>
+              <a:latin typeface="Arial"/>
+              <a:cs typeface="Arial"/>
+            </a:endParaRPr>
+          </a:p>
+        </p:txBody>
+      </p:sp>
+      <p:sp>
+        <p:nvSpPr>
+          <p:cNvPr id="18" name="CaixaDeTexto 17">
+            <a:extLst>
+              <a:ext uri="{FF2B5EF4-FFF2-40B4-BE49-F238E27FC236}">
+                <a16:creationId xmlns:a16="http://schemas.microsoft.com/office/drawing/2014/main" id="{21238E25-695B-6949-3B1F-C5DB23BC9A09}"/>
+              </a:ext>
+            </a:extLst>
+          </p:cNvPr>
+          <p:cNvSpPr txBox="1"/>
+          <p:nvPr/>
+        </p:nvSpPr>
+        <p:spPr>
+          <a:xfrm>
+            <a:off x="6298284" y="2442699"/>
+            <a:ext cx="2961874" cy="1154162"/>
+          </a:xfrm>
+          <a:prstGeom prst="rect">
+            <a:avLst/>
+          </a:prstGeom>
+          <a:noFill/>
+          <a:ln>
+            <a:solidFill>
+              <a:schemeClr val="tx1"/>
+            </a:solidFill>
+          </a:ln>
+        </p:spPr>
+        <p:txBody>
+          <a:bodyPr wrap="square" lIns="91440" tIns="45720" rIns="91440" bIns="45720" anchor="t">
+            <a:spAutoFit/>
+          </a:bodyPr>
+          <a:lstStyle/>
+          <a:p>
+            <a:pPr algn="ctr"/>
+            <a:r>
+              <a:rPr lang="pt-BR" sz="700" b="1" dirty="0">
+                <a:latin typeface="Arial"/>
+                <a:cs typeface="Arial"/>
+              </a:rPr>
+              <a:t>[assinatura_1] </a:t>
+            </a:r>
+          </a:p>
+          <a:p>
+            <a:pPr algn="ctr"/>
+            <a:endParaRPr lang="pt-BR" sz="600" b="1" dirty="0">
+              <a:latin typeface="Arial" panose="020B0604020202020204" pitchFamily="34" charset="0"/>
+              <a:cs typeface="Arial" panose="020B0604020202020204" pitchFamily="34" charset="0"/>
+            </a:endParaRPr>
+          </a:p>
+          <a:p>
+            <a:pPr algn="ctr"/>
+            <a:endParaRPr lang="pt-BR" sz="600" b="1" dirty="0">
+              <a:latin typeface="Arial" panose="020B0604020202020204" pitchFamily="34" charset="0"/>
+              <a:cs typeface="Arial" panose="020B0604020202020204" pitchFamily="34" charset="0"/>
+            </a:endParaRPr>
+          </a:p>
+          <a:p>
+            <a:pPr algn="ctr"/>
+            <a:endParaRPr lang="pt-BR" sz="600" b="1" dirty="0">
+              <a:latin typeface="Arial" panose="020B0604020202020204" pitchFamily="34" charset="0"/>
+              <a:cs typeface="Arial" panose="020B0604020202020204" pitchFamily="34" charset="0"/>
+            </a:endParaRPr>
+          </a:p>
+          <a:p>
+            <a:pPr algn="ctr"/>
+            <a:endParaRPr lang="pt-BR" sz="600" b="1" dirty="0">
+              <a:latin typeface="Arial" panose="020B0604020202020204" pitchFamily="34" charset="0"/>
+              <a:cs typeface="Arial" panose="020B0604020202020204" pitchFamily="34" charset="0"/>
+            </a:endParaRPr>
+          </a:p>
+          <a:p>
+            <a:pPr algn="ctr"/>
+            <a:endParaRPr lang="pt-BR" sz="600" b="1" dirty="0">
+              <a:latin typeface="Arial" panose="020B0604020202020204" pitchFamily="34" charset="0"/>
+              <a:cs typeface="Arial" panose="020B0604020202020204" pitchFamily="34" charset="0"/>
+            </a:endParaRPr>
+          </a:p>
+          <a:p>
+            <a:pPr algn="ctr"/>
+            <a:endParaRPr lang="pt-BR" sz="600" b="1" dirty="0">
+              <a:latin typeface="Arial" panose="020B0604020202020204" pitchFamily="34" charset="0"/>
+              <a:cs typeface="Arial" panose="020B0604020202020204" pitchFamily="34" charset="0"/>
+            </a:endParaRPr>
+          </a:p>
+          <a:p>
+            <a:pPr algn="ctr"/>
+            <a:r>
+              <a:rPr lang="pt-BR" sz="600" dirty="0">
                 <a:latin typeface="Arial" panose="020B0604020202020204" pitchFamily="34" charset="0"/>
                 <a:cs typeface="Arial" panose="020B0604020202020204" pitchFamily="34" charset="0"/>
               </a:rPr>
-              <a:t>SITREL – SIDERURGICA TRES LAGOAS LTDA - CNPJ: 07.084.117/0001-40</a:t>
+              <a:t>______________________________________</a:t>
+            </a:r>
+          </a:p>
+          <a:p>
+            <a:pPr algn="ctr"/>
+            <a:r>
+              <a:rPr lang="pt-BR" sz="600" b="1" dirty="0">
+                <a:solidFill>
+                  <a:srgbClr val="FF0000"/>
+                </a:solidFill>
+                <a:latin typeface="Arial"/>
+                <a:cs typeface="Arial"/>
+              </a:rPr>
+              <a:t>[nome1]</a:t>
             </a:r>
             <a:endParaRPr lang="pt-BR" sz="600" b="1" dirty="0">
               <a:solidFill>
@@ -7794,14 +7061,48 @@
               <a:cs typeface="Arial" panose="020B0604020202020204" pitchFamily="34" charset="0"/>
             </a:endParaRPr>
           </a:p>
+          <a:p>
+            <a:pPr algn="ctr"/>
+            <a:r>
+              <a:rPr lang="pt-BR" sz="600" dirty="0">
+                <a:solidFill>
+                  <a:srgbClr val="000000"/>
+                </a:solidFill>
+                <a:latin typeface="Arial"/>
+                <a:cs typeface="Arial"/>
+              </a:rPr>
+              <a:t>[qualificação_profissional1]</a:t>
+            </a:r>
+            <a:endParaRPr lang="en-US" sz="600" dirty="0">
+              <a:solidFill>
+                <a:srgbClr val="000000"/>
+              </a:solidFill>
+              <a:latin typeface="Arial"/>
+              <a:cs typeface="Arial"/>
+            </a:endParaRPr>
+          </a:p>
+          <a:p>
+            <a:pPr algn="ctr"/>
+            <a:r>
+              <a:rPr lang="pt-BR" sz="600" dirty="0">
+                <a:solidFill>
+                  <a:srgbClr val="000000"/>
+                </a:solidFill>
+                <a:latin typeface="Arial"/>
+                <a:cs typeface="Arial"/>
+              </a:rPr>
+              <a:t>[registro_profissional1]</a:t>
+            </a:r>
+            <a:endParaRPr lang="pt-BR" sz="600" dirty="0"/>
+          </a:p>
         </p:txBody>
       </p:sp>
       <p:graphicFrame>
         <p:nvGraphicFramePr>
-          <p:cNvPr id="16" name="Tabela 15">
+          <p:cNvPr id="8" name="Tabela 7">
             <a:extLst>
               <a:ext uri="{FF2B5EF4-FFF2-40B4-BE49-F238E27FC236}">
-                <a16:creationId xmlns:a16="http://schemas.microsoft.com/office/drawing/2014/main" id="{7CE370CC-9FA0-3517-1298-AA2AD72AF46B}"/>
+                <a16:creationId xmlns:a16="http://schemas.microsoft.com/office/drawing/2014/main" id="{5F3468D5-942E-E76E-E7E0-BD405D2CC970}"/>
               </a:ext>
             </a:extLst>
           </p:cNvPr>
@@ -7811,177 +7112,128 @@
           <p:nvPr>
             <p:extLst>
               <p:ext uri="{D42A27DB-BD31-4B8C-83A1-F6EECF244321}">
-                <p14:modId xmlns:p14="http://schemas.microsoft.com/office/powerpoint/2010/main" val="2504278656"/>
+                <p14:modId xmlns:p14="http://schemas.microsoft.com/office/powerpoint/2010/main" val="2113266134"/>
               </p:ext>
             </p:extLst>
           </p:nvPr>
         </p:nvGraphicFramePr>
         <p:xfrm>
-          <a:off x="439472" y="1357586"/>
-          <a:ext cx="5784164" cy="1780200"/>
+          <a:off x="365099" y="1364646"/>
+          <a:ext cx="5859401" cy="3504989"/>
         </p:xfrm>
         <a:graphic>
           <a:graphicData uri="http://schemas.openxmlformats.org/drawingml/2006/table">
             <a:tbl>
-              <a:tblPr firstRow="1" firstCol="1" bandRow="1"/>
+              <a:tblPr bandRow="1">
+                <a:tableStyleId>{5C22544A-7EE6-4342-B048-85BDC9FD1C3A}</a:tableStyleId>
+              </a:tblPr>
               <a:tblGrid>
-                <a:gridCol w="2273248">
+                <a:gridCol w="5859401">
                   <a:extLst>
                     <a:ext uri="{9D8B030D-6E8A-4147-A177-3AD203B41FA5}">
-                      <a16:colId xmlns:a16="http://schemas.microsoft.com/office/drawing/2014/main" val="305060679"/>
-                    </a:ext>
-                  </a:extLst>
-                </a:gridCol>
-                <a:gridCol w="3510916">
-                  <a:extLst>
-                    <a:ext uri="{9D8B030D-6E8A-4147-A177-3AD203B41FA5}">
-                      <a16:colId xmlns:a16="http://schemas.microsoft.com/office/drawing/2014/main" val="1953053597"/>
+                      <a16:colId xmlns:a16="http://schemas.microsoft.com/office/drawing/2014/main" val="3857060526"/>
                     </a:ext>
                   </a:extLst>
                 </a:gridCol>
               </a:tblGrid>
-              <a:tr h="180000">
+              <a:tr h="391514">
                 <a:tc>
                   <a:txBody>
                     <a:bodyPr/>
                     <a:lstStyle/>
                     <a:p>
-                      <a:pPr marL="22860">
-                        <a:spcAft>
-                          <a:spcPts val="0"/>
-                        </a:spcAft>
+                      <a:pPr fontAlgn="base">
+                        <a:lnSpc>
+                          <a:spcPts val="1050"/>
+                        </a:lnSpc>
                       </a:pPr>
                       <a:r>
-                        <a:rPr lang="pt-BR" sz="700" b="1" dirty="0">
+                        <a:rPr lang="pt-BR" sz="900" b="1" dirty="0">
+                          <a:effectLst/>
+                          <a:latin typeface="Arial"/>
+                        </a:rPr>
+                        <a:t>METODOLOGIA DE ENSINO [modalidade]- [</a:t>
+                      </a:r>
+                      <a:r>
+                        <a:rPr lang="pt-BR" sz="900" b="1" i="0" u="none" strike="noStrike" noProof="0" dirty="0">
                           <a:solidFill>
                             <a:srgbClr val="000000"/>
                           </a:solidFill>
                           <a:effectLst/>
-                          <a:latin typeface="+mn-lt"/>
-                          <a:ea typeface="Calibri" panose="020F0502020204030204" pitchFamily="34" charset="0"/>
-                          <a:cs typeface="Times New Roman" panose="02020603050405020304" pitchFamily="18" charset="0"/>
+                          <a:latin typeface="Arial"/>
                         </a:rPr>
-                        <a:t>Instrutor: </a:t>
+                        <a:t>metodologia</a:t>
                       </a:r>
                       <a:r>
-                        <a:rPr lang="pt-BR" sz="700" b="1" dirty="0">
-                          <a:solidFill>
-                            <a:srgbClr val="FF0000"/>
-                          </a:solidFill>
+                        <a:rPr lang="pt-BR" sz="900" b="1" dirty="0">
                           <a:effectLst/>
-                          <a:latin typeface="+mn-lt"/>
-                          <a:ea typeface="Calibri" panose="020F0502020204030204" pitchFamily="34" charset="0"/>
-                          <a:cs typeface="Times New Roman" panose="02020603050405020304" pitchFamily="18" charset="0"/>
+                          <a:latin typeface="Arial"/>
                         </a:rPr>
-                        <a:t>LUIS FERNANDO SOARES</a:t>
+                        <a:t>] – [</a:t>
                       </a:r>
+                      <a:r>
+                        <a:rPr lang="pt-BR" sz="900" b="1" dirty="0" err="1">
+                          <a:effectLst/>
+                          <a:latin typeface="Arial"/>
+                        </a:rPr>
+                        <a:t>tipo_formacao</a:t>
+                      </a:r>
+                      <a:r>
+                        <a:rPr lang="pt-BR" sz="900" b="1" dirty="0">
+                          <a:effectLst/>
+                          <a:latin typeface="Arial"/>
+                        </a:rPr>
+                        <a:t>] - C.H [</a:t>
+                      </a:r>
+                      <a:r>
+                        <a:rPr lang="pt-BR" sz="900" b="1" dirty="0" err="1">
+                          <a:effectLst/>
+                          <a:latin typeface="Arial"/>
+                        </a:rPr>
+                        <a:t>carga_horaria</a:t>
+                      </a:r>
+                      <a:r>
+                        <a:rPr lang="pt-BR" sz="900" b="1" dirty="0">
+                          <a:effectLst/>
+                          <a:latin typeface="Arial"/>
+                        </a:rPr>
+                        <a:t>] horas/aulas</a:t>
+                      </a:r>
+                      <a:endParaRPr lang="pt-BR" sz="900">
+                        <a:effectLst/>
+                        <a:latin typeface="Arial"/>
+                      </a:endParaRPr>
                     </a:p>
                   </a:txBody>
-                  <a:tcPr marL="57433" marR="57433" marT="0" marB="0" anchor="ctr">
-                    <a:lnL w="12700" cap="flat" cmpd="sng" algn="ctr">
+                  <a:tcPr anchor="ctr">
+                    <a:lnL w="12268" cap="flat" cmpd="sng" algn="ctr">
                       <a:solidFill>
-                        <a:srgbClr val="000000"/>
+                        <a:srgbClr val="808080"/>
                       </a:solidFill>
                       <a:prstDash val="solid"/>
                       <a:round/>
                       <a:headEnd type="none" w="med" len="med"/>
                       <a:tailEnd type="none" w="med" len="med"/>
                     </a:lnL>
-                    <a:lnR w="12700" cap="flat" cmpd="sng" algn="ctr">
+                    <a:lnR w="12268" cap="flat" cmpd="sng" algn="ctr">
                       <a:solidFill>
-                        <a:srgbClr val="000000"/>
+                        <a:srgbClr val="808080"/>
                       </a:solidFill>
                       <a:prstDash val="solid"/>
                       <a:round/>
                       <a:headEnd type="none" w="med" len="med"/>
                       <a:tailEnd type="none" w="med" len="med"/>
                     </a:lnR>
-                    <a:lnT w="12700" cap="flat" cmpd="sng" algn="ctr">
+                    <a:lnT w="12268" cap="flat" cmpd="sng" algn="ctr">
                       <a:solidFill>
-                        <a:srgbClr val="000000"/>
+                        <a:srgbClr val="808080"/>
                       </a:solidFill>
                       <a:prstDash val="solid"/>
                       <a:round/>
                       <a:headEnd type="none" w="med" len="med"/>
                       <a:tailEnd type="none" w="med" len="med"/>
                     </a:lnT>
-                    <a:lnB w="12700" cap="flat" cmpd="sng" algn="ctr">
-                      <a:solidFill>
-                        <a:srgbClr val="000000"/>
-                      </a:solidFill>
-                      <a:prstDash val="solid"/>
-                      <a:round/>
-                      <a:headEnd type="none" w="med" len="med"/>
-                      <a:tailEnd type="none" w="med" len="med"/>
-                    </a:lnB>
-                    <a:noFill/>
-                  </a:tcPr>
-                </a:tc>
-                <a:tc>
-                  <a:txBody>
-                    <a:bodyPr/>
-                    <a:lstStyle/>
-                    <a:p>
-                      <a:pPr marL="0" marR="0" lvl="0" indent="0" algn="l" defTabSz="914400" rtl="0" eaLnBrk="1" fontAlgn="auto" latinLnBrk="0" hangingPunct="1">
-                        <a:lnSpc>
-                          <a:spcPct val="100000"/>
-                        </a:lnSpc>
-                        <a:spcBef>
-                          <a:spcPts val="0"/>
-                        </a:spcBef>
-                        <a:spcAft>
-                          <a:spcPts val="0"/>
-                        </a:spcAft>
-                        <a:buClrTx/>
-                        <a:buSzTx/>
-                        <a:buFontTx/>
-                        <a:buNone/>
-                        <a:tabLst/>
-                        <a:defRPr/>
-                      </a:pPr>
-                      <a:r>
-                        <a:rPr lang="pt-BR" sz="700" b="1" dirty="0">
-                          <a:solidFill>
-                            <a:srgbClr val="FF0000"/>
-                          </a:solidFill>
-                          <a:effectLst/>
-                          <a:latin typeface="+mn-lt"/>
-                          <a:ea typeface="Calibri" panose="020F0502020204030204" pitchFamily="34" charset="0"/>
-                          <a:cs typeface="Times New Roman" panose="02020603050405020304" pitchFamily="18" charset="0"/>
-                        </a:rPr>
-                        <a:t>C.H: 04 HORAS AULA</a:t>
-                      </a:r>
-                    </a:p>
-                  </a:txBody>
-                  <a:tcPr marL="57433" marR="57433" marT="0" marB="0" anchor="ctr">
-                    <a:lnL w="12700" cap="flat" cmpd="sng" algn="ctr">
-                      <a:solidFill>
-                        <a:srgbClr val="000000"/>
-                      </a:solidFill>
-                      <a:prstDash val="solid"/>
-                      <a:round/>
-                      <a:headEnd type="none" w="med" len="med"/>
-                      <a:tailEnd type="none" w="med" len="med"/>
-                    </a:lnL>
-                    <a:lnR w="12700" cap="flat" cmpd="sng" algn="ctr">
-                      <a:solidFill>
-                        <a:srgbClr val="000000"/>
-                      </a:solidFill>
-                      <a:prstDash val="solid"/>
-                      <a:round/>
-                      <a:headEnd type="none" w="med" len="med"/>
-                      <a:tailEnd type="none" w="med" len="med"/>
-                    </a:lnR>
-                    <a:lnT w="12700" cap="flat" cmpd="sng" algn="ctr">
-                      <a:solidFill>
-                        <a:srgbClr val="000000"/>
-                      </a:solidFill>
-                      <a:prstDash val="solid"/>
-                      <a:round/>
-                      <a:headEnd type="none" w="med" len="med"/>
-                      <a:tailEnd type="none" w="med" len="med"/>
-                    </a:lnT>
-                    <a:lnB w="12700" cap="flat" cmpd="sng" algn="ctr">
+                    <a:lnB w="12268" cap="flat" cmpd="sng" algn="ctr">
                       <a:solidFill>
                         <a:srgbClr val="000000"/>
                       </a:solidFill>
@@ -7995,400 +7247,64 @@
                 </a:tc>
                 <a:extLst>
                   <a:ext uri="{0D108BD9-81ED-4DB2-BD59-A6C34878D82A}">
-                    <a16:rowId xmlns:a16="http://schemas.microsoft.com/office/drawing/2014/main" val="3471497039"/>
+                    <a16:rowId xmlns:a16="http://schemas.microsoft.com/office/drawing/2014/main" val="539827588"/>
                   </a:ext>
                 </a:extLst>
               </a:tr>
-              <a:tr h="1327347">
-                <a:tc gridSpan="2">
+              <a:tr h="3113475">
+                <a:tc>
                   <a:txBody>
                     <a:bodyPr/>
                     <a:lstStyle/>
                     <a:p>
-                      <a:pPr marL="22860">
-                        <a:spcAft>
-                          <a:spcPts val="0"/>
-                        </a:spcAft>
+                      <a:pPr fontAlgn="base">
+                        <a:lnSpc>
+                          <a:spcPts val="1425"/>
+                        </a:lnSpc>
                       </a:pPr>
                       <a:r>
-                        <a:rPr lang="pt-BR" sz="700" dirty="0">
-                          <a:solidFill>
-                            <a:srgbClr val="FF0000"/>
-                          </a:solidFill>
+                        <a:rPr lang="pt-BR" sz="1000" dirty="0">
                           <a:effectLst/>
-                          <a:latin typeface="+mn-lt"/>
-                          <a:ea typeface="Calibri" panose="020F0502020204030204" pitchFamily="34" charset="0"/>
-                          <a:cs typeface="Times New Roman" panose="02020603050405020304" pitchFamily="18" charset="0"/>
+                          <a:latin typeface="Arial"/>
                         </a:rPr>
-                        <a:t>• Introdução à operação de ponte rolante: Visão geral da ponte rolante, Componentes e terminologia da ponte rolante.</a:t>
+                        <a:t>[</a:t>
                       </a:r>
-                      <a:endParaRPr lang="pt-BR" sz="1000" dirty="0">
-                        <a:solidFill>
-                          <a:srgbClr val="FF0000"/>
-                        </a:solidFill>
-                        <a:effectLst/>
-                        <a:latin typeface="+mn-lt"/>
-                        <a:ea typeface="Calibri" panose="020F0502020204030204" pitchFamily="34" charset="0"/>
-                        <a:cs typeface="Times New Roman" panose="02020603050405020304" pitchFamily="18" charset="0"/>
-                      </a:endParaRPr>
-                    </a:p>
-                    <a:p>
-                      <a:pPr marL="22860">
-                        <a:spcAft>
-                          <a:spcPts val="0"/>
-                        </a:spcAft>
-                      </a:pPr>
                       <a:r>
-                        <a:rPr lang="pt-BR" sz="700" dirty="0">
-                          <a:solidFill>
-                            <a:srgbClr val="FF0000"/>
-                          </a:solidFill>
+                        <a:rPr lang="pt-BR" sz="1000" b="0" err="1">
                           <a:effectLst/>
-                          <a:latin typeface="+mn-lt"/>
-                          <a:ea typeface="Calibri" panose="020F0502020204030204" pitchFamily="34" charset="0"/>
-                          <a:cs typeface="Times New Roman" panose="02020603050405020304" pitchFamily="18" charset="0"/>
+                          <a:latin typeface="Arial"/>
                         </a:rPr>
-                        <a:t>• Conhecer as medidas de segurança da NR 11 e itens específicos da NR 12 e demais conceitos sobre legislação de segurança.</a:t>
+                        <a:t>conteudo</a:t>
                       </a:r>
-                      <a:endParaRPr lang="pt-BR" sz="1000" dirty="0">
-                        <a:solidFill>
-                          <a:srgbClr val="FF0000"/>
-                        </a:solidFill>
-                        <a:effectLst/>
-                        <a:latin typeface="+mn-lt"/>
-                        <a:ea typeface="Calibri" panose="020F0502020204030204" pitchFamily="34" charset="0"/>
-                        <a:cs typeface="Times New Roman" panose="02020603050405020304" pitchFamily="18" charset="0"/>
-                      </a:endParaRPr>
-                    </a:p>
-                    <a:p>
-                      <a:pPr marL="22860">
-                        <a:spcAft>
-                          <a:spcPts val="0"/>
-                        </a:spcAft>
-                      </a:pPr>
                       <a:r>
-                        <a:rPr lang="pt-BR" sz="700" dirty="0">
-                          <a:solidFill>
-                            <a:srgbClr val="FF0000"/>
-                          </a:solidFill>
+                        <a:rPr lang="pt-BR" sz="1000" dirty="0">
                           <a:effectLst/>
-                          <a:latin typeface="+mn-lt"/>
-                          <a:ea typeface="Calibri" panose="020F0502020204030204" pitchFamily="34" charset="0"/>
-                          <a:cs typeface="Times New Roman" panose="02020603050405020304" pitchFamily="18" charset="0"/>
+                          <a:latin typeface="Arial"/>
                         </a:rPr>
-                        <a:t>• Tipos de Equipamentos: Ponte Rolante, Pórtico e Semipórtico Identificar os tipos e as características dos dispositivos de içamento.</a:t>
+                        <a:t>]</a:t>
                       </a:r>
-                      <a:endParaRPr lang="pt-BR" sz="1000" dirty="0">
-                        <a:solidFill>
-                          <a:srgbClr val="FF0000"/>
-                        </a:solidFill>
-                        <a:effectLst/>
-                        <a:latin typeface="+mn-lt"/>
-                        <a:ea typeface="Calibri" panose="020F0502020204030204" pitchFamily="34" charset="0"/>
-                        <a:cs typeface="Times New Roman" panose="02020603050405020304" pitchFamily="18" charset="0"/>
-                      </a:endParaRPr>
-                    </a:p>
-                    <a:p>
-                      <a:pPr marL="22860">
-                        <a:spcAft>
-                          <a:spcPts val="0"/>
-                        </a:spcAft>
-                      </a:pPr>
-                      <a:r>
-                        <a:rPr lang="pt-BR" sz="700" dirty="0">
-                          <a:solidFill>
-                            <a:srgbClr val="FF0000"/>
-                          </a:solidFill>
-                          <a:effectLst/>
-                          <a:latin typeface="+mn-lt"/>
-                          <a:ea typeface="Calibri" panose="020F0502020204030204" pitchFamily="34" charset="0"/>
-                          <a:cs typeface="Times New Roman" panose="02020603050405020304" pitchFamily="18" charset="0"/>
-                        </a:rPr>
-                        <a:t>• Operação básica da ponte rolante: Controles principais e suas funções, Operação em várias direções (para frente, para trás, para cima, para baixo), Uso adequado do freio e do sistema de frenagem</a:t>
-                      </a:r>
-                      <a:endParaRPr lang="pt-BR" sz="1000" dirty="0">
-                        <a:solidFill>
-                          <a:srgbClr val="FF0000"/>
-                        </a:solidFill>
-                        <a:effectLst/>
-                        <a:latin typeface="+mn-lt"/>
-                        <a:ea typeface="Calibri" panose="020F0502020204030204" pitchFamily="34" charset="0"/>
-                        <a:cs typeface="Times New Roman" panose="02020603050405020304" pitchFamily="18" charset="0"/>
-                      </a:endParaRPr>
-                    </a:p>
-                    <a:p>
-                      <a:pPr marL="22860">
-                        <a:spcAft>
-                          <a:spcPts val="0"/>
-                        </a:spcAft>
-                      </a:pPr>
-                      <a:r>
-                        <a:rPr lang="pt-BR" sz="700" dirty="0">
-                          <a:solidFill>
-                            <a:srgbClr val="FF0000"/>
-                          </a:solidFill>
-                          <a:effectLst/>
-                          <a:latin typeface="+mn-lt"/>
-                          <a:ea typeface="Calibri" panose="020F0502020204030204" pitchFamily="34" charset="0"/>
-                          <a:cs typeface="Times New Roman" panose="02020603050405020304" pitchFamily="18" charset="0"/>
-                        </a:rPr>
-                        <a:t>• Operação avançada da ponte rolante: Manuseio de cargas diferentes (pesadas, frágeis, volumosas etc.), Uso de dispositivos auxiliares (ganchos, imãs etc.), Técnicas de posicionamento preciso.</a:t>
-                      </a:r>
-                      <a:endParaRPr lang="pt-BR" sz="1000" dirty="0">
-                        <a:solidFill>
-                          <a:srgbClr val="FF0000"/>
-                        </a:solidFill>
-                        <a:effectLst/>
-                        <a:latin typeface="+mn-lt"/>
-                        <a:ea typeface="Calibri" panose="020F0502020204030204" pitchFamily="34" charset="0"/>
-                        <a:cs typeface="Times New Roman" panose="02020603050405020304" pitchFamily="18" charset="0"/>
-                      </a:endParaRPr>
-                    </a:p>
-                    <a:p>
-                      <a:pPr marL="22860">
-                        <a:spcAft>
-                          <a:spcPts val="0"/>
-                        </a:spcAft>
-                      </a:pPr>
-                      <a:r>
-                        <a:rPr lang="pt-BR" sz="700" dirty="0">
-                          <a:solidFill>
-                            <a:srgbClr val="FF0000"/>
-                          </a:solidFill>
-                          <a:effectLst/>
-                          <a:latin typeface="+mn-lt"/>
-                          <a:ea typeface="Calibri" panose="020F0502020204030204" pitchFamily="34" charset="0"/>
-                          <a:cs typeface="Times New Roman" panose="02020603050405020304" pitchFamily="18" charset="0"/>
-                        </a:rPr>
-                        <a:t>• Comunicação e sinais de mão: Sinais de mão padronizados para orientação do operador, Comunicação com a equipe de solo e outros operadores.</a:t>
-                      </a:r>
-                      <a:endParaRPr lang="pt-BR" sz="1000" dirty="0">
-                        <a:solidFill>
-                          <a:srgbClr val="FF0000"/>
-                        </a:solidFill>
-                        <a:effectLst/>
-                        <a:latin typeface="+mn-lt"/>
-                        <a:ea typeface="Calibri" panose="020F0502020204030204" pitchFamily="34" charset="0"/>
-                        <a:cs typeface="Times New Roman" panose="02020603050405020304" pitchFamily="18" charset="0"/>
-                      </a:endParaRPr>
-                    </a:p>
-                    <a:p>
-                      <a:pPr marL="22860">
-                        <a:spcAft>
-                          <a:spcPts val="0"/>
-                        </a:spcAft>
-                      </a:pPr>
-                      <a:r>
-                        <a:rPr lang="pt-BR" sz="700" dirty="0">
-                          <a:solidFill>
-                            <a:srgbClr val="FF0000"/>
-                          </a:solidFill>
-                          <a:effectLst/>
-                          <a:latin typeface="+mn-lt"/>
-                          <a:ea typeface="Calibri" panose="020F0502020204030204" pitchFamily="34" charset="0"/>
-                          <a:cs typeface="Times New Roman" panose="02020603050405020304" pitchFamily="18" charset="0"/>
-                        </a:rPr>
-                        <a:t>• Manutenção preventiva e rotinas de inspeção: Limpeza e lubrificação regular dos componentes.</a:t>
-                      </a:r>
-                      <a:endParaRPr lang="pt-BR" sz="1000" dirty="0">
-                        <a:solidFill>
-                          <a:srgbClr val="FF0000"/>
-                        </a:solidFill>
-                        <a:effectLst/>
-                        <a:latin typeface="+mn-lt"/>
-                        <a:ea typeface="Calibri" panose="020F0502020204030204" pitchFamily="34" charset="0"/>
-                        <a:cs typeface="Times New Roman" panose="02020603050405020304" pitchFamily="18" charset="0"/>
-                      </a:endParaRPr>
-                    </a:p>
-                    <a:p>
-                      <a:pPr marL="22860">
-                        <a:spcAft>
-                          <a:spcPts val="0"/>
-                        </a:spcAft>
-                      </a:pPr>
-                      <a:r>
-                        <a:rPr lang="pt-BR" sz="700" dirty="0">
-                          <a:solidFill>
-                            <a:srgbClr val="FF0000"/>
-                          </a:solidFill>
-                          <a:effectLst/>
-                          <a:latin typeface="+mn-lt"/>
-                          <a:ea typeface="Calibri" panose="020F0502020204030204" pitchFamily="34" charset="0"/>
-                          <a:cs typeface="Times New Roman" panose="02020603050405020304" pitchFamily="18" charset="0"/>
-                        </a:rPr>
-                        <a:t>• Identificação e relato de problemas e falhas.</a:t>
-                      </a:r>
-                      <a:endParaRPr lang="pt-BR" sz="1000" dirty="0">
-                        <a:solidFill>
-                          <a:srgbClr val="FF0000"/>
-                        </a:solidFill>
-                        <a:effectLst/>
-                        <a:latin typeface="+mn-lt"/>
-                        <a:ea typeface="Calibri" panose="020F0502020204030204" pitchFamily="34" charset="0"/>
-                        <a:cs typeface="Times New Roman" panose="02020603050405020304" pitchFamily="18" charset="0"/>
-                      </a:endParaRPr>
-                    </a:p>
-                    <a:p>
-                      <a:pPr marL="22860">
-                        <a:spcAft>
-                          <a:spcPts val="0"/>
-                        </a:spcAft>
-                      </a:pPr>
-                      <a:r>
-                        <a:rPr lang="pt-BR" sz="700" dirty="0">
-                          <a:solidFill>
-                            <a:srgbClr val="FF0000"/>
-                          </a:solidFill>
-                          <a:effectLst/>
-                          <a:latin typeface="+mn-lt"/>
-                          <a:ea typeface="Calibri" panose="020F0502020204030204" pitchFamily="34" charset="0"/>
-                          <a:cs typeface="Times New Roman" panose="02020603050405020304" pitchFamily="18" charset="0"/>
-                        </a:rPr>
-                        <a:t>• Identificar os riscos de acidentes na movimentação, manuseio e armazenagem de materiais.</a:t>
-                      </a:r>
-                      <a:endParaRPr lang="pt-BR" sz="1000" dirty="0">
-                        <a:solidFill>
-                          <a:srgbClr val="FF0000"/>
-                        </a:solidFill>
-                        <a:effectLst/>
-                        <a:latin typeface="+mn-lt"/>
-                        <a:ea typeface="Calibri" panose="020F0502020204030204" pitchFamily="34" charset="0"/>
-                        <a:cs typeface="Times New Roman" panose="02020603050405020304" pitchFamily="18" charset="0"/>
-                      </a:endParaRPr>
-                    </a:p>
-                    <a:p>
-                      <a:pPr marL="22860">
-                        <a:spcAft>
-                          <a:spcPts val="0"/>
-                        </a:spcAft>
-                      </a:pPr>
-                      <a:r>
-                        <a:rPr lang="pt-BR" sz="700" dirty="0">
-                          <a:solidFill>
-                            <a:srgbClr val="FF0000"/>
-                          </a:solidFill>
-                          <a:effectLst/>
-                          <a:latin typeface="+mn-lt"/>
-                          <a:ea typeface="Calibri" panose="020F0502020204030204" pitchFamily="34" charset="0"/>
-                          <a:cs typeface="Times New Roman" panose="02020603050405020304" pitchFamily="18" charset="0"/>
-                        </a:rPr>
-                        <a:t>• Conhecer as metodologias de análise de riscos: conceitos e exercícios;</a:t>
-                      </a:r>
-                      <a:endParaRPr lang="pt-BR" sz="1000" dirty="0">
-                        <a:solidFill>
-                          <a:srgbClr val="FF0000"/>
-                        </a:solidFill>
-                        <a:effectLst/>
-                        <a:latin typeface="+mn-lt"/>
-                        <a:ea typeface="Calibri" panose="020F0502020204030204" pitchFamily="34" charset="0"/>
-                        <a:cs typeface="Times New Roman" panose="02020603050405020304" pitchFamily="18" charset="0"/>
-                      </a:endParaRPr>
-                    </a:p>
-                    <a:p>
-                      <a:pPr marL="22860">
-                        <a:spcAft>
-                          <a:spcPts val="0"/>
-                        </a:spcAft>
-                      </a:pPr>
-                      <a:r>
-                        <a:rPr lang="pt-BR" sz="700" dirty="0">
-                          <a:solidFill>
-                            <a:srgbClr val="FF0000"/>
-                          </a:solidFill>
-                          <a:effectLst/>
-                          <a:latin typeface="+mn-lt"/>
-                          <a:ea typeface="Calibri" panose="020F0502020204030204" pitchFamily="34" charset="0"/>
-                          <a:cs typeface="Times New Roman" panose="02020603050405020304" pitchFamily="18" charset="0"/>
-                        </a:rPr>
-                        <a:t>• Identificar os equipamentos de proteção coletiva.</a:t>
-                      </a:r>
-                      <a:endParaRPr lang="pt-BR" sz="1000" dirty="0">
-                        <a:solidFill>
-                          <a:srgbClr val="FF0000"/>
-                        </a:solidFill>
-                        <a:effectLst/>
-                        <a:latin typeface="+mn-lt"/>
-                        <a:ea typeface="Calibri" panose="020F0502020204030204" pitchFamily="34" charset="0"/>
-                        <a:cs typeface="Times New Roman" panose="02020603050405020304" pitchFamily="18" charset="0"/>
-                      </a:endParaRPr>
-                    </a:p>
-                    <a:p>
-                      <a:pPr marL="22860">
-                        <a:spcAft>
-                          <a:spcPts val="0"/>
-                        </a:spcAft>
-                      </a:pPr>
-                      <a:r>
-                        <a:rPr lang="pt-BR" sz="700" dirty="0">
-                          <a:solidFill>
-                            <a:srgbClr val="FF0000"/>
-                          </a:solidFill>
-                          <a:effectLst/>
-                          <a:latin typeface="+mn-lt"/>
-                          <a:ea typeface="Calibri" panose="020F0502020204030204" pitchFamily="34" charset="0"/>
-                          <a:cs typeface="Times New Roman" panose="02020603050405020304" pitchFamily="18" charset="0"/>
-                        </a:rPr>
-                        <a:t>• Equipamentos de proteção Individual necessários para operação da ponte rolante.</a:t>
-                      </a:r>
-                      <a:endParaRPr lang="pt-BR" sz="1000" dirty="0">
-                        <a:solidFill>
-                          <a:srgbClr val="FF0000"/>
-                        </a:solidFill>
-                        <a:effectLst/>
-                        <a:latin typeface="+mn-lt"/>
-                        <a:ea typeface="Calibri" panose="020F0502020204030204" pitchFamily="34" charset="0"/>
-                        <a:cs typeface="Times New Roman" panose="02020603050405020304" pitchFamily="18" charset="0"/>
-                      </a:endParaRPr>
-                    </a:p>
-                    <a:p>
-                      <a:pPr marL="22860">
-                        <a:spcAft>
-                          <a:spcPts val="0"/>
-                        </a:spcAft>
-                      </a:pPr>
-                      <a:r>
-                        <a:rPr lang="pt-BR" sz="700" dirty="0">
-                          <a:solidFill>
-                            <a:srgbClr val="FF0000"/>
-                          </a:solidFill>
-                          <a:effectLst/>
-                          <a:latin typeface="+mn-lt"/>
-                          <a:ea typeface="Calibri" panose="020F0502020204030204" pitchFamily="34" charset="0"/>
-                          <a:cs typeface="Times New Roman" panose="02020603050405020304" pitchFamily="18" charset="0"/>
-                        </a:rPr>
-                        <a:t>• Requisitos do FPS 07.</a:t>
-                      </a:r>
-                      <a:endParaRPr lang="pt-BR" sz="1000" dirty="0">
-                        <a:solidFill>
-                          <a:srgbClr val="FF0000"/>
-                        </a:solidFill>
-                        <a:effectLst/>
-                        <a:latin typeface="+mn-lt"/>
-                        <a:ea typeface="Calibri" panose="020F0502020204030204" pitchFamily="34" charset="0"/>
-                        <a:cs typeface="Times New Roman" panose="02020603050405020304" pitchFamily="18" charset="0"/>
-                      </a:endParaRPr>
                     </a:p>
                   </a:txBody>
-                  <a:tcPr marL="57433" marR="57433" marT="0" marB="0" anchor="ctr">
-                    <a:lnL w="12700" cap="flat" cmpd="sng" algn="ctr">
+                  <a:tcPr>
+                    <a:lnL w="12268" cap="flat" cmpd="sng" algn="ctr">
                       <a:solidFill>
-                        <a:srgbClr val="000000"/>
+                        <a:srgbClr val="808080"/>
                       </a:solidFill>
                       <a:prstDash val="solid"/>
                       <a:round/>
                       <a:headEnd type="none" w="med" len="med"/>
                       <a:tailEnd type="none" w="med" len="med"/>
                     </a:lnL>
-                    <a:lnR w="12700" cap="flat" cmpd="sng" algn="ctr">
+                    <a:lnR w="12268" cap="flat" cmpd="sng" algn="ctr">
                       <a:solidFill>
-                        <a:srgbClr val="000000"/>
+                        <a:srgbClr val="808080"/>
                       </a:solidFill>
                       <a:prstDash val="solid"/>
                       <a:round/>
                       <a:headEnd type="none" w="med" len="med"/>
                       <a:tailEnd type="none" w="med" len="med"/>
                     </a:lnR>
-                    <a:lnT w="12700" cap="flat" cmpd="sng" algn="ctr">
+                    <a:lnT w="12268" cap="flat" cmpd="sng" algn="ctr">
                       <a:solidFill>
                         <a:srgbClr val="000000"/>
                       </a:solidFill>
@@ -8397,368 +7313,9 @@
                       <a:headEnd type="none" w="med" len="med"/>
                       <a:tailEnd type="none" w="med" len="med"/>
                     </a:lnT>
-                    <a:lnB w="12700" cap="flat" cmpd="sng" algn="ctr">
+                    <a:lnB w="12268" cap="flat" cmpd="sng" algn="ctr">
                       <a:solidFill>
-                        <a:srgbClr val="000000"/>
-                      </a:solidFill>
-                      <a:prstDash val="solid"/>
-                      <a:round/>
-                      <a:headEnd type="none" w="med" len="med"/>
-                      <a:tailEnd type="none" w="med" len="med"/>
-                    </a:lnB>
-                    <a:noFill/>
-                  </a:tcPr>
-                </a:tc>
-                <a:tc hMerge="1">
-                  <a:txBody>
-                    <a:bodyPr/>
-                    <a:lstStyle/>
-                    <a:p>
-                      <a:endParaRPr lang="pt-BR"/>
-                    </a:p>
-                  </a:txBody>
-                  <a:tcPr/>
-                </a:tc>
-                <a:extLst>
-                  <a:ext uri="{0D108BD9-81ED-4DB2-BD59-A6C34878D82A}">
-                    <a16:rowId xmlns:a16="http://schemas.microsoft.com/office/drawing/2014/main" val="1443700694"/>
-                  </a:ext>
-                </a:extLst>
-              </a:tr>
-            </a:tbl>
-          </a:graphicData>
-        </a:graphic>
-      </p:graphicFrame>
-      <p:sp>
-        <p:nvSpPr>
-          <p:cNvPr id="18" name="CaixaDeTexto 17">
-            <a:extLst>
-              <a:ext uri="{FF2B5EF4-FFF2-40B4-BE49-F238E27FC236}">
-                <a16:creationId xmlns:a16="http://schemas.microsoft.com/office/drawing/2014/main" id="{21238E25-695B-6949-3B1F-C5DB23BC9A09}"/>
-              </a:ext>
-            </a:extLst>
-          </p:cNvPr>
-          <p:cNvSpPr txBox="1"/>
-          <p:nvPr/>
-        </p:nvSpPr>
-        <p:spPr>
-          <a:xfrm>
-            <a:off x="6298284" y="2442699"/>
-            <a:ext cx="2961874" cy="1107996"/>
-          </a:xfrm>
-          <a:prstGeom prst="rect">
-            <a:avLst/>
-          </a:prstGeom>
-          <a:noFill/>
-          <a:ln>
-            <a:solidFill>
-              <a:schemeClr val="tx1"/>
-            </a:solidFill>
-          </a:ln>
-        </p:spPr>
-        <p:txBody>
-          <a:bodyPr wrap="square">
-            <a:spAutoFit/>
-          </a:bodyPr>
-          <a:lstStyle/>
-          <a:p>
-            <a:pPr algn="ctr"/>
-            <a:r>
-              <a:rPr lang="pt-BR" sz="600" b="1" dirty="0">
-                <a:latin typeface="Arial" panose="020B0604020202020204" pitchFamily="34" charset="0"/>
-                <a:cs typeface="Arial" panose="020B0604020202020204" pitchFamily="34" charset="0"/>
-              </a:rPr>
-              <a:t>INSTRUTOR </a:t>
-            </a:r>
-          </a:p>
-          <a:p>
-            <a:pPr algn="ctr"/>
-            <a:endParaRPr lang="pt-BR" sz="600" b="1" dirty="0">
-              <a:latin typeface="Arial" panose="020B0604020202020204" pitchFamily="34" charset="0"/>
-              <a:cs typeface="Arial" panose="020B0604020202020204" pitchFamily="34" charset="0"/>
-            </a:endParaRPr>
-          </a:p>
-          <a:p>
-            <a:pPr algn="ctr"/>
-            <a:endParaRPr lang="pt-BR" sz="600" b="1" dirty="0">
-              <a:latin typeface="Arial" panose="020B0604020202020204" pitchFamily="34" charset="0"/>
-              <a:cs typeface="Arial" panose="020B0604020202020204" pitchFamily="34" charset="0"/>
-            </a:endParaRPr>
-          </a:p>
-          <a:p>
-            <a:pPr algn="ctr"/>
-            <a:endParaRPr lang="pt-BR" sz="600" b="1" dirty="0">
-              <a:latin typeface="Arial" panose="020B0604020202020204" pitchFamily="34" charset="0"/>
-              <a:cs typeface="Arial" panose="020B0604020202020204" pitchFamily="34" charset="0"/>
-            </a:endParaRPr>
-          </a:p>
-          <a:p>
-            <a:pPr algn="ctr"/>
-            <a:endParaRPr lang="pt-BR" sz="600" b="1" dirty="0">
-              <a:latin typeface="Arial" panose="020B0604020202020204" pitchFamily="34" charset="0"/>
-              <a:cs typeface="Arial" panose="020B0604020202020204" pitchFamily="34" charset="0"/>
-            </a:endParaRPr>
-          </a:p>
-          <a:p>
-            <a:pPr algn="ctr"/>
-            <a:endParaRPr lang="pt-BR" sz="600" b="1" dirty="0">
-              <a:latin typeface="Arial" panose="020B0604020202020204" pitchFamily="34" charset="0"/>
-              <a:cs typeface="Arial" panose="020B0604020202020204" pitchFamily="34" charset="0"/>
-            </a:endParaRPr>
-          </a:p>
-          <a:p>
-            <a:pPr algn="ctr"/>
-            <a:endParaRPr lang="pt-BR" sz="600" b="1" dirty="0">
-              <a:latin typeface="Arial" panose="020B0604020202020204" pitchFamily="34" charset="0"/>
-              <a:cs typeface="Arial" panose="020B0604020202020204" pitchFamily="34" charset="0"/>
-            </a:endParaRPr>
-          </a:p>
-          <a:p>
-            <a:pPr algn="ctr"/>
-            <a:r>
-              <a:rPr lang="pt-BR" sz="600" dirty="0">
-                <a:latin typeface="Arial" panose="020B0604020202020204" pitchFamily="34" charset="0"/>
-                <a:cs typeface="Arial" panose="020B0604020202020204" pitchFamily="34" charset="0"/>
-              </a:rPr>
-              <a:t>______________________________________</a:t>
-            </a:r>
-          </a:p>
-          <a:p>
-            <a:pPr algn="ctr"/>
-            <a:r>
-              <a:rPr lang="pt-BR" sz="600" b="1" dirty="0">
-                <a:solidFill>
-                  <a:srgbClr val="FF0000"/>
-                </a:solidFill>
-                <a:latin typeface="Arial" panose="020B0604020202020204" pitchFamily="34" charset="0"/>
-                <a:cs typeface="Arial" panose="020B0604020202020204" pitchFamily="34" charset="0"/>
-              </a:rPr>
-              <a:t>LUIS FERNANDO SOARES</a:t>
-            </a:r>
-          </a:p>
-          <a:p>
-            <a:pPr algn="ctr"/>
-            <a:r>
-              <a:rPr lang="pt-BR" sz="600" b="1" dirty="0">
-                <a:solidFill>
-                  <a:srgbClr val="FF0000"/>
-                </a:solidFill>
-                <a:latin typeface="Arial" panose="020B0604020202020204" pitchFamily="34" charset="0"/>
-                <a:cs typeface="Arial" panose="020B0604020202020204" pitchFamily="34" charset="0"/>
-              </a:rPr>
-              <a:t>TÉCNICO EM  SEGURANÇA DO TRABALHO</a:t>
-            </a:r>
-          </a:p>
-          <a:p>
-            <a:pPr algn="ctr"/>
-            <a:r>
-              <a:rPr lang="pt-BR" sz="600" b="1" dirty="0">
-                <a:solidFill>
-                  <a:srgbClr val="FF0000"/>
-                </a:solidFill>
-                <a:latin typeface="Arial" panose="020B0604020202020204" pitchFamily="34" charset="0"/>
-                <a:cs typeface="Arial" panose="020B0604020202020204" pitchFamily="34" charset="0"/>
-              </a:rPr>
-              <a:t> MTE N° 10123/MS</a:t>
-            </a:r>
-            <a:endParaRPr lang="pt-BR" sz="600" dirty="0">
-              <a:solidFill>
-                <a:srgbClr val="FF0000"/>
-              </a:solidFill>
-              <a:latin typeface="Arial" panose="020B0604020202020204" pitchFamily="34" charset="0"/>
-              <a:cs typeface="Arial" panose="020B0604020202020204" pitchFamily="34" charset="0"/>
-            </a:endParaRPr>
-          </a:p>
-        </p:txBody>
-      </p:sp>
-      <p:graphicFrame>
-        <p:nvGraphicFramePr>
-          <p:cNvPr id="24" name="Tabela 23">
-            <a:extLst>
-              <a:ext uri="{FF2B5EF4-FFF2-40B4-BE49-F238E27FC236}">
-                <a16:creationId xmlns:a16="http://schemas.microsoft.com/office/drawing/2014/main" id="{8F267223-DB1D-5F9D-2CBA-158C064E4D34}"/>
-              </a:ext>
-            </a:extLst>
-          </p:cNvPr>
-          <p:cNvGraphicFramePr>
-            <a:graphicFrameLocks noGrp="1"/>
-          </p:cNvGraphicFramePr>
-          <p:nvPr>
-            <p:extLst>
-              <p:ext uri="{D42A27DB-BD31-4B8C-83A1-F6EECF244321}">
-                <p14:modId xmlns:p14="http://schemas.microsoft.com/office/powerpoint/2010/main" val="1170136347"/>
-              </p:ext>
-            </p:extLst>
-          </p:nvPr>
-        </p:nvGraphicFramePr>
-        <p:xfrm>
-          <a:off x="439472" y="3276514"/>
-          <a:ext cx="5784164" cy="1353480"/>
-        </p:xfrm>
-        <a:graphic>
-          <a:graphicData uri="http://schemas.openxmlformats.org/drawingml/2006/table">
-            <a:tbl>
-              <a:tblPr firstRow="1" firstCol="1" bandRow="1"/>
-              <a:tblGrid>
-                <a:gridCol w="2273248">
-                  <a:extLst>
-                    <a:ext uri="{9D8B030D-6E8A-4147-A177-3AD203B41FA5}">
-                      <a16:colId xmlns:a16="http://schemas.microsoft.com/office/drawing/2014/main" val="1632456659"/>
-                    </a:ext>
-                  </a:extLst>
-                </a:gridCol>
-                <a:gridCol w="3510916">
-                  <a:extLst>
-                    <a:ext uri="{9D8B030D-6E8A-4147-A177-3AD203B41FA5}">
-                      <a16:colId xmlns:a16="http://schemas.microsoft.com/office/drawing/2014/main" val="1274465403"/>
-                    </a:ext>
-                  </a:extLst>
-                </a:gridCol>
-              </a:tblGrid>
-              <a:tr h="180000">
-                <a:tc>
-                  <a:txBody>
-                    <a:bodyPr/>
-                    <a:lstStyle/>
-                    <a:p>
-                      <a:pPr marL="22860">
-                        <a:spcAft>
-                          <a:spcPts val="0"/>
-                        </a:spcAft>
-                      </a:pPr>
-                      <a:r>
-                        <a:rPr lang="pt-BR" sz="700" b="1" dirty="0">
-                          <a:solidFill>
-                            <a:srgbClr val="000000"/>
-                          </a:solidFill>
-                          <a:effectLst/>
-                          <a:latin typeface="+mn-lt"/>
-                          <a:ea typeface="Calibri" panose="020F0502020204030204" pitchFamily="34" charset="0"/>
-                          <a:cs typeface="Times New Roman" panose="02020603050405020304" pitchFamily="18" charset="0"/>
-                        </a:rPr>
-                        <a:t>Instrutor: </a:t>
-                      </a:r>
-                      <a:r>
-                        <a:rPr lang="pt-BR" sz="700" b="1" dirty="0">
-                          <a:solidFill>
-                            <a:srgbClr val="FF0000"/>
-                          </a:solidFill>
-                          <a:effectLst/>
-                          <a:latin typeface="+mn-lt"/>
-                          <a:ea typeface="Calibri" panose="020F0502020204030204" pitchFamily="34" charset="0"/>
-                          <a:cs typeface="Times New Roman" panose="02020603050405020304" pitchFamily="18" charset="0"/>
-                        </a:rPr>
-                        <a:t>Ricardo Silva De Almeida</a:t>
-                      </a:r>
-                    </a:p>
-                  </a:txBody>
-                  <a:tcPr marL="57433" marR="57433" marT="0" marB="0" anchor="ctr">
-                    <a:lnL w="12700" cap="flat" cmpd="sng" algn="ctr">
-                      <a:solidFill>
-                        <a:srgbClr val="000000"/>
-                      </a:solidFill>
-                      <a:prstDash val="solid"/>
-                      <a:round/>
-                      <a:headEnd type="none" w="med" len="med"/>
-                      <a:tailEnd type="none" w="med" len="med"/>
-                    </a:lnL>
-                    <a:lnR w="12700" cap="flat" cmpd="sng" algn="ctr">
-                      <a:solidFill>
-                        <a:srgbClr val="000000"/>
-                      </a:solidFill>
-                      <a:prstDash val="solid"/>
-                      <a:round/>
-                      <a:headEnd type="none" w="med" len="med"/>
-                      <a:tailEnd type="none" w="med" len="med"/>
-                    </a:lnR>
-                    <a:lnT w="12700" cap="flat" cmpd="sng" algn="ctr">
-                      <a:solidFill>
-                        <a:srgbClr val="000000"/>
-                      </a:solidFill>
-                      <a:prstDash val="solid"/>
-                      <a:round/>
-                      <a:headEnd type="none" w="med" len="med"/>
-                      <a:tailEnd type="none" w="med" len="med"/>
-                    </a:lnT>
-                    <a:lnB w="12700" cap="flat" cmpd="sng" algn="ctr">
-                      <a:solidFill>
-                        <a:srgbClr val="000000"/>
-                      </a:solidFill>
-                      <a:prstDash val="solid"/>
-                      <a:round/>
-                      <a:headEnd type="none" w="med" len="med"/>
-                      <a:tailEnd type="none" w="med" len="med"/>
-                    </a:lnB>
-                    <a:noFill/>
-                  </a:tcPr>
-                </a:tc>
-                <a:tc>
-                  <a:txBody>
-                    <a:bodyPr/>
-                    <a:lstStyle/>
-                    <a:p>
-                      <a:pPr marL="0" marR="0" lvl="0" indent="0" algn="l" defTabSz="914400" rtl="0" eaLnBrk="1" fontAlgn="auto" latinLnBrk="0" hangingPunct="1">
-                        <a:lnSpc>
-                          <a:spcPct val="100000"/>
-                        </a:lnSpc>
-                        <a:spcBef>
-                          <a:spcPts val="0"/>
-                        </a:spcBef>
-                        <a:spcAft>
-                          <a:spcPts val="0"/>
-                        </a:spcAft>
-                        <a:buClrTx/>
-                        <a:buSzTx/>
-                        <a:buFontTx/>
-                        <a:buNone/>
-                        <a:tabLst/>
-                        <a:defRPr/>
-                      </a:pPr>
-                      <a:r>
-                        <a:rPr lang="pt-BR" sz="700" b="1" dirty="0">
-                          <a:solidFill>
-                            <a:srgbClr val="FF0000"/>
-                          </a:solidFill>
-                          <a:effectLst/>
-                          <a:latin typeface="+mn-lt"/>
-                          <a:ea typeface="Calibri" panose="020F0502020204030204" pitchFamily="34" charset="0"/>
-                          <a:cs typeface="Times New Roman" panose="02020603050405020304" pitchFamily="18" charset="0"/>
-                        </a:rPr>
-                        <a:t>C.H: 04 HORAS AULA</a:t>
-                      </a:r>
-                    </a:p>
-                  </a:txBody>
-                  <a:tcPr marL="57433" marR="57433" marT="0" marB="0" anchor="ctr">
-                    <a:lnL w="12700" cap="flat" cmpd="sng" algn="ctr">
-                      <a:solidFill>
-                        <a:srgbClr val="000000"/>
-                      </a:solidFill>
-                      <a:prstDash val="solid"/>
-                      <a:round/>
-                      <a:headEnd type="none" w="med" len="med"/>
-                      <a:tailEnd type="none" w="med" len="med"/>
-                    </a:lnL>
-                    <a:lnR w="12700" cap="flat" cmpd="sng" algn="ctr">
-                      <a:solidFill>
-                        <a:srgbClr val="000000"/>
-                      </a:solidFill>
-                      <a:prstDash val="solid"/>
-                      <a:round/>
-                      <a:headEnd type="none" w="med" len="med"/>
-                      <a:tailEnd type="none" w="med" len="med"/>
-                    </a:lnR>
-                    <a:lnT w="12700" cap="flat" cmpd="sng" algn="ctr">
-                      <a:solidFill>
-                        <a:srgbClr val="000000"/>
-                      </a:solidFill>
-                      <a:prstDash val="solid"/>
-                      <a:round/>
-                      <a:headEnd type="none" w="med" len="med"/>
-                      <a:tailEnd type="none" w="med" len="med"/>
-                    </a:lnT>
-                    <a:lnB w="12700" cap="flat" cmpd="sng" algn="ctr">
-                      <a:solidFill>
-                        <a:srgbClr val="000000"/>
+                        <a:srgbClr val="808080"/>
                       </a:solidFill>
                       <a:prstDash val="solid"/>
                       <a:round/>
@@ -8770,326 +7327,7 @@
                 </a:tc>
                 <a:extLst>
                   <a:ext uri="{0D108BD9-81ED-4DB2-BD59-A6C34878D82A}">
-                    <a16:rowId xmlns:a16="http://schemas.microsoft.com/office/drawing/2014/main" val="1940414947"/>
-                  </a:ext>
-                </a:extLst>
-              </a:tr>
-              <a:tr h="537985">
-                <a:tc gridSpan="2">
-                  <a:txBody>
-                    <a:bodyPr/>
-                    <a:lstStyle/>
-                    <a:p>
-                      <a:pPr marL="22860">
-                        <a:spcAft>
-                          <a:spcPts val="0"/>
-                        </a:spcAft>
-                      </a:pPr>
-                      <a:r>
-                        <a:rPr lang="pt-BR" sz="700" dirty="0">
-                          <a:solidFill>
-                            <a:srgbClr val="FF0000"/>
-                          </a:solidFill>
-                          <a:effectLst/>
-                          <a:latin typeface="+mn-lt"/>
-                          <a:ea typeface="Calibri" panose="020F0502020204030204" pitchFamily="34" charset="0"/>
-                          <a:cs typeface="Times New Roman" panose="02020603050405020304" pitchFamily="18" charset="0"/>
-                        </a:rPr>
-                        <a:t>• Conhecer pontes rolantes do ambiente de trabalho, que são utilizadas para içamento e translado de cargas.</a:t>
-                      </a:r>
-                    </a:p>
-                    <a:p>
-                      <a:pPr marL="22860">
-                        <a:spcAft>
-                          <a:spcPts val="0"/>
-                        </a:spcAft>
-                      </a:pPr>
-                      <a:r>
-                        <a:rPr lang="pt-BR" sz="700" dirty="0">
-                          <a:solidFill>
-                            <a:srgbClr val="FF0000"/>
-                          </a:solidFill>
-                          <a:effectLst/>
-                          <a:latin typeface="+mn-lt"/>
-                          <a:ea typeface="Calibri" panose="020F0502020204030204" pitchFamily="34" charset="0"/>
-                          <a:cs typeface="Times New Roman" panose="02020603050405020304" pitchFamily="18" charset="0"/>
-                        </a:rPr>
-                        <a:t>• Reconhecer os tipos de cabos de aço, cintas e correntes e suas resistências, e demais acessórios para içamento de cargas.</a:t>
-                      </a:r>
-                    </a:p>
-                    <a:p>
-                      <a:pPr marL="22860">
-                        <a:spcAft>
-                          <a:spcPts val="0"/>
-                        </a:spcAft>
-                      </a:pPr>
-                      <a:r>
-                        <a:rPr lang="pt-BR" sz="700" dirty="0">
-                          <a:solidFill>
-                            <a:srgbClr val="FF0000"/>
-                          </a:solidFill>
-                          <a:effectLst/>
-                          <a:latin typeface="+mn-lt"/>
-                          <a:ea typeface="Calibri" panose="020F0502020204030204" pitchFamily="34" charset="0"/>
-                          <a:cs typeface="Times New Roman" panose="02020603050405020304" pitchFamily="18" charset="0"/>
-                        </a:rPr>
-                        <a:t>• Identificar defeitos em acessórios de içamento de carga: cabos, cintas e correntes.</a:t>
-                      </a:r>
-                    </a:p>
-                    <a:p>
-                      <a:pPr marL="22860">
-                        <a:spcAft>
-                          <a:spcPts val="0"/>
-                        </a:spcAft>
-                      </a:pPr>
-                      <a:r>
-                        <a:rPr lang="pt-BR" sz="700" dirty="0">
-                          <a:solidFill>
-                            <a:srgbClr val="FF0000"/>
-                          </a:solidFill>
-                          <a:effectLst/>
-                          <a:latin typeface="+mn-lt"/>
-                          <a:ea typeface="Calibri" panose="020F0502020204030204" pitchFamily="34" charset="0"/>
-                          <a:cs typeface="Times New Roman" panose="02020603050405020304" pitchFamily="18" charset="0"/>
-                        </a:rPr>
-                        <a:t>• Itens impeditivos do checklist pré uso.</a:t>
-                      </a:r>
-                    </a:p>
-                    <a:p>
-                      <a:pPr marL="22860">
-                        <a:spcAft>
-                          <a:spcPts val="0"/>
-                        </a:spcAft>
-                      </a:pPr>
-                      <a:r>
-                        <a:rPr lang="pt-BR" sz="700" dirty="0">
-                          <a:solidFill>
-                            <a:srgbClr val="FF0000"/>
-                          </a:solidFill>
-                          <a:effectLst/>
-                          <a:latin typeface="+mn-lt"/>
-                          <a:ea typeface="Calibri" panose="020F0502020204030204" pitchFamily="34" charset="0"/>
-                          <a:cs typeface="Times New Roman" panose="02020603050405020304" pitchFamily="18" charset="0"/>
-                        </a:rPr>
-                        <a:t>• Conhecer a sinalização convencional de equipamentos de içamento de cargas.</a:t>
-                      </a:r>
-                    </a:p>
-                    <a:p>
-                      <a:pPr marL="22860">
-                        <a:spcAft>
-                          <a:spcPts val="0"/>
-                        </a:spcAft>
-                      </a:pPr>
-                      <a:r>
-                        <a:rPr lang="pt-BR" sz="700" dirty="0">
-                          <a:solidFill>
-                            <a:srgbClr val="FF0000"/>
-                          </a:solidFill>
-                          <a:effectLst/>
-                          <a:latin typeface="+mn-lt"/>
-                          <a:ea typeface="Calibri" panose="020F0502020204030204" pitchFamily="34" charset="0"/>
-                          <a:cs typeface="Times New Roman" panose="02020603050405020304" pitchFamily="18" charset="0"/>
-                        </a:rPr>
-                        <a:t>• Realizar manobras e movimentação descargas segundo critérios de segurança.</a:t>
-                      </a:r>
-                    </a:p>
-                    <a:p>
-                      <a:pPr marL="22860">
-                        <a:spcAft>
-                          <a:spcPts val="0"/>
-                        </a:spcAft>
-                      </a:pPr>
-                      <a:r>
-                        <a:rPr lang="pt-BR" sz="700" dirty="0">
-                          <a:solidFill>
-                            <a:srgbClr val="FF0000"/>
-                          </a:solidFill>
-                          <a:effectLst/>
-                          <a:latin typeface="+mn-lt"/>
-                          <a:ea typeface="Calibri" panose="020F0502020204030204" pitchFamily="34" charset="0"/>
-                          <a:cs typeface="Times New Roman" panose="02020603050405020304" pitchFamily="18" charset="0"/>
-                        </a:rPr>
-                        <a:t>Leitura e interpretação de diagramas e manuais: Diagrama elétrico da ponte rolante, Manual de operação e manutenção da ponte rolante.</a:t>
-                      </a:r>
-                    </a:p>
-                    <a:p>
-                      <a:pPr marL="22860">
-                        <a:spcAft>
-                          <a:spcPts val="0"/>
-                        </a:spcAft>
-                      </a:pPr>
-                      <a:r>
-                        <a:rPr lang="pt-BR" sz="700" dirty="0">
-                          <a:solidFill>
-                            <a:srgbClr val="FF0000"/>
-                          </a:solidFill>
-                          <a:effectLst/>
-                          <a:latin typeface="+mn-lt"/>
-                          <a:ea typeface="Calibri" panose="020F0502020204030204" pitchFamily="34" charset="0"/>
-                          <a:cs typeface="Times New Roman" panose="02020603050405020304" pitchFamily="18" charset="0"/>
-                        </a:rPr>
-                        <a:t>• Aplicar a inspeção de segurança de acordo com os itens do checklist.</a:t>
-                      </a:r>
-                    </a:p>
-                    <a:p>
-                      <a:pPr marL="22860">
-                        <a:spcAft>
-                          <a:spcPts val="0"/>
-                        </a:spcAft>
-                      </a:pPr>
-                      <a:r>
-                        <a:rPr lang="pt-BR" sz="700" dirty="0">
-                          <a:solidFill>
-                            <a:srgbClr val="FF0000"/>
-                          </a:solidFill>
-                          <a:effectLst/>
-                          <a:latin typeface="+mn-lt"/>
-                          <a:ea typeface="Calibri" panose="020F0502020204030204" pitchFamily="34" charset="0"/>
-                          <a:cs typeface="Times New Roman" panose="02020603050405020304" pitchFamily="18" charset="0"/>
-                        </a:rPr>
-                        <a:t>• Direito de recusa compulsório e voluntária</a:t>
-                      </a:r>
-                    </a:p>
-                    <a:p>
-                      <a:pPr marL="22860">
-                        <a:spcAft>
-                          <a:spcPts val="0"/>
-                        </a:spcAft>
-                      </a:pPr>
-                      <a:r>
-                        <a:rPr lang="pt-BR" sz="700" dirty="0">
-                          <a:solidFill>
-                            <a:srgbClr val="FF0000"/>
-                          </a:solidFill>
-                          <a:effectLst/>
-                          <a:latin typeface="+mn-lt"/>
-                          <a:ea typeface="Calibri" panose="020F0502020204030204" pitchFamily="34" charset="0"/>
-                          <a:cs typeface="Times New Roman" panose="02020603050405020304" pitchFamily="18" charset="0"/>
-                        </a:rPr>
-                        <a:t>• Procedimentos de emergência: </a:t>
-                      </a:r>
-                    </a:p>
-                    <a:p>
-                      <a:pPr marL="22860">
-                        <a:spcAft>
-                          <a:spcPts val="0"/>
-                        </a:spcAft>
-                      </a:pPr>
-                      <a:r>
-                        <a:rPr lang="pt-BR" sz="700" dirty="0">
-                          <a:solidFill>
-                            <a:srgbClr val="FF0000"/>
-                          </a:solidFill>
-                          <a:effectLst/>
-                          <a:latin typeface="+mn-lt"/>
-                          <a:ea typeface="Calibri" panose="020F0502020204030204" pitchFamily="34" charset="0"/>
-                          <a:cs typeface="Times New Roman" panose="02020603050405020304" pitchFamily="18" charset="0"/>
-                        </a:rPr>
-                        <a:t>Resposta a emergências (incêndio, vazamento, falha de energia, etc.), Evacuação segura da área de trabalho.</a:t>
-                      </a:r>
-                    </a:p>
-                  </a:txBody>
-                  <a:tcPr marL="57433" marR="57433" marT="0" marB="0" anchor="ctr">
-                    <a:lnL w="12700" cap="flat" cmpd="sng" algn="ctr">
-                      <a:solidFill>
-                        <a:srgbClr val="000000"/>
-                      </a:solidFill>
-                      <a:prstDash val="solid"/>
-                      <a:round/>
-                      <a:headEnd type="none" w="med" len="med"/>
-                      <a:tailEnd type="none" w="med" len="med"/>
-                    </a:lnL>
-                    <a:lnR w="12700" cap="flat" cmpd="sng" algn="ctr">
-                      <a:solidFill>
-                        <a:srgbClr val="000000"/>
-                      </a:solidFill>
-                      <a:prstDash val="solid"/>
-                      <a:round/>
-                      <a:headEnd type="none" w="med" len="med"/>
-                      <a:tailEnd type="none" w="med" len="med"/>
-                    </a:lnR>
-                    <a:lnT w="12700" cap="flat" cmpd="sng" algn="ctr">
-                      <a:solidFill>
-                        <a:srgbClr val="000000"/>
-                      </a:solidFill>
-                      <a:prstDash val="solid"/>
-                      <a:round/>
-                      <a:headEnd type="none" w="med" len="med"/>
-                      <a:tailEnd type="none" w="med" len="med"/>
-                    </a:lnT>
-                    <a:lnB w="12700" cap="flat" cmpd="sng" algn="ctr">
-                      <a:solidFill>
-                        <a:srgbClr val="000000"/>
-                      </a:solidFill>
-                      <a:prstDash val="solid"/>
-                      <a:round/>
-                      <a:headEnd type="none" w="med" len="med"/>
-                      <a:tailEnd type="none" w="med" len="med"/>
-                    </a:lnB>
-                    <a:noFill/>
-                  </a:tcPr>
-                </a:tc>
-                <a:tc hMerge="1">
-                  <a:txBody>
-                    <a:bodyPr/>
-                    <a:lstStyle/>
-                    <a:p>
-                      <a:pPr marL="22860">
-                        <a:spcAft>
-                          <a:spcPts val="0"/>
-                        </a:spcAft>
-                      </a:pPr>
-                      <a:endParaRPr lang="pt-BR" sz="700" dirty="0">
-                        <a:effectLst/>
-                        <a:latin typeface="+mn-lt"/>
-                        <a:ea typeface="Calibri" panose="020F0502020204030204" pitchFamily="34" charset="0"/>
-                        <a:cs typeface="Times New Roman" panose="02020603050405020304" pitchFamily="18" charset="0"/>
-                      </a:endParaRPr>
-                    </a:p>
-                  </a:txBody>
-                  <a:tcPr marL="57433" marR="57433" marT="0" marB="0" anchor="ctr">
-                    <a:lnL w="12700" cap="flat" cmpd="sng" algn="ctr">
-                      <a:solidFill>
-                        <a:srgbClr val="000000"/>
-                      </a:solidFill>
-                      <a:prstDash val="solid"/>
-                      <a:round/>
-                      <a:headEnd type="none" w="med" len="med"/>
-                      <a:tailEnd type="none" w="med" len="med"/>
-                    </a:lnL>
-                    <a:lnR w="12700" cap="flat" cmpd="sng" algn="ctr">
-                      <a:solidFill>
-                        <a:srgbClr val="000000"/>
-                      </a:solidFill>
-                      <a:prstDash val="solid"/>
-                      <a:round/>
-                      <a:headEnd type="none" w="med" len="med"/>
-                      <a:tailEnd type="none" w="med" len="med"/>
-                    </a:lnR>
-                    <a:lnT w="12700" cap="flat" cmpd="sng" algn="ctr">
-                      <a:solidFill>
-                        <a:srgbClr val="000000"/>
-                      </a:solidFill>
-                      <a:prstDash val="solid"/>
-                      <a:round/>
-                      <a:headEnd type="none" w="med" len="med"/>
-                      <a:tailEnd type="none" w="med" len="med"/>
-                    </a:lnT>
-                    <a:lnB w="12700" cap="flat" cmpd="sng" algn="ctr">
-                      <a:solidFill>
-                        <a:srgbClr val="000000"/>
-                      </a:solidFill>
-                      <a:prstDash val="solid"/>
-                      <a:round/>
-                      <a:headEnd type="none" w="med" len="med"/>
-                      <a:tailEnd type="none" w="med" len="med"/>
-                    </a:lnB>
-                    <a:noFill/>
-                  </a:tcPr>
-                </a:tc>
-                <a:extLst>
-                  <a:ext uri="{0D108BD9-81ED-4DB2-BD59-A6C34878D82A}">
-                    <a16:rowId xmlns:a16="http://schemas.microsoft.com/office/drawing/2014/main" val="3433637511"/>
+                    <a16:rowId xmlns:a16="http://schemas.microsoft.com/office/drawing/2014/main" val="1647794969"/>
                   </a:ext>
                 </a:extLst>
               </a:tr>

</xml_diff>

<commit_message>
fix: add type parameter to gerarCertificado function for dynamic template loading
</commit_message>
<xml_diff>
--- a/public/templates/frente-verso-3a.pptx
+++ b/public/templates/frente-verso-3a.pptx
@@ -128,8 +128,7 @@
 <file path=ppt/revisionInfo.xml><?xml version="1.0" encoding="utf-8"?>
 <p1510:revInfo xmlns:a="http://schemas.openxmlformats.org/drawingml/2006/main" xmlns:r="http://schemas.openxmlformats.org/officeDocument/2006/relationships" xmlns:p1510="http://schemas.microsoft.com/office/powerpoint/2015/10/main">
   <p1510:revLst>
-    <p1510:client id="{204202F2-86F0-4CD8-B6CE-2D393A17307D}" v="373" dt="2025-01-03T23:52:56.188"/>
-    <p1510:client id="{F6AA6E80-E569-4CB3-8F82-00241AED0ADB}" v="24" dt="2025-01-05T20:21:03.661"/>
+    <p1510:client id="{D46939D0-EC00-4F96-9764-AC5E61BC0E6F}" v="141" dt="2025-01-30T05:07:23.876"/>
   </p1510:revLst>
 </p1510:revInfo>
 </file>
@@ -279,7 +278,7 @@
           <a:p>
             <a:fld id="{62DE8017-325E-4800-BDDD-E3855642CAE0}" type="datetimeFigureOut">
               <a:rPr lang="pt-BR" smtClean="0"/>
-              <a:t>24/01/2025</a:t>
+              <a:t>29/01/2025</a:t>
             </a:fld>
             <a:endParaRPr lang="pt-BR"/>
           </a:p>
@@ -489,7 +488,7 @@
           <a:p>
             <a:fld id="{62DE8017-325E-4800-BDDD-E3855642CAE0}" type="datetimeFigureOut">
               <a:rPr lang="pt-BR" smtClean="0"/>
-              <a:t>24/01/2025</a:t>
+              <a:t>29/01/2025</a:t>
             </a:fld>
             <a:endParaRPr lang="pt-BR"/>
           </a:p>
@@ -699,7 +698,7 @@
           <a:p>
             <a:fld id="{62DE8017-325E-4800-BDDD-E3855642CAE0}" type="datetimeFigureOut">
               <a:rPr lang="pt-BR" smtClean="0"/>
-              <a:t>24/01/2025</a:t>
+              <a:t>29/01/2025</a:t>
             </a:fld>
             <a:endParaRPr lang="pt-BR"/>
           </a:p>
@@ -1898,7 +1897,7 @@
           <a:p>
             <a:fld id="{62DE8017-325E-4800-BDDD-E3855642CAE0}" type="datetimeFigureOut">
               <a:rPr lang="pt-BR" smtClean="0"/>
-              <a:t>24/01/2025</a:t>
+              <a:t>29/01/2025</a:t>
             </a:fld>
             <a:endParaRPr lang="pt-BR"/>
           </a:p>
@@ -2172,7 +2171,7 @@
           <a:p>
             <a:fld id="{62DE8017-325E-4800-BDDD-E3855642CAE0}" type="datetimeFigureOut">
               <a:rPr lang="pt-BR" smtClean="0"/>
-              <a:t>24/01/2025</a:t>
+              <a:t>29/01/2025</a:t>
             </a:fld>
             <a:endParaRPr lang="pt-BR"/>
           </a:p>
@@ -2442,7 +2441,7 @@
           <a:p>
             <a:fld id="{62DE8017-325E-4800-BDDD-E3855642CAE0}" type="datetimeFigureOut">
               <a:rPr lang="pt-BR" smtClean="0"/>
-              <a:t>24/01/2025</a:t>
+              <a:t>29/01/2025</a:t>
             </a:fld>
             <a:endParaRPr lang="pt-BR"/>
           </a:p>
@@ -2848,7 +2847,7 @@
           <a:p>
             <a:fld id="{62DE8017-325E-4800-BDDD-E3855642CAE0}" type="datetimeFigureOut">
               <a:rPr lang="pt-BR" smtClean="0"/>
-              <a:t>24/01/2025</a:t>
+              <a:t>29/01/2025</a:t>
             </a:fld>
             <a:endParaRPr lang="pt-BR"/>
           </a:p>
@@ -2998,7 +2997,7 @@
           <a:p>
             <a:fld id="{62DE8017-325E-4800-BDDD-E3855642CAE0}" type="datetimeFigureOut">
               <a:rPr lang="pt-BR" smtClean="0"/>
-              <a:t>24/01/2025</a:t>
+              <a:t>29/01/2025</a:t>
             </a:fld>
             <a:endParaRPr lang="pt-BR"/>
           </a:p>
@@ -3117,7 +3116,7 @@
           <a:p>
             <a:fld id="{62DE8017-325E-4800-BDDD-E3855642CAE0}" type="datetimeFigureOut">
               <a:rPr lang="pt-BR" smtClean="0"/>
-              <a:t>24/01/2025</a:t>
+              <a:t>29/01/2025</a:t>
             </a:fld>
             <a:endParaRPr lang="pt-BR"/>
           </a:p>
@@ -3427,7 +3426,7 @@
           <a:p>
             <a:fld id="{62DE8017-325E-4800-BDDD-E3855642CAE0}" type="datetimeFigureOut">
               <a:rPr lang="pt-BR" smtClean="0"/>
-              <a:t>24/01/2025</a:t>
+              <a:t>29/01/2025</a:t>
             </a:fld>
             <a:endParaRPr lang="pt-BR"/>
           </a:p>
@@ -3717,7 +3716,7 @@
           <a:p>
             <a:fld id="{62DE8017-325E-4800-BDDD-E3855642CAE0}" type="datetimeFigureOut">
               <a:rPr lang="pt-BR" smtClean="0"/>
-              <a:t>24/01/2025</a:t>
+              <a:t>29/01/2025</a:t>
             </a:fld>
             <a:endParaRPr lang="pt-BR"/>
           </a:p>
@@ -5207,7 +5206,7 @@
               <a:t>funcionário(a), portador(a) do CPF: [</a:t>
             </a:r>
             <a:r>
-              <a:rPr kumimoji="0" lang="pt-BR" sz="1000" b="0" i="0" u="none" strike="noStrike" kern="1200" cap="none" spc="0" normalizeH="0" baseline="0" noProof="0" dirty="0" err="1">
+              <a:rPr kumimoji="0" lang="pt-BR" sz="1000" b="0" i="0" u="none" strike="noStrike" kern="1200" cap="none" spc="0" normalizeH="0" baseline="0" noProof="0" err="1">
                 <a:ln>
                   <a:noFill/>
                 </a:ln>
@@ -5245,9 +5244,6 @@
                 <a:ln>
                   <a:noFill/>
                 </a:ln>
-                <a:solidFill>
-                  <a:srgbClr val="FF0000"/>
-                </a:solidFill>
                 <a:effectLst/>
                 <a:uLnTx/>
                 <a:uFillTx/>
@@ -5258,13 +5254,10 @@
               <a:t>[</a:t>
             </a:r>
             <a:r>
-              <a:rPr kumimoji="0" lang="pt-BR" sz="1000" b="1" i="0" u="none" strike="noStrike" kern="1200" cap="none" spc="0" normalizeH="0" baseline="0" noProof="0" dirty="0" err="1">
+              <a:rPr kumimoji="0" lang="pt-BR" sz="1000" b="1" i="0" u="none" strike="noStrike" kern="1200" cap="none" spc="0" normalizeH="0" baseline="0" noProof="0" err="1">
                 <a:ln>
                   <a:noFill/>
                 </a:ln>
-                <a:solidFill>
-                  <a:srgbClr val="FF0000"/>
-                </a:solidFill>
                 <a:effectLst/>
                 <a:uLnTx/>
                 <a:uFillTx/>
@@ -5279,9 +5272,6 @@
                 <a:ln>
                   <a:noFill/>
                 </a:ln>
-                <a:solidFill>
-                  <a:srgbClr val="FF0000"/>
-                </a:solidFill>
                 <a:effectLst/>
                 <a:uLnTx/>
                 <a:uFillTx/>
@@ -5290,6 +5280,76 @@
                 <a:cs typeface="+mn-cs"/>
               </a:rPr>
               <a:t>]</a:t>
+            </a:r>
+            <a:r>
+              <a:rPr kumimoji="0" lang="pt-BR" sz="1000" b="0" i="0" u="none" strike="noStrike" kern="1200" cap="none" spc="0" normalizeH="0" baseline="0" noProof="0" dirty="0">
+                <a:ln>
+                  <a:noFill/>
+                </a:ln>
+                <a:effectLst/>
+                <a:uLnTx/>
+                <a:uFillTx/>
+                <a:latin typeface="Arial"/>
+                <a:ea typeface="+mn-ea"/>
+                <a:cs typeface="+mn-cs"/>
+              </a:rPr>
+              <a:t>, regulamentada pela </a:t>
+            </a:r>
+            <a:r>
+              <a:rPr kumimoji="0" lang="pt-BR" sz="1000" b="1" i="0" u="none" strike="noStrike" kern="1200" cap="none" spc="0" normalizeH="0" baseline="0" noProof="0" dirty="0">
+                <a:ln>
+                  <a:noFill/>
+                </a:ln>
+                <a:effectLst/>
+                <a:uLnTx/>
+                <a:uFillTx/>
+                <a:latin typeface="Arial"/>
+                <a:ea typeface="+mn-ea"/>
+                <a:cs typeface="+mn-cs"/>
+              </a:rPr>
+              <a:t>[</a:t>
+            </a:r>
+            <a:r>
+              <a:rPr kumimoji="0" lang="pt-BR" sz="1000" b="1" i="0" u="none" strike="noStrike" kern="1200" cap="none" spc="0" normalizeH="0" baseline="0" noProof="0" err="1">
+                <a:ln>
+                  <a:noFill/>
+                </a:ln>
+                <a:effectLst/>
+                <a:uLnTx/>
+                <a:uFillTx/>
+                <a:latin typeface="Arial"/>
+                <a:ea typeface="+mn-ea"/>
+                <a:cs typeface="+mn-cs"/>
+              </a:rPr>
+              <a:t>portaria_treinamento</a:t>
+            </a:r>
+            <a:r>
+              <a:rPr kumimoji="0" lang="pt-BR" sz="1000" b="1" i="0" u="none" strike="noStrike" kern="1200" cap="none" spc="0" normalizeH="0" baseline="0" noProof="0" dirty="0">
+                <a:ln>
+                  <a:noFill/>
+                </a:ln>
+                <a:effectLst/>
+                <a:uLnTx/>
+                <a:uFillTx/>
+                <a:latin typeface="Arial"/>
+                <a:ea typeface="+mn-ea"/>
+                <a:cs typeface="+mn-cs"/>
+              </a:rPr>
+              <a:t>]</a:t>
+            </a:r>
+            <a:r>
+              <a:rPr kumimoji="0" lang="pt-BR" sz="1000" b="0" i="0" u="none" strike="noStrike" kern="1200" cap="none" spc="0" normalizeH="0" baseline="0" noProof="0" dirty="0">
+                <a:ln>
+                  <a:noFill/>
+                </a:ln>
+                <a:effectLst/>
+                <a:uLnTx/>
+                <a:uFillTx/>
+                <a:latin typeface="Arial"/>
+                <a:ea typeface="+mn-ea"/>
+                <a:cs typeface="+mn-cs"/>
+              </a:rPr>
+              <a:t>.</a:t>
             </a:r>
             <a:r>
               <a:rPr kumimoji="0" lang="pt-BR" sz="1000" b="0" i="0" u="none" strike="noStrike" kern="1200" cap="none" spc="0" normalizeH="0" baseline="0" noProof="0" dirty="0">
@@ -5306,16 +5366,13 @@
                 <a:ea typeface="+mn-ea"/>
                 <a:cs typeface="+mn-cs"/>
               </a:rPr>
-              <a:t>, regulamentada pela </a:t>
-            </a:r>
-            <a:r>
-              <a:rPr kumimoji="0" lang="pt-BR" sz="1000" b="1" i="0" u="none" strike="noStrike" kern="1200" cap="none" spc="0" normalizeH="0" baseline="0" noProof="0" dirty="0">
+              <a:t> Este treinamento foi patrocinado pela </a:t>
+            </a:r>
+            <a:r>
+              <a:rPr kumimoji="0" lang="pt-BR" sz="1000" b="0" i="0" u="none" strike="noStrike" kern="1200" cap="none" spc="0" normalizeH="0" baseline="0" noProof="0" dirty="0">
                 <a:ln>
                   <a:noFill/>
                 </a:ln>
-                <a:solidFill>
-                  <a:srgbClr val="FF0000"/>
-                </a:solidFill>
                 <a:effectLst/>
                 <a:uLnTx/>
                 <a:uFillTx/>
@@ -5323,16 +5380,13 @@
                 <a:ea typeface="+mn-ea"/>
                 <a:cs typeface="+mn-cs"/>
               </a:rPr>
-              <a:t>[</a:t>
-            </a:r>
-            <a:r>
-              <a:rPr kumimoji="0" lang="pt-BR" sz="1000" b="1" i="0" u="none" strike="noStrike" kern="1200" cap="none" spc="0" normalizeH="0" baseline="0" noProof="0" dirty="0" err="1">
+              <a:t>empresa [empresa], inscrita no CNPJ: [</a:t>
+            </a:r>
+            <a:r>
+              <a:rPr kumimoji="0" lang="pt-BR" sz="1000" b="0" i="0" u="none" strike="noStrike" kern="1200" cap="none" spc="0" normalizeH="0" baseline="0" noProof="0" err="1">
                 <a:ln>
                   <a:noFill/>
                 </a:ln>
-                <a:solidFill>
-                  <a:srgbClr val="FF0000"/>
-                </a:solidFill>
                 <a:effectLst/>
                 <a:uLnTx/>
                 <a:uFillTx/>
@@ -5340,16 +5394,13 @@
                 <a:ea typeface="+mn-ea"/>
                 <a:cs typeface="+mn-cs"/>
               </a:rPr>
-              <a:t>portaria_treinamento</a:t>
-            </a:r>
-            <a:r>
-              <a:rPr kumimoji="0" lang="pt-BR" sz="1000" b="1" i="0" u="none" strike="noStrike" kern="1200" cap="none" spc="0" normalizeH="0" baseline="0" noProof="0" dirty="0">
+              <a:t>cnpj</a:t>
+            </a:r>
+            <a:r>
+              <a:rPr kumimoji="0" lang="pt-BR" sz="1000" b="0" i="0" u="none" strike="noStrike" kern="1200" cap="none" spc="0" normalizeH="0" baseline="0" noProof="0" dirty="0">
                 <a:ln>
                   <a:noFill/>
                 </a:ln>
-                <a:solidFill>
-                  <a:srgbClr val="FF0000"/>
-                </a:solidFill>
                 <a:effectLst/>
                 <a:uLnTx/>
                 <a:uFillTx/>
@@ -5357,16 +5408,31 @@
                 <a:ea typeface="+mn-ea"/>
                 <a:cs typeface="+mn-cs"/>
               </a:rPr>
-              <a:t>]</a:t>
+              <a:t>], e realizado no dia</a:t>
+            </a:r>
+            <a:r>
+              <a:rPr lang="pt-BR" sz="1000" dirty="0">
+                <a:latin typeface="Arial"/>
+              </a:rPr>
+              <a:t> [</a:t>
+            </a:r>
+            <a:r>
+              <a:rPr lang="pt-BR" sz="1000" err="1">
+                <a:latin typeface="Arial"/>
+              </a:rPr>
+              <a:t>data_realizada</a:t>
+            </a:r>
+            <a:r>
+              <a:rPr lang="pt-BR" sz="1000" dirty="0">
+                <a:latin typeface="Arial"/>
+              </a:rPr>
+              <a:t>], </a:t>
             </a:r>
             <a:r>
               <a:rPr kumimoji="0" lang="pt-BR" sz="1000" b="0" i="0" u="none" strike="noStrike" kern="1200" cap="none" spc="0" normalizeH="0" baseline="0" noProof="0" dirty="0">
                 <a:ln>
                   <a:noFill/>
                 </a:ln>
-                <a:solidFill>
-                  <a:srgbClr val="000000"/>
-                </a:solidFill>
                 <a:effectLst/>
                 <a:uLnTx/>
                 <a:uFillTx/>
@@ -5374,16 +5440,19 @@
                 <a:ea typeface="+mn-ea"/>
                 <a:cs typeface="+mn-cs"/>
               </a:rPr>
-              <a:t>. Este treinamento foi patrocinado pela empresa </a:t>
+              <a:t>das [r_</a:t>
+            </a:r>
+            <a:r>
+              <a:rPr lang="pt-BR" sz="1000" dirty="0">
+                <a:latin typeface="Arial"/>
+              </a:rPr>
+              <a:t>hora_1]</a:t>
             </a:r>
             <a:r>
               <a:rPr kumimoji="0" lang="pt-BR" sz="1000" b="0" i="0" u="none" strike="noStrike" kern="1200" cap="none" spc="0" normalizeH="0" baseline="0" noProof="0" dirty="0">
                 <a:ln>
                   <a:noFill/>
                 </a:ln>
-                <a:solidFill>
-                  <a:srgbClr val="FF0000"/>
-                </a:solidFill>
                 <a:effectLst/>
                 <a:uLnTx/>
                 <a:uFillTx/>
@@ -5391,16 +5460,19 @@
                 <a:ea typeface="+mn-ea"/>
                 <a:cs typeface="+mn-cs"/>
               </a:rPr>
-              <a:t>[empresa]</a:t>
+              <a:t> às [r_</a:t>
+            </a:r>
+            <a:r>
+              <a:rPr lang="pt-BR" sz="1000" dirty="0">
+                <a:latin typeface="Arial"/>
+              </a:rPr>
+              <a:t>hora_2],</a:t>
             </a:r>
             <a:r>
               <a:rPr kumimoji="0" lang="pt-BR" sz="1000" b="0" i="0" u="none" strike="noStrike" kern="1200" cap="none" spc="0" normalizeH="0" baseline="0" noProof="0" dirty="0">
                 <a:ln>
                   <a:noFill/>
                 </a:ln>
-                <a:solidFill>
-                  <a:srgbClr val="000000"/>
-                </a:solidFill>
                 <a:effectLst/>
                 <a:uLnTx/>
                 <a:uFillTx/>
@@ -5408,16 +5480,13 @@
                 <a:ea typeface="+mn-ea"/>
                 <a:cs typeface="+mn-cs"/>
               </a:rPr>
-              <a:t>, inscrita no CNPJ: </a:t>
-            </a:r>
-            <a:r>
-              <a:rPr kumimoji="0" lang="pt-BR" sz="1000" b="0" i="0" u="none" strike="noStrike" kern="1200" cap="none" spc="0" normalizeH="0" baseline="0" noProof="0" dirty="0">
+              <a:t> totalizando uma carga horária de [</a:t>
+            </a:r>
+            <a:r>
+              <a:rPr kumimoji="0" lang="pt-BR" sz="1000" b="0" i="0" u="none" strike="noStrike" kern="1200" cap="none" spc="0" normalizeH="0" baseline="0" noProof="0" err="1">
                 <a:ln>
                   <a:noFill/>
                 </a:ln>
-                <a:solidFill>
-                  <a:srgbClr val="FF0000"/>
-                </a:solidFill>
                 <a:effectLst/>
                 <a:uLnTx/>
                 <a:uFillTx/>
@@ -5425,16 +5494,13 @@
                 <a:ea typeface="+mn-ea"/>
                 <a:cs typeface="+mn-cs"/>
               </a:rPr>
-              <a:t>[</a:t>
-            </a:r>
-            <a:r>
-              <a:rPr kumimoji="0" lang="pt-BR" sz="1000" b="0" i="0" u="none" strike="noStrike" kern="1200" cap="none" spc="0" normalizeH="0" baseline="0" noProof="0" dirty="0" err="1">
+              <a:t>carga_hora</a:t>
+            </a:r>
+            <a:r>
+              <a:rPr kumimoji="0" lang="pt-BR" sz="1000" b="0" i="0" u="none" strike="noStrike" kern="1200" cap="none" spc="0" normalizeH="0" baseline="0" noProof="0" dirty="0">
                 <a:ln>
                   <a:noFill/>
                 </a:ln>
-                <a:solidFill>
-                  <a:srgbClr val="FF0000"/>
-                </a:solidFill>
                 <a:effectLst/>
                 <a:uLnTx/>
                 <a:uFillTx/>
@@ -5442,239 +5508,12 @@
                 <a:ea typeface="+mn-ea"/>
                 <a:cs typeface="+mn-cs"/>
               </a:rPr>
-              <a:t>cnpj</a:t>
-            </a:r>
-            <a:r>
-              <a:rPr kumimoji="0" lang="pt-BR" sz="1000" b="0" i="0" u="none" strike="noStrike" kern="1200" cap="none" spc="0" normalizeH="0" baseline="0" noProof="0" dirty="0">
-                <a:ln>
-                  <a:noFill/>
-                </a:ln>
-                <a:solidFill>
-                  <a:srgbClr val="FF0000"/>
-                </a:solidFill>
-                <a:effectLst/>
-                <a:uLnTx/>
-                <a:uFillTx/>
-                <a:latin typeface="Arial"/>
-                <a:ea typeface="+mn-ea"/>
-                <a:cs typeface="+mn-cs"/>
-              </a:rPr>
-              <a:t>]</a:t>
-            </a:r>
-            <a:r>
-              <a:rPr kumimoji="0" lang="pt-BR" sz="1000" b="0" i="0" u="none" strike="noStrike" kern="1200" cap="none" spc="0" normalizeH="0" baseline="0" noProof="0" dirty="0">
-                <a:ln>
-                  <a:noFill/>
-                </a:ln>
-                <a:solidFill>
-                  <a:srgbClr val="000000"/>
-                </a:solidFill>
-                <a:effectLst/>
-                <a:uLnTx/>
-                <a:uFillTx/>
-                <a:latin typeface="Arial"/>
-                <a:ea typeface="+mn-ea"/>
-                <a:cs typeface="+mn-cs"/>
-              </a:rPr>
-              <a:t>, e realizado no dia</a:t>
-            </a:r>
-            <a:r>
-              <a:rPr lang="pt-BR" sz="1000" dirty="0">
-                <a:solidFill>
-                  <a:srgbClr val="000000"/>
-                </a:solidFill>
-                <a:latin typeface="Arial"/>
-              </a:rPr>
-              <a:t> [</a:t>
-            </a:r>
-            <a:r>
-              <a:rPr lang="pt-BR" sz="1000" dirty="0" err="1">
-                <a:solidFill>
-                  <a:srgbClr val="000000"/>
-                </a:solidFill>
-                <a:latin typeface="Arial"/>
-              </a:rPr>
-              <a:t>data_realizada</a:t>
-            </a:r>
-            <a:r>
-              <a:rPr lang="pt-BR" sz="1000" dirty="0">
-                <a:solidFill>
-                  <a:srgbClr val="000000"/>
-                </a:solidFill>
-                <a:latin typeface="Arial"/>
-              </a:rPr>
-              <a:t>], </a:t>
-            </a:r>
-            <a:r>
-              <a:rPr kumimoji="0" lang="pt-BR" sz="1000" b="0" i="0" u="none" strike="noStrike" kern="1200" cap="none" spc="0" normalizeH="0" baseline="0" noProof="0" dirty="0">
-                <a:ln>
-                  <a:noFill/>
-                </a:ln>
-                <a:solidFill>
-                  <a:srgbClr val="000000"/>
-                </a:solidFill>
-                <a:effectLst/>
-                <a:uLnTx/>
-                <a:uFillTx/>
-                <a:latin typeface="Arial"/>
-                <a:ea typeface="+mn-ea"/>
-                <a:cs typeface="+mn-cs"/>
-              </a:rPr>
-              <a:t>das </a:t>
-            </a:r>
-            <a:r>
-              <a:rPr kumimoji="0" lang="pt-BR" sz="1000" b="0" i="0" u="none" strike="noStrike" kern="1200" cap="none" spc="0" normalizeH="0" baseline="0" noProof="0" dirty="0">
-                <a:ln>
-                  <a:noFill/>
-                </a:ln>
-                <a:solidFill>
-                  <a:srgbClr val="FF0000"/>
-                </a:solidFill>
-                <a:effectLst/>
-                <a:uLnTx/>
-                <a:uFillTx/>
-                <a:latin typeface="Arial"/>
-                <a:ea typeface="+mn-ea"/>
-                <a:cs typeface="+mn-cs"/>
-              </a:rPr>
-              <a:t>[r_</a:t>
-            </a:r>
-            <a:r>
-              <a:rPr lang="pt-BR" sz="1000" dirty="0">
-                <a:solidFill>
-                  <a:srgbClr val="FF0000"/>
-                </a:solidFill>
-                <a:latin typeface="Arial"/>
-              </a:rPr>
-              <a:t>hora_1]</a:t>
-            </a:r>
-            <a:r>
-              <a:rPr kumimoji="0" lang="pt-BR" sz="1000" b="0" i="0" u="none" strike="noStrike" kern="1200" cap="none" spc="0" normalizeH="0" baseline="0" noProof="0" dirty="0">
-                <a:ln>
-                  <a:noFill/>
-                </a:ln>
-                <a:solidFill>
-                  <a:srgbClr val="000000"/>
-                </a:solidFill>
-                <a:effectLst/>
-                <a:uLnTx/>
-                <a:uFillTx/>
-                <a:latin typeface="Arial"/>
-                <a:ea typeface="+mn-ea"/>
-                <a:cs typeface="+mn-cs"/>
-              </a:rPr>
-              <a:t> às [r_</a:t>
-            </a:r>
-            <a:r>
-              <a:rPr lang="pt-BR" sz="1000" dirty="0">
-                <a:solidFill>
-                  <a:srgbClr val="000000"/>
-                </a:solidFill>
-                <a:latin typeface="Arial"/>
-              </a:rPr>
-              <a:t>hora_2]</a:t>
-            </a:r>
-            <a:r>
-              <a:rPr lang="pt-BR" sz="1000" dirty="0">
-                <a:solidFill>
-                  <a:srgbClr val="FF0000"/>
-                </a:solidFill>
-                <a:latin typeface="Arial"/>
-              </a:rPr>
-              <a:t>,</a:t>
-            </a:r>
-            <a:r>
-              <a:rPr kumimoji="0" lang="pt-BR" sz="1000" b="0" i="0" u="none" strike="noStrike" kern="1200" cap="none" spc="0" normalizeH="0" baseline="0" noProof="0" dirty="0">
-                <a:ln>
-                  <a:noFill/>
-                </a:ln>
-                <a:solidFill>
-                  <a:srgbClr val="000000"/>
-                </a:solidFill>
-                <a:effectLst/>
-                <a:uLnTx/>
-                <a:uFillTx/>
-                <a:latin typeface="Arial"/>
-                <a:ea typeface="+mn-ea"/>
-                <a:cs typeface="+mn-cs"/>
-              </a:rPr>
-              <a:t> totalizando uma carga horária de </a:t>
-            </a:r>
-            <a:r>
-              <a:rPr kumimoji="0" lang="pt-BR" sz="1000" b="0" i="0" u="none" strike="noStrike" kern="1200" cap="none" spc="0" normalizeH="0" baseline="0" noProof="0" dirty="0">
-                <a:ln>
-                  <a:noFill/>
-                </a:ln>
-                <a:solidFill>
-                  <a:srgbClr val="FF0000"/>
-                </a:solidFill>
-                <a:effectLst/>
-                <a:uLnTx/>
-                <a:uFillTx/>
-                <a:latin typeface="Arial"/>
-                <a:ea typeface="+mn-ea"/>
-                <a:cs typeface="+mn-cs"/>
-              </a:rPr>
-              <a:t>[</a:t>
-            </a:r>
-            <a:r>
-              <a:rPr kumimoji="0" lang="pt-BR" sz="1000" b="0" i="0" u="none" strike="noStrike" kern="1200" cap="none" spc="0" normalizeH="0" baseline="0" noProof="0" dirty="0" err="1">
-                <a:ln>
-                  <a:noFill/>
-                </a:ln>
-                <a:solidFill>
-                  <a:srgbClr val="FF0000"/>
-                </a:solidFill>
-                <a:effectLst/>
-                <a:uLnTx/>
-                <a:uFillTx/>
-                <a:latin typeface="Arial"/>
-                <a:ea typeface="+mn-ea"/>
-                <a:cs typeface="+mn-cs"/>
-              </a:rPr>
-              <a:t>carga_hora</a:t>
-            </a:r>
-            <a:r>
-              <a:rPr kumimoji="0" lang="pt-BR" sz="1000" b="0" i="0" u="none" strike="noStrike" kern="1200" cap="none" spc="0" normalizeH="0" baseline="0" noProof="0" dirty="0">
-                <a:ln>
-                  <a:noFill/>
-                </a:ln>
-                <a:solidFill>
-                  <a:srgbClr val="FF0000"/>
-                </a:solidFill>
-                <a:effectLst/>
-                <a:uLnTx/>
-                <a:uFillTx/>
-                <a:latin typeface="Arial"/>
-                <a:ea typeface="+mn-ea"/>
-                <a:cs typeface="+mn-cs"/>
-              </a:rPr>
-              <a:t>]</a:t>
-            </a:r>
-            <a:r>
-              <a:rPr kumimoji="0" lang="pt-BR" sz="1000" b="0" i="0" u="none" strike="noStrike" kern="1200" cap="none" spc="0" normalizeH="0" baseline="0" noProof="0" dirty="0">
-                <a:ln>
-                  <a:noFill/>
-                </a:ln>
-                <a:solidFill>
-                  <a:srgbClr val="000000"/>
-                </a:solidFill>
-                <a:effectLst/>
-                <a:uLnTx/>
-                <a:uFillTx/>
-                <a:latin typeface="Arial"/>
-                <a:ea typeface="+mn-ea"/>
-                <a:cs typeface="+mn-cs"/>
-              </a:rPr>
-              <a:t> horas/aula. O(a) participante foi avaliado(a) e considerado(a) apto(a) pelo instrutor e responsável técnica da capacitação.</a:t>
+              <a:t>] horas/aula. O(a) participante foi avaliado(a) e considerado(a) apto(a) pelo instrutor e responsável técnica da capacitação.</a:t>
             </a:r>
             <a:endParaRPr kumimoji="0" lang="en-US" sz="1000" b="0" i="0" u="none" strike="noStrike" kern="1200" cap="none" spc="0" normalizeH="0" baseline="0" noProof="0" dirty="0">
               <a:ln>
                 <a:noFill/>
               </a:ln>
-              <a:solidFill>
-                <a:srgbClr val="000000"/>
-              </a:solidFill>
               <a:effectLst/>
               <a:uLnTx/>
               <a:uFillTx/>
@@ -5739,9 +5578,6 @@
                 <a:ln>
                   <a:noFill/>
                 </a:ln>
-                <a:solidFill>
-                  <a:srgbClr val="000000"/>
-                </a:solidFill>
                 <a:effectLst/>
                 <a:uLnTx/>
                 <a:uFillTx/>
@@ -5749,16 +5585,13 @@
                 <a:ea typeface="+mn-ea"/>
                 <a:cs typeface="+mn-cs"/>
               </a:rPr>
-              <a:t>EMISSÃO DO CERTIFICADO DIA </a:t>
-            </a:r>
-            <a:r>
-              <a:rPr kumimoji="0" lang="pt-BR" sz="1050" b="1" i="0" u="none" strike="noStrike" kern="1200" cap="none" spc="0" normalizeH="0" baseline="0" noProof="0" dirty="0">
+              <a:t>EMISSÃO DO CERTIFICADO DIA [</a:t>
+            </a:r>
+            <a:r>
+              <a:rPr kumimoji="0" lang="pt-BR" sz="1050" b="1" i="0" u="none" strike="noStrike" kern="1200" cap="none" spc="0" normalizeH="0" baseline="0" noProof="0" err="1">
                 <a:ln>
                   <a:noFill/>
                 </a:ln>
-                <a:solidFill>
-                  <a:srgbClr val="FF0000"/>
-                </a:solidFill>
                 <a:effectLst/>
                 <a:uLnTx/>
                 <a:uFillTx/>
@@ -5766,16 +5599,13 @@
                 <a:ea typeface="+mn-ea"/>
                 <a:cs typeface="+mn-cs"/>
               </a:rPr>
-              <a:t>[</a:t>
-            </a:r>
-            <a:r>
-              <a:rPr kumimoji="0" lang="pt-BR" sz="1050" b="1" i="0" u="none" strike="noStrike" kern="1200" cap="none" spc="0" normalizeH="0" baseline="0" noProof="0" dirty="0" err="1">
+              <a:t>e_dia</a:t>
+            </a:r>
+            <a:r>
+              <a:rPr kumimoji="0" lang="pt-BR" sz="1050" b="1" i="0" u="none" strike="noStrike" kern="1200" cap="none" spc="0" normalizeH="0" baseline="0" noProof="0" dirty="0">
                 <a:ln>
                   <a:noFill/>
                 </a:ln>
-                <a:solidFill>
-                  <a:srgbClr val="FF0000"/>
-                </a:solidFill>
                 <a:effectLst/>
                 <a:uLnTx/>
                 <a:uFillTx/>
@@ -5783,16 +5613,13 @@
                 <a:ea typeface="+mn-ea"/>
                 <a:cs typeface="+mn-cs"/>
               </a:rPr>
-              <a:t>e_dia</a:t>
-            </a:r>
-            <a:r>
-              <a:rPr kumimoji="0" lang="pt-BR" sz="1050" b="1" i="0" u="none" strike="noStrike" kern="1200" cap="none" spc="0" normalizeH="0" baseline="0" noProof="0" dirty="0">
+              <a:t>] DE [</a:t>
+            </a:r>
+            <a:r>
+              <a:rPr kumimoji="0" lang="pt-BR" sz="1050" b="1" i="0" u="none" strike="noStrike" kern="1200" cap="none" spc="0" normalizeH="0" baseline="0" noProof="0" err="1">
                 <a:ln>
                   <a:noFill/>
                 </a:ln>
-                <a:solidFill>
-                  <a:srgbClr val="FF0000"/>
-                </a:solidFill>
                 <a:effectLst/>
                 <a:uLnTx/>
                 <a:uFillTx/>
@@ -5800,16 +5627,13 @@
                 <a:ea typeface="+mn-ea"/>
                 <a:cs typeface="+mn-cs"/>
               </a:rPr>
-              <a:t>]</a:t>
+              <a:t>e_mes</a:t>
             </a:r>
             <a:r>
               <a:rPr kumimoji="0" lang="pt-BR" sz="1050" b="1" i="0" u="none" strike="noStrike" kern="1200" cap="none" spc="0" normalizeH="0" baseline="0" noProof="0" dirty="0">
                 <a:ln>
                   <a:noFill/>
                 </a:ln>
-                <a:solidFill>
-                  <a:srgbClr val="000000"/>
-                </a:solidFill>
                 <a:effectLst/>
                 <a:uLnTx/>
                 <a:uFillTx/>
@@ -5817,116 +5641,35 @@
                 <a:ea typeface="+mn-ea"/>
                 <a:cs typeface="+mn-cs"/>
               </a:rPr>
-              <a:t> DE </a:t>
-            </a:r>
-            <a:r>
-              <a:rPr kumimoji="0" lang="pt-BR" sz="1050" b="1" i="0" u="none" strike="noStrike" kern="1200" cap="none" spc="0" normalizeH="0" baseline="0" noProof="0" dirty="0">
-                <a:ln>
-                  <a:noFill/>
-                </a:ln>
-                <a:solidFill>
-                  <a:srgbClr val="FF0000"/>
-                </a:solidFill>
-                <a:effectLst/>
-                <a:uLnTx/>
-                <a:uFillTx/>
+              <a:t>] DE 2024 – </a:t>
+            </a:r>
+            <a:r>
+              <a:rPr lang="pt-BR" sz="1100" b="1" dirty="0">
                 <a:latin typeface="Arial"/>
-                <a:ea typeface="+mn-ea"/>
-                <a:cs typeface="+mn-cs"/>
               </a:rPr>
               <a:t>[</a:t>
             </a:r>
             <a:r>
-              <a:rPr kumimoji="0" lang="pt-BR" sz="1050" b="1" i="0" u="none" strike="noStrike" kern="1200" cap="none" spc="0" normalizeH="0" baseline="0" noProof="0" dirty="0" err="1">
-                <a:ln>
-                  <a:noFill/>
-                </a:ln>
-                <a:solidFill>
-                  <a:srgbClr val="FF0000"/>
-                </a:solidFill>
-                <a:effectLst/>
-                <a:uLnTx/>
-                <a:uFillTx/>
+              <a:rPr lang="pt-BR" sz="1100" b="1" err="1">
                 <a:latin typeface="Arial"/>
-                <a:ea typeface="+mn-ea"/>
-                <a:cs typeface="+mn-cs"/>
-              </a:rPr>
-              <a:t>e_mes</a:t>
-            </a:r>
-            <a:r>
-              <a:rPr kumimoji="0" lang="pt-BR" sz="1050" b="1" i="0" u="none" strike="noStrike" kern="1200" cap="none" spc="0" normalizeH="0" baseline="0" noProof="0" dirty="0">
-                <a:ln>
-                  <a:noFill/>
-                </a:ln>
-                <a:solidFill>
-                  <a:srgbClr val="FF0000"/>
-                </a:solidFill>
-                <a:effectLst/>
-                <a:uLnTx/>
-                <a:uFillTx/>
+              </a:rPr>
+              <a:t>local_emissao</a:t>
+            </a:r>
+            <a:r>
+              <a:rPr lang="pt-BR" sz="1100" b="1" dirty="0">
                 <a:latin typeface="Arial"/>
-                <a:ea typeface="+mn-ea"/>
-                <a:cs typeface="+mn-cs"/>
-              </a:rPr>
-              <a:t>]</a:t>
-            </a:r>
-            <a:r>
-              <a:rPr kumimoji="0" lang="pt-BR" sz="1050" b="1" i="0" u="none" strike="noStrike" kern="1200" cap="none" spc="0" normalizeH="0" baseline="0" noProof="0" dirty="0">
-                <a:ln>
-                  <a:noFill/>
-                </a:ln>
-                <a:solidFill>
-                  <a:srgbClr val="000000"/>
-                </a:solidFill>
-                <a:effectLst/>
-                <a:uLnTx/>
-                <a:uFillTx/>
-                <a:latin typeface="Arial"/>
-                <a:ea typeface="+mn-ea"/>
-                <a:cs typeface="+mn-cs"/>
-              </a:rPr>
-              <a:t> DE 2024 – </a:t>
-            </a:r>
-            <a:r>
-              <a:rPr lang="pt-BR" sz="1100" b="1" dirty="0">
-                <a:solidFill>
-                  <a:srgbClr val="000000"/>
-                </a:solidFill>
-                <a:latin typeface="Arial"/>
-              </a:rPr>
-              <a:t>[</a:t>
-            </a:r>
-            <a:r>
-              <a:rPr lang="pt-BR" sz="1100" b="1" dirty="0" err="1">
-                <a:solidFill>
-                  <a:srgbClr val="000000"/>
-                </a:solidFill>
-                <a:latin typeface="Arial"/>
-              </a:rPr>
-              <a:t>local_emissao</a:t>
-            </a:r>
-            <a:r>
-              <a:rPr lang="pt-BR" sz="1100" b="1" dirty="0">
-                <a:solidFill>
-                  <a:srgbClr val="000000"/>
-                </a:solidFill>
-                <a:latin typeface="Arial"/>
               </a:rPr>
               <a:t>].</a:t>
             </a:r>
-            <a:endParaRPr kumimoji="0" lang="en-US" sz="1050" b="0" i="0" u="none" strike="noStrike" kern="1200" cap="none" spc="0" normalizeH="0" baseline="0" noProof="0" dirty="0">
+            <a:endParaRPr lang="en-US" sz="1050" b="0" i="0" u="none" strike="noStrike" kern="1200" cap="none" spc="0" normalizeH="0" baseline="0" noProof="0">
               <a:ln>
                 <a:noFill/>
               </a:ln>
-              <a:solidFill>
-                <a:srgbClr val="000000"/>
-              </a:solidFill>
               <a:effectLst/>
               <a:uLnTx/>
               <a:uFillTx/>
               <a:latin typeface="Arial"/>
-              <a:ea typeface="+mn-ea"/>
-              <a:cs typeface="+mn-cs"/>
+              <a:cs typeface="Arial"/>
             </a:endParaRPr>
           </a:p>
         </p:txBody>
@@ -6078,9 +5821,6 @@
                 <a:ln>
                   <a:noFill/>
                 </a:ln>
-                <a:solidFill>
-                  <a:srgbClr val="000000"/>
-                </a:solidFill>
                 <a:effectLst/>
                 <a:uLnTx/>
                 <a:uFillTx/>
@@ -6095,9 +5835,6 @@
                 <a:ln>
                   <a:noFill/>
                 </a:ln>
-                <a:solidFill>
-                  <a:srgbClr val="000000"/>
-                </a:solidFill>
                 <a:effectLst/>
                 <a:uLnTx/>
                 <a:uFillTx/>
@@ -6109,48 +5846,27 @@
             </a:r>
             <a:r>
               <a:rPr lang="pt-BR" sz="900" b="1" dirty="0">
-                <a:solidFill>
-                  <a:srgbClr val="FF0000"/>
-                </a:solidFill>
                 <a:latin typeface="Arial"/>
               </a:rPr>
               <a:t>[</a:t>
             </a:r>
             <a:r>
-              <a:rPr lang="pt-BR" sz="900" b="1" dirty="0" err="1">
-                <a:solidFill>
-                  <a:srgbClr val="FF0000"/>
-                </a:solidFill>
+              <a:rPr lang="pt-BR" sz="900" b="1" err="1">
                 <a:latin typeface="Arial"/>
               </a:rPr>
               <a:t>codigo</a:t>
             </a:r>
             <a:r>
               <a:rPr lang="pt-BR" sz="900" b="1" dirty="0">
-                <a:solidFill>
-                  <a:srgbClr val="FF0000"/>
-                </a:solidFill>
                 <a:latin typeface="Arial"/>
               </a:rPr>
-              <a:t>]</a:t>
-            </a:r>
-            <a:r>
-              <a:rPr lang="pt-BR" sz="900" b="1" dirty="0">
-                <a:solidFill>
-                  <a:srgbClr val="000000"/>
-                </a:solidFill>
-                <a:latin typeface="Arial"/>
-              </a:rPr>
-              <a:t>/</a:t>
+              <a:t>]/</a:t>
             </a:r>
             <a:r>
               <a:rPr kumimoji="0" lang="pt-BR" sz="900" b="1" i="0" u="none" strike="noStrike" kern="1200" cap="none" spc="0" normalizeH="0" baseline="0" noProof="0" dirty="0">
                 <a:ln>
                   <a:noFill/>
                 </a:ln>
-                <a:solidFill>
-                  <a:srgbClr val="000000"/>
-                </a:solidFill>
                 <a:effectLst/>
                 <a:uLnTx/>
                 <a:uFillTx/>
@@ -6160,19 +5876,15 @@
               </a:rPr>
               <a:t>2024</a:t>
             </a:r>
-            <a:endParaRPr kumimoji="0" lang="en-US" sz="900" b="0" i="0" u="none" strike="noStrike" kern="1200" cap="none" spc="0" normalizeH="0" baseline="0" noProof="0" dirty="0">
+            <a:endParaRPr lang="en-US" sz="900" b="0" i="0" u="none" strike="noStrike" kern="1200" cap="none" spc="0" normalizeH="0" baseline="0" noProof="0">
               <a:ln>
                 <a:noFill/>
               </a:ln>
-              <a:solidFill>
-                <a:srgbClr val="000000"/>
-              </a:solidFill>
               <a:effectLst/>
               <a:uLnTx/>
               <a:uFillTx/>
               <a:latin typeface="Arial"/>
-              <a:ea typeface="+mn-ea"/>
-              <a:cs typeface="+mn-cs"/>
+              <a:cs typeface="Arial"/>
             </a:endParaRPr>
           </a:p>
         </p:txBody>
@@ -6461,9 +6173,6 @@
             </a:r>
             <a:r>
               <a:rPr lang="pt-BR" sz="600" dirty="0">
-                <a:solidFill>
-                  <a:srgbClr val="FF0000"/>
-                </a:solidFill>
                 <a:latin typeface="Arial"/>
                 <a:cs typeface="Arial"/>
               </a:rPr>
@@ -6471,9 +6180,6 @@
             </a:r>
             <a:r>
               <a:rPr lang="pt-BR" sz="600" dirty="0" err="1">
-                <a:solidFill>
-                  <a:srgbClr val="FF0000"/>
-                </a:solidFill>
                 <a:latin typeface="Arial"/>
                 <a:cs typeface="Arial"/>
               </a:rPr>
@@ -6481,18 +6187,12 @@
             </a:r>
             <a:r>
               <a:rPr lang="pt-BR" sz="600" dirty="0">
-                <a:solidFill>
-                  <a:srgbClr val="FF0000"/>
-                </a:solidFill>
                 <a:latin typeface="Arial"/>
                 <a:cs typeface="Arial"/>
               </a:rPr>
               <a:t>]</a:t>
             </a:r>
             <a:endParaRPr lang="pt-BR" sz="600" dirty="0">
-              <a:solidFill>
-                <a:srgbClr val="FF0000"/>
-              </a:solidFill>
               <a:latin typeface="Arial" panose="020B0604020202020204" pitchFamily="34" charset="0"/>
               <a:cs typeface="Arial" panose="020B0604020202020204" pitchFamily="34" charset="0"/>
             </a:endParaRPr>
@@ -6508,7 +6208,7 @@
         <p:spPr>
           <a:xfrm>
             <a:off x="6298284" y="1349677"/>
-            <a:ext cx="2961874" cy="1046440"/>
+            <a:ext cx="2961874" cy="938719"/>
           </a:xfrm>
           <a:prstGeom prst="rect">
             <a:avLst/>
@@ -6580,56 +6280,41 @@
             <a:pPr algn="ctr"/>
             <a:r>
               <a:rPr lang="pt-BR" sz="600" b="1" dirty="0">
-                <a:solidFill>
-                  <a:srgbClr val="FF0000"/>
-                </a:solidFill>
                 <a:latin typeface="Arial"/>
                 <a:cs typeface="Arial"/>
               </a:rPr>
               <a:t>[nome3]</a:t>
             </a:r>
-            <a:endParaRPr lang="pt-BR" dirty="0"/>
+            <a:endParaRPr lang="pt-BR">
+              <a:ea typeface="Calibri"/>
+              <a:cs typeface="Calibri"/>
+            </a:endParaRPr>
           </a:p>
           <a:p>
             <a:pPr algn="ctr"/>
             <a:r>
               <a:rPr lang="pt-BR" sz="600" dirty="0">
-                <a:solidFill>
-                  <a:srgbClr val="FF0000"/>
-                </a:solidFill>
-                <a:latin typeface="Arial" panose="020B0604020202020204" pitchFamily="34" charset="0"/>
+                <a:latin typeface="Arial"/>
                 <a:ea typeface="Times New Roman" panose="02020603050405020304" pitchFamily="18" charset="0"/>
-                <a:cs typeface="Arial" panose="020B0604020202020204" pitchFamily="34" charset="0"/>
-              </a:rPr>
-              <a:t>ENGENHEIRA ELETRICISTA </a:t>
-            </a:r>
+                <a:cs typeface="Arial"/>
+              </a:rPr>
+              <a:t>[qualificação_profissional3]</a:t>
+            </a:r>
+            <a:endParaRPr lang="pt-BR" sz="600" dirty="0">
+              <a:latin typeface="Arial" panose="020B0604020202020204" pitchFamily="34" charset="0"/>
+              <a:ea typeface="Times New Roman" panose="02020603050405020304" pitchFamily="18" charset="0"/>
+              <a:cs typeface="Arial" panose="020B0604020202020204" pitchFamily="34" charset="0"/>
+            </a:endParaRPr>
           </a:p>
           <a:p>
             <a:pPr algn="ctr"/>
             <a:r>
               <a:rPr lang="pt-BR" sz="600" dirty="0">
-                <a:solidFill>
-                  <a:srgbClr val="FF0000"/>
-                </a:solidFill>
-                <a:latin typeface="Arial" panose="020B0604020202020204" pitchFamily="34" charset="0"/>
+                <a:latin typeface="Arial"/>
                 <a:ea typeface="Times New Roman" panose="02020603050405020304" pitchFamily="18" charset="0"/>
-                <a:cs typeface="Arial" panose="020B0604020202020204" pitchFamily="34" charset="0"/>
-              </a:rPr>
-              <a:t>ENGENHEIRA DE SEGURANÇA DO TRABALHO </a:t>
-            </a:r>
-          </a:p>
-          <a:p>
-            <a:pPr algn="ctr"/>
-            <a:r>
-              <a:rPr lang="pt-BR" sz="600" dirty="0">
-                <a:solidFill>
-                  <a:srgbClr val="FF0000"/>
-                </a:solidFill>
-                <a:latin typeface="Arial" panose="020B0604020202020204" pitchFamily="34" charset="0"/>
-                <a:ea typeface="Times New Roman" panose="02020603050405020304" pitchFamily="18" charset="0"/>
-                <a:cs typeface="Arial" panose="020B0604020202020204" pitchFamily="34" charset="0"/>
-              </a:rPr>
-              <a:t>CREA N° 9949/D MS</a:t>
+                <a:cs typeface="Arial"/>
+              </a:rPr>
+              <a:t>[registro_profissional3]</a:t>
             </a:r>
           </a:p>
         </p:txBody>
@@ -6796,18 +6481,12 @@
             <a:pPr algn="ctr"/>
             <a:r>
               <a:rPr lang="pt-BR" sz="600" b="1" dirty="0">
-                <a:solidFill>
-                  <a:srgbClr val="FF0000"/>
-                </a:solidFill>
                 <a:latin typeface="Arial"/>
                 <a:cs typeface="Arial"/>
               </a:rPr>
               <a:t>[nome2]</a:t>
             </a:r>
-            <a:endParaRPr lang="pt-BR" sz="600" b="1" dirty="0">
-              <a:solidFill>
-                <a:srgbClr val="FF0000"/>
-              </a:solidFill>
+            <a:endParaRPr lang="pt-BR" sz="600" b="1">
               <a:latin typeface="Arial" panose="020B0604020202020204" pitchFamily="34" charset="0"/>
               <a:cs typeface="Arial" panose="020B0604020202020204" pitchFamily="34" charset="0"/>
             </a:endParaRPr>
@@ -6815,7 +6494,7 @@
           <a:p>
             <a:pPr algn="ctr"/>
             <a:r>
-              <a:rPr lang="pt-BR" sz="600">
+              <a:rPr lang="pt-BR" sz="600" dirty="0">
                 <a:solidFill>
                   <a:srgbClr val="000000"/>
                 </a:solidFill>
@@ -6824,7 +6503,7 @@
               </a:rPr>
               <a:t>[qualificação_profissional1]</a:t>
             </a:r>
-            <a:endParaRPr lang="en-US" sz="600">
+            <a:endParaRPr lang="en-US" sz="600" dirty="0">
               <a:solidFill>
                 <a:srgbClr val="000000"/>
               </a:solidFill>
@@ -6889,9 +6568,6 @@
             <a:pPr algn="ctr"/>
             <a:r>
               <a:rPr lang="es-ES" sz="600" b="1" dirty="0">
-                <a:solidFill>
-                  <a:srgbClr val="FF0000"/>
-                </a:solidFill>
                 <a:latin typeface="Arial"/>
                 <a:cs typeface="Arial"/>
               </a:rPr>
@@ -6899,9 +6575,6 @@
             </a:r>
             <a:r>
               <a:rPr lang="es-ES" sz="600" b="1" dirty="0" err="1">
-                <a:solidFill>
-                  <a:srgbClr val="FF0000"/>
-                </a:solidFill>
                 <a:latin typeface="Arial"/>
                 <a:cs typeface="Arial"/>
               </a:rPr>
@@ -6909,9 +6582,6 @@
             </a:r>
             <a:r>
               <a:rPr lang="es-ES" sz="600" b="1" dirty="0">
-                <a:solidFill>
-                  <a:srgbClr val="FF0000"/>
-                </a:solidFill>
                 <a:latin typeface="Arial"/>
                 <a:cs typeface="Arial"/>
               </a:rPr>
@@ -6919,9 +6589,6 @@
             </a:r>
             <a:r>
               <a:rPr lang="es-ES" sz="600" b="1" dirty="0" err="1">
-                <a:solidFill>
-                  <a:srgbClr val="FF0000"/>
-                </a:solidFill>
                 <a:latin typeface="Arial"/>
                 <a:cs typeface="Arial"/>
               </a:rPr>
@@ -6929,18 +6596,12 @@
             </a:r>
             <a:r>
               <a:rPr lang="es-ES" sz="600" b="1" dirty="0">
-                <a:solidFill>
-                  <a:srgbClr val="FF0000"/>
-                </a:solidFill>
                 <a:latin typeface="Arial"/>
                 <a:cs typeface="Arial"/>
               </a:rPr>
               <a:t>]</a:t>
             </a:r>
             <a:endParaRPr lang="pt-BR" sz="600" b="1" dirty="0">
-              <a:solidFill>
-                <a:srgbClr val="FF0000"/>
-              </a:solidFill>
               <a:latin typeface="Arial"/>
               <a:cs typeface="Arial"/>
             </a:endParaRPr>
@@ -7045,18 +6706,12 @@
             <a:pPr algn="ctr"/>
             <a:r>
               <a:rPr lang="pt-BR" sz="600" b="1" dirty="0">
-                <a:solidFill>
-                  <a:srgbClr val="FF0000"/>
-                </a:solidFill>
                 <a:latin typeface="Arial"/>
                 <a:cs typeface="Arial"/>
               </a:rPr>
               <a:t>[nome1]</a:t>
             </a:r>
-            <a:endParaRPr lang="pt-BR" sz="600" b="1" dirty="0">
-              <a:solidFill>
-                <a:srgbClr val="FF0000"/>
-              </a:solidFill>
+            <a:endParaRPr lang="pt-BR" sz="600" b="1">
               <a:latin typeface="Arial" panose="020B0604020202020204" pitchFamily="34" charset="0"/>
               <a:cs typeface="Arial" panose="020B0604020202020204" pitchFamily="34" charset="0"/>
             </a:endParaRPr>

</xml_diff>